<commit_message>
one-hot for column address_code and run some model ML
</commit_message>
<xml_diff>
--- a/report-slide/BaoCaoCuoiKy_DS.pptx
+++ b/report-slide/BaoCaoCuoiKy_DS.pptx
@@ -18474,7 +18474,31 @@
               <a:rPr lang="en-US" dirty="0">
                 <a:latin typeface="Helvetica Neue"/>
               </a:rPr>
-              <a:t> month ra </a:t>
+              <a:t> </a:t>
+            </a:r>
+            <a:r>
+              <a:rPr lang="en-US" dirty="0" err="1">
+                <a:latin typeface="Helvetica Neue"/>
+              </a:rPr>
+              <a:t>time_sold</a:t>
+            </a:r>
+            <a:r>
+              <a:rPr lang="en-US" dirty="0">
+                <a:latin typeface="Helvetica Neue"/>
+              </a:rPr>
+              <a:t> (</a:t>
+            </a:r>
+            <a:r>
+              <a:rPr lang="en-US" dirty="0" err="1">
+                <a:latin typeface="Helvetica Neue"/>
+              </a:rPr>
+              <a:t>là</a:t>
+            </a:r>
+            <a:r>
+              <a:rPr lang="en-US" dirty="0">
+                <a:latin typeface="Helvetica Neue"/>
+              </a:rPr>
+              <a:t> month hay season) ra </a:t>
             </a:r>
             <a:r>
               <a:rPr lang="en-US" dirty="0" err="1">
@@ -18719,14 +18743,11 @@
               <a:t>ư</a:t>
             </a:r>
             <a:r>
-              <a:rPr lang="en-US">
+              <a:rPr lang="en-US" dirty="0">
                 <a:latin typeface="Helvetica Neue"/>
               </a:rPr>
               <a:t> BT03.</a:t>
             </a:r>
-            <a:endParaRPr lang="en-US" dirty="0">
-              <a:latin typeface="Helvetica Neue"/>
-            </a:endParaRPr>
           </a:p>
           <a:p>
             <a:pPr algn="just">
@@ -20571,7 +20592,25 @@
                 </a:solidFill>
                 <a:latin typeface="Helvetica Neue"/>
               </a:rPr>
-              <a:t>, month </a:t>
+              <a:t>, </a:t>
+            </a:r>
+            <a:r>
+              <a:rPr lang="en-US" dirty="0" err="1">
+                <a:solidFill>
+                  <a:srgbClr val="000000"/>
+                </a:solidFill>
+                <a:latin typeface="Helvetica Neue"/>
+              </a:rPr>
+              <a:t>time_sold</a:t>
+            </a:r>
+            <a:r>
+              <a:rPr lang="en-US" dirty="0">
+                <a:solidFill>
+                  <a:srgbClr val="000000"/>
+                </a:solidFill>
+                <a:latin typeface="Helvetica Neue"/>
+              </a:rPr>
+              <a:t> </a:t>
             </a:r>
             <a:r>
               <a:rPr lang="en-US" dirty="0" err="1">
@@ -21187,6 +21226,42 @@
               <a:rPr lang="en-US" dirty="0" err="1">
                 <a:latin typeface="Helvetica Neue"/>
               </a:rPr>
+              <a:t>address_code</a:t>
+            </a:r>
+            <a:r>
+              <a:rPr lang="en-US" dirty="0">
+                <a:latin typeface="Helvetica Neue"/>
+              </a:rPr>
+              <a:t>, </a:t>
+            </a:r>
+            <a:r>
+              <a:rPr lang="en-US" dirty="0" err="1">
+                <a:latin typeface="Helvetica Neue"/>
+              </a:rPr>
+              <a:t>time_sold</a:t>
+            </a:r>
+            <a:r>
+              <a:rPr lang="en-US" dirty="0">
+                <a:latin typeface="Helvetica Neue"/>
+              </a:rPr>
+              <a:t>, </a:t>
+            </a:r>
+            <a:r>
+              <a:rPr lang="en-US" dirty="0" err="1">
+                <a:latin typeface="Helvetica Neue"/>
+              </a:rPr>
+              <a:t>info_type</a:t>
+            </a:r>
+            <a:r>
+              <a:rPr lang="en-US">
+                <a:latin typeface="Helvetica Neue"/>
+              </a:rPr>
+              <a:t>, </a:t>
+            </a:r>
+            <a:r>
+              <a:rPr lang="en-US" dirty="0" err="1">
+                <a:latin typeface="Helvetica Neue"/>
+              </a:rPr>
               <a:t>info_bedroom</a:t>
             </a:r>
             <a:r>
@@ -21289,7 +21364,7 @@
               <a:rPr lang="en-US" dirty="0">
                 <a:latin typeface="Helvetica Neue"/>
               </a:rPr>
-              <a:t>: </a:t>
+              <a:t>: mortgage, </a:t>
             </a:r>
             <a:r>
               <a:rPr lang="en-US" dirty="0" err="1">
@@ -23528,13 +23603,22 @@
               <a:t>chỉ</a:t>
             </a:r>
             <a:r>
-              <a:rPr lang="en-US" dirty="0">
+              <a:rPr lang="en-US">
                 <a:solidFill>
                   <a:srgbClr val="00B050"/>
                 </a:solidFill>
                 <a:latin typeface="Helvetica Neue"/>
               </a:rPr>
-              <a:t> 31.36%</a:t>
+              <a:t> 36.76</a:t>
+            </a:r>
+            <a:r>
+              <a:rPr lang="en-US" dirty="0">
+                <a:solidFill>
+                  <a:srgbClr val="00B050"/>
+                </a:solidFill>
+                <a:latin typeface="Helvetica Neue"/>
+              </a:rPr>
+              <a:t>%</a:t>
             </a:r>
             <a:r>
               <a:rPr lang="en-US" dirty="0">

</xml_diff>

<commit_message>
add class YearBuiltProcessor and change strategy to run model ML
</commit_message>
<xml_diff>
--- a/report-slide/BaoCaoCuoiKy_DS.pptx
+++ b/report-slide/BaoCaoCuoiKy_DS.pptx
@@ -18607,8 +18607,41 @@
               <a:rPr lang="en-US" dirty="0">
                 <a:latin typeface="Helvetica Neue"/>
               </a:rPr>
-              <a:t> mortgage.</a:t>
-            </a:r>
+              <a:t> mortgage </a:t>
+            </a:r>
+            <a:r>
+              <a:rPr lang="en-US" dirty="0" err="1">
+                <a:latin typeface="Helvetica Neue"/>
+              </a:rPr>
+              <a:t>và</a:t>
+            </a:r>
+            <a:r>
+              <a:rPr lang="en-US" dirty="0">
+                <a:latin typeface="Helvetica Neue"/>
+              </a:rPr>
+              <a:t> </a:t>
+            </a:r>
+            <a:r>
+              <a:rPr lang="en-US" dirty="0" err="1">
+                <a:latin typeface="Helvetica Neue"/>
+              </a:rPr>
+              <a:t>cột</a:t>
+            </a:r>
+            <a:r>
+              <a:rPr lang="en-US" dirty="0">
+                <a:latin typeface="Helvetica Neue"/>
+              </a:rPr>
+              <a:t> </a:t>
+            </a:r>
+            <a:r>
+              <a:rPr lang="en-US" dirty="0" err="1">
+                <a:latin typeface="Helvetica Neue"/>
+              </a:rPr>
+              <a:t>info_year_built.s</a:t>
+            </a:r>
+            <a:endParaRPr lang="en-US" dirty="0">
+              <a:latin typeface="Helvetica Neue"/>
+            </a:endParaRPr>
           </a:p>
           <a:p>
             <a:pPr algn="just">
@@ -21253,7 +21286,7 @@
               <a:t>info_type</a:t>
             </a:r>
             <a:r>
-              <a:rPr lang="en-US">
+              <a:rPr lang="en-US" dirty="0">
                 <a:latin typeface="Helvetica Neue"/>
               </a:rPr>
               <a:t>, </a:t>

</xml_diff>

<commit_message>
done model Linear Regression
</commit_message>
<xml_diff>
--- a/report-slide/BaoCaoCuoiKy_DS.pptx
+++ b/report-slide/BaoCaoCuoiKy_DS.pptx
@@ -5,10 +5,10 @@
     <p:sldMasterId id="2147483648" r:id="rId1"/>
   </p:sldMasterIdLst>
   <p:notesMasterIdLst>
-    <p:notesMasterId r:id="rId23"/>
+    <p:notesMasterId r:id="rId24"/>
   </p:notesMasterIdLst>
   <p:handoutMasterIdLst>
-    <p:handoutMasterId r:id="rId24"/>
+    <p:handoutMasterId r:id="rId25"/>
   </p:handoutMasterIdLst>
   <p:sldIdLst>
     <p:sldId id="256" r:id="rId2"/>
@@ -28,10 +28,11 @@
     <p:sldId id="296" r:id="rId16"/>
     <p:sldId id="299" r:id="rId17"/>
     <p:sldId id="294" r:id="rId18"/>
-    <p:sldId id="297" r:id="rId19"/>
-    <p:sldId id="295" r:id="rId20"/>
-    <p:sldId id="298" r:id="rId21"/>
-    <p:sldId id="273" r:id="rId22"/>
+    <p:sldId id="300" r:id="rId19"/>
+    <p:sldId id="297" r:id="rId20"/>
+    <p:sldId id="295" r:id="rId21"/>
+    <p:sldId id="298" r:id="rId22"/>
+    <p:sldId id="273" r:id="rId23"/>
   </p:sldIdLst>
   <p:sldSz cx="12192000" cy="6858000"/>
   <p:notesSz cx="6858000" cy="9144000"/>
@@ -232,7 +233,7 @@
           <a:p>
             <a:fld id="{961FD521-A433-42F2-B3B9-264AAAEBCC33}" type="datetimeFigureOut">
               <a:rPr lang="en-US" smtClean="0"/>
-              <a:t>1/3/2020</a:t>
+              <a:t>1/4/2020</a:t>
             </a:fld>
             <a:endParaRPr lang="en-US"/>
           </a:p>
@@ -410,7 +411,7 @@
           <a:p>
             <a:fld id="{B2B24090-E782-4539-8661-998478827FB2}" type="datetimeFigureOut">
               <a:rPr lang="en-US" smtClean="0"/>
-              <a:t>1/3/2020</a:t>
+              <a:t>1/4/2020</a:t>
             </a:fld>
             <a:endParaRPr lang="en-US"/>
           </a:p>
@@ -3791,7 +3792,7 @@
     </p:spTree>
     <p:extLst>
       <p:ext uri="{BB962C8B-B14F-4D97-AF65-F5344CB8AC3E}">
-        <p14:creationId xmlns:p14="http://schemas.microsoft.com/office/powerpoint/2010/main" val="573627637"/>
+        <p14:creationId xmlns:p14="http://schemas.microsoft.com/office/powerpoint/2010/main" val="4232754875"/>
       </p:ext>
     </p:extLst>
   </p:cSld>
@@ -3894,7 +3895,7 @@
     </p:spTree>
     <p:extLst>
       <p:ext uri="{BB962C8B-B14F-4D97-AF65-F5344CB8AC3E}">
-        <p14:creationId xmlns:p14="http://schemas.microsoft.com/office/powerpoint/2010/main" val="2813689372"/>
+        <p14:creationId xmlns:p14="http://schemas.microsoft.com/office/powerpoint/2010/main" val="573627637"/>
       </p:ext>
     </p:extLst>
   </p:cSld>
@@ -3989,6 +3990,109 @@
             <a:fld id="{AB2EF4F0-B01F-49F6-8BE3-F23017C9D067}" type="slidenum">
               <a:rPr lang="en-US" smtClean="0"/>
               <a:t>20</a:t>
+            </a:fld>
+            <a:endParaRPr lang="en-US"/>
+          </a:p>
+        </p:txBody>
+      </p:sp>
+    </p:spTree>
+    <p:extLst>
+      <p:ext uri="{BB962C8B-B14F-4D97-AF65-F5344CB8AC3E}">
+        <p14:creationId xmlns:p14="http://schemas.microsoft.com/office/powerpoint/2010/main" val="2813689372"/>
+      </p:ext>
+    </p:extLst>
+  </p:cSld>
+  <p:clrMapOvr>
+    <a:masterClrMapping/>
+  </p:clrMapOvr>
+</p:notes>
+</file>
+
+<file path=ppt/notesSlides/notesSlide18.xml><?xml version="1.0" encoding="utf-8"?>
+<p:notes xmlns:a="http://schemas.openxmlformats.org/drawingml/2006/main" xmlns:r="http://schemas.openxmlformats.org/officeDocument/2006/relationships" xmlns:p="http://schemas.openxmlformats.org/presentationml/2006/main">
+  <p:cSld>
+    <p:spTree>
+      <p:nvGrpSpPr>
+        <p:cNvPr id="1" name=""/>
+        <p:cNvGrpSpPr/>
+        <p:nvPr/>
+      </p:nvGrpSpPr>
+      <p:grpSpPr>
+        <a:xfrm>
+          <a:off x="0" y="0"/>
+          <a:ext cx="0" cy="0"/>
+          <a:chOff x="0" y="0"/>
+          <a:chExt cx="0" cy="0"/>
+        </a:xfrm>
+      </p:grpSpPr>
+      <p:sp>
+        <p:nvSpPr>
+          <p:cNvPr id="2" name="Slide Image Placeholder 1"/>
+          <p:cNvSpPr>
+            <a:spLocks noGrp="1" noRot="1" noChangeAspect="1"/>
+          </p:cNvSpPr>
+          <p:nvPr>
+            <p:ph type="sldImg"/>
+          </p:nvPr>
+        </p:nvSpPr>
+        <p:spPr/>
+      </p:sp>
+      <p:sp>
+        <p:nvSpPr>
+          <p:cNvPr id="3" name="Notes Placeholder 2"/>
+          <p:cNvSpPr>
+            <a:spLocks noGrp="1"/>
+          </p:cNvSpPr>
+          <p:nvPr>
+            <p:ph type="body" idx="1"/>
+          </p:nvPr>
+        </p:nvSpPr>
+        <p:spPr/>
+        <p:txBody>
+          <a:bodyPr/>
+          <a:lstStyle/>
+          <a:p>
+            <a:endParaRPr lang="en-US" dirty="0"/>
+          </a:p>
+        </p:txBody>
+      </p:sp>
+      <p:sp>
+        <p:nvSpPr>
+          <p:cNvPr id="4" name="Footer Placeholder 3"/>
+          <p:cNvSpPr>
+            <a:spLocks noGrp="1"/>
+          </p:cNvSpPr>
+          <p:nvPr>
+            <p:ph type="ftr" sz="quarter" idx="4"/>
+          </p:nvPr>
+        </p:nvSpPr>
+        <p:spPr/>
+        <p:txBody>
+          <a:bodyPr/>
+          <a:lstStyle/>
+          <a:p>
+            <a:endParaRPr lang="en-US"/>
+          </a:p>
+        </p:txBody>
+      </p:sp>
+      <p:sp>
+        <p:nvSpPr>
+          <p:cNvPr id="5" name="Slide Number Placeholder 4"/>
+          <p:cNvSpPr>
+            <a:spLocks noGrp="1"/>
+          </p:cNvSpPr>
+          <p:nvPr>
+            <p:ph type="sldNum" sz="quarter" idx="5"/>
+          </p:nvPr>
+        </p:nvSpPr>
+        <p:spPr/>
+        <p:txBody>
+          <a:bodyPr/>
+          <a:lstStyle/>
+          <a:p>
+            <a:fld id="{AB2EF4F0-B01F-49F6-8BE3-F23017C9D067}" type="slidenum">
+              <a:rPr lang="en-US" smtClean="0"/>
+              <a:t>21</a:t>
             </a:fld>
             <a:endParaRPr lang="en-US"/>
           </a:p>
@@ -5837,7 +5941,7 @@
           <a:p>
             <a:fld id="{D1E35505-9D26-4CCA-88A8-7278724AB2D4}" type="datetime1">
               <a:rPr lang="en-US" smtClean="0"/>
-              <a:t>1/3/2020</a:t>
+              <a:t>1/4/2020</a:t>
             </a:fld>
             <a:endParaRPr lang="en-US" dirty="0"/>
           </a:p>
@@ -6095,7 +6199,7 @@
           <a:p>
             <a:fld id="{5F233E7B-35C4-4543-9D47-AB80A65021AB}" type="datetime1">
               <a:rPr lang="en-US" smtClean="0"/>
-              <a:t>1/3/2020</a:t>
+              <a:t>1/4/2020</a:t>
             </a:fld>
             <a:endParaRPr lang="en-US" dirty="0"/>
           </a:p>
@@ -6331,7 +6435,7 @@
           <a:p>
             <a:fld id="{51018BA2-1933-4340-B3FB-8224D14F0FA8}" type="datetime1">
               <a:rPr lang="en-US" smtClean="0"/>
-              <a:t>1/3/2020</a:t>
+              <a:t>1/4/2020</a:t>
             </a:fld>
             <a:endParaRPr lang="en-US" dirty="0"/>
           </a:p>
@@ -6567,7 +6671,7 @@
           <a:p>
             <a:fld id="{E1F1B53F-2997-4D61-8750-586F294DFE2D}" type="datetime1">
               <a:rPr lang="en-US" smtClean="0"/>
-              <a:t>1/3/2020</a:t>
+              <a:t>1/4/2020</a:t>
             </a:fld>
             <a:endParaRPr lang="en-US" dirty="0"/>
           </a:p>
@@ -6870,7 +6974,7 @@
           <a:p>
             <a:fld id="{91FDFB85-6448-41D5-9F24-0A2BEAC6B81A}" type="datetime1">
               <a:rPr lang="en-US" smtClean="0"/>
-              <a:t>1/3/2020</a:t>
+              <a:t>1/4/2020</a:t>
             </a:fld>
             <a:endParaRPr lang="en-US" dirty="0"/>
           </a:p>
@@ -7173,7 +7277,7 @@
           <a:p>
             <a:fld id="{CBB8992D-E0E4-4D28-AB73-9BE6034AD31C}" type="datetime1">
               <a:rPr lang="en-US" smtClean="0"/>
-              <a:t>1/3/2020</a:t>
+              <a:t>1/4/2020</a:t>
             </a:fld>
             <a:endParaRPr lang="en-US" dirty="0"/>
           </a:p>
@@ -7596,7 +7700,7 @@
           <a:p>
             <a:fld id="{C34CC608-A54C-49C7-B2E1-75402E74D998}" type="datetime1">
               <a:rPr lang="en-US" smtClean="0"/>
-              <a:t>1/3/2020</a:t>
+              <a:t>1/4/2020</a:t>
             </a:fld>
             <a:endParaRPr lang="en-US" dirty="0"/>
           </a:p>
@@ -7692,7 +7796,7 @@
           <a:p>
             <a:fld id="{998064EA-42EB-46D8-92ED-7D4EA2DFF68A}" type="datetime1">
               <a:rPr lang="en-US" smtClean="0"/>
-              <a:t>1/3/2020</a:t>
+              <a:t>1/4/2020</a:t>
             </a:fld>
             <a:endParaRPr lang="en-US" dirty="0"/>
           </a:p>
@@ -7855,7 +7959,7 @@
           <a:p>
             <a:fld id="{703E3EFE-48F4-429B-944D-60C57AEE80C4}" type="datetime1">
               <a:rPr lang="en-US" smtClean="0"/>
-              <a:t>1/3/2020</a:t>
+              <a:t>1/4/2020</a:t>
             </a:fld>
             <a:endParaRPr lang="en-US" dirty="0"/>
           </a:p>
@@ -8234,7 +8338,7 @@
           <a:p>
             <a:fld id="{062E3600-40B4-41AC-811B-F7E030E93608}" type="datetime1">
               <a:rPr lang="en-US" smtClean="0"/>
-              <a:t>1/3/2020</a:t>
+              <a:t>1/4/2020</a:t>
             </a:fld>
             <a:endParaRPr lang="en-US" dirty="0"/>
           </a:p>
@@ -8524,7 +8628,7 @@
           <a:p>
             <a:fld id="{DA28BD02-F7E1-440F-B179-1A4D042378D9}" type="datetime1">
               <a:rPr lang="en-US" smtClean="0"/>
-              <a:t>1/3/2020</a:t>
+              <a:t>1/4/2020</a:t>
             </a:fld>
             <a:endParaRPr lang="en-US" dirty="0"/>
           </a:p>
@@ -8736,7 +8840,7 @@
           <a:p>
             <a:fld id="{B5E06560-9C4B-4783-82AD-BD278DD02534}" type="datetime1">
               <a:rPr lang="en-US" smtClean="0"/>
-              <a:t>1/3/2020</a:t>
+              <a:t>1/4/2020</a:t>
             </a:fld>
             <a:endParaRPr lang="en-US" dirty="0"/>
           </a:p>
@@ -17267,7 +17371,7 @@
         <p:spPr>
           <a:xfrm>
             <a:off x="609578" y="657997"/>
-            <a:ext cx="850512" cy="740166"/>
+            <a:ext cx="629287" cy="547643"/>
           </a:xfrm>
           <a:prstGeom prst="rect">
             <a:avLst/>
@@ -17288,7 +17392,7 @@
         </p:nvSpPr>
         <p:spPr>
           <a:xfrm>
-            <a:off x="1460090" y="843414"/>
+            <a:off x="1238865" y="694232"/>
             <a:ext cx="10249310" cy="369332"/>
           </a:xfrm>
           <a:prstGeom prst="rect">
@@ -17644,8 +17748,8 @@
         </p:nvSpPr>
         <p:spPr>
           <a:xfrm>
-            <a:off x="609578" y="1530583"/>
-            <a:ext cx="11262866" cy="5170646"/>
+            <a:off x="609578" y="1255628"/>
+            <a:ext cx="11262866" cy="5524589"/>
           </a:xfrm>
           <a:prstGeom prst="rect">
             <a:avLst/>
@@ -18919,205 +19023,97 @@
               <a:rPr lang="en-US" dirty="0" err="1">
                 <a:latin typeface="Helvetica Neue"/>
               </a:rPr>
-              <a:t>Xóa</a:t>
-            </a:r>
-            <a:r>
-              <a:rPr lang="en-US" dirty="0">
-                <a:latin typeface="Helvetica Neue"/>
-              </a:rPr>
-              <a:t> 3 </a:t>
-            </a:r>
-            <a:r>
-              <a:rPr lang="en-US" dirty="0" err="1">
-                <a:latin typeface="Helvetica Neue"/>
-              </a:rPr>
-              <a:t>cột</a:t>
-            </a:r>
-            <a:r>
-              <a:rPr lang="en-US" dirty="0">
-                <a:latin typeface="Helvetica Neue"/>
-              </a:rPr>
-              <a:t> </a:t>
-            </a:r>
-            <a:r>
-              <a:rPr lang="en-US" dirty="0" err="1">
-                <a:latin typeface="Helvetica Neue"/>
-              </a:rPr>
-              <a:t>info_property_id</a:t>
-            </a:r>
-            <a:r>
-              <a:rPr lang="en-US" dirty="0">
-                <a:latin typeface="Helvetica Neue"/>
-              </a:rPr>
-              <a:t>, </a:t>
-            </a:r>
-            <a:r>
-              <a:rPr lang="en-US" dirty="0" err="1">
-                <a:latin typeface="Helvetica Neue"/>
-              </a:rPr>
-              <a:t>info_county</a:t>
-            </a:r>
-            <a:r>
-              <a:rPr lang="en-US" dirty="0">
-                <a:latin typeface="Helvetica Neue"/>
-              </a:rPr>
-              <a:t> </a:t>
-            </a:r>
-            <a:r>
-              <a:rPr lang="en-US" dirty="0" err="1">
-                <a:latin typeface="Helvetica Neue"/>
-              </a:rPr>
-              <a:t>và</a:t>
-            </a:r>
-            <a:r>
-              <a:rPr lang="en-US" dirty="0">
-                <a:latin typeface="Helvetica Neue"/>
-              </a:rPr>
-              <a:t> </a:t>
-            </a:r>
-            <a:r>
-              <a:rPr lang="en-US" dirty="0" err="1">
-                <a:latin typeface="Helvetica Neue"/>
-              </a:rPr>
-              <a:t>info_parcel_number</a:t>
-            </a:r>
-            <a:r>
-              <a:rPr lang="en-US" dirty="0">
-                <a:latin typeface="Helvetica Neue"/>
-              </a:rPr>
-              <a:t> </a:t>
-            </a:r>
-            <a:r>
-              <a:rPr lang="en-US" dirty="0" err="1">
-                <a:latin typeface="Helvetica Neue"/>
-              </a:rPr>
-              <a:t>vì</a:t>
-            </a:r>
-            <a:r>
-              <a:rPr lang="en-US" dirty="0">
-                <a:latin typeface="Helvetica Neue"/>
-              </a:rPr>
-              <a:t> </a:t>
-            </a:r>
-            <a:r>
-              <a:rPr lang="en-US" dirty="0" err="1">
-                <a:latin typeface="Helvetica Neue"/>
-              </a:rPr>
-              <a:t>chúng</a:t>
-            </a:r>
-            <a:r>
-              <a:rPr lang="en-US" dirty="0">
-                <a:latin typeface="Helvetica Neue"/>
-              </a:rPr>
-              <a:t> </a:t>
-            </a:r>
-            <a:r>
-              <a:rPr lang="en-US" dirty="0" err="1">
-                <a:latin typeface="Helvetica Neue"/>
-              </a:rPr>
-              <a:t>khác</a:t>
-            </a:r>
-            <a:r>
-              <a:rPr lang="en-US" dirty="0">
-                <a:latin typeface="Helvetica Neue"/>
-              </a:rPr>
-              <a:t> </a:t>
-            </a:r>
-            <a:r>
-              <a:rPr lang="en-US" dirty="0" err="1">
-                <a:latin typeface="Helvetica Neue"/>
-              </a:rPr>
-              <a:t>biệt</a:t>
-            </a:r>
-            <a:r>
-              <a:rPr lang="en-US" dirty="0">
-                <a:latin typeface="Helvetica Neue"/>
-              </a:rPr>
-              <a:t> 100% </a:t>
-            </a:r>
-            <a:r>
-              <a:rPr lang="en-US" dirty="0" err="1">
-                <a:latin typeface="Helvetica Neue"/>
-              </a:rPr>
-              <a:t>và</a:t>
-            </a:r>
-            <a:r>
-              <a:rPr lang="en-US" dirty="0">
-                <a:latin typeface="Helvetica Neue"/>
-              </a:rPr>
-              <a:t> </a:t>
-            </a:r>
-            <a:r>
-              <a:rPr lang="en-US" dirty="0" err="1">
-                <a:latin typeface="Helvetica Neue"/>
-              </a:rPr>
-              <a:t>không</a:t>
-            </a:r>
-            <a:r>
-              <a:rPr lang="en-US" dirty="0">
-                <a:latin typeface="Helvetica Neue"/>
-              </a:rPr>
-              <a:t> </a:t>
-            </a:r>
-            <a:r>
-              <a:rPr lang="en-US" dirty="0" err="1">
-                <a:latin typeface="Helvetica Neue"/>
-              </a:rPr>
-              <a:t>có</a:t>
-            </a:r>
-            <a:r>
-              <a:rPr lang="en-US" dirty="0">
-                <a:latin typeface="Helvetica Neue"/>
-              </a:rPr>
-              <a:t> ý </a:t>
-            </a:r>
-            <a:r>
-              <a:rPr lang="en-US" dirty="0" err="1">
-                <a:latin typeface="Helvetica Neue"/>
-              </a:rPr>
-              <a:t>nghĩa</a:t>
-            </a:r>
-            <a:r>
-              <a:rPr lang="en-US" dirty="0">
-                <a:latin typeface="Helvetica Neue"/>
-              </a:rPr>
-              <a:t> </a:t>
-            </a:r>
-            <a:r>
-              <a:rPr lang="en-US" dirty="0" err="1">
-                <a:latin typeface="Helvetica Neue"/>
-              </a:rPr>
-              <a:t>khi</a:t>
-            </a:r>
-            <a:r>
-              <a:rPr lang="en-US" dirty="0">
-                <a:latin typeface="Helvetica Neue"/>
-              </a:rPr>
-              <a:t> </a:t>
-            </a:r>
-            <a:r>
-              <a:rPr lang="en-US" dirty="0" err="1">
-                <a:latin typeface="Helvetica Neue"/>
-              </a:rPr>
-              <a:t>huấn</a:t>
-            </a:r>
-            <a:r>
-              <a:rPr lang="en-US" dirty="0">
-                <a:latin typeface="Helvetica Neue"/>
-              </a:rPr>
-              <a:t> </a:t>
-            </a:r>
-            <a:r>
-              <a:rPr lang="en-US" dirty="0" err="1">
-                <a:latin typeface="Helvetica Neue"/>
-              </a:rPr>
-              <a:t>luyện</a:t>
-            </a:r>
-            <a:r>
-              <a:rPr lang="en-US" dirty="0">
-                <a:latin typeface="Helvetica Neue"/>
-              </a:rPr>
-              <a:t>.</a:t>
+              <a:t>Cột</a:t>
+            </a:r>
+            <a:r>
+              <a:rPr lang="en-US" dirty="0">
+                <a:latin typeface="Helvetica Neue"/>
+              </a:rPr>
+              <a:t> </a:t>
+            </a:r>
+            <a:r>
+              <a:rPr lang="en-US" dirty="0" err="1">
+                <a:latin typeface="Helvetica Neue"/>
+              </a:rPr>
+              <a:t>year_build</a:t>
+            </a:r>
+            <a:r>
+              <a:rPr lang="en-US" dirty="0">
+                <a:latin typeface="Helvetica Neue"/>
+              </a:rPr>
+              <a:t> </a:t>
+            </a:r>
+            <a:r>
+              <a:rPr lang="en-US" dirty="0" err="1">
+                <a:latin typeface="Helvetica Neue"/>
+              </a:rPr>
+              <a:t>vẫn</a:t>
+            </a:r>
+            <a:r>
+              <a:rPr lang="en-US" dirty="0">
+                <a:latin typeface="Helvetica Neue"/>
+              </a:rPr>
+              <a:t> </a:t>
+            </a:r>
+            <a:r>
+              <a:rPr lang="en-US" dirty="0" err="1">
+                <a:latin typeface="Helvetica Neue"/>
+              </a:rPr>
+              <a:t>giữ</a:t>
+            </a:r>
+            <a:r>
+              <a:rPr lang="en-US" dirty="0">
+                <a:latin typeface="Helvetica Neue"/>
+              </a:rPr>
+              <a:t> </a:t>
+            </a:r>
+            <a:r>
+              <a:rPr lang="en-US" dirty="0" err="1">
+                <a:latin typeface="Helvetica Neue"/>
+              </a:rPr>
+              <a:t>lại</a:t>
+            </a:r>
+            <a:r>
+              <a:rPr lang="en-US" dirty="0">
+                <a:latin typeface="Helvetica Neue"/>
+              </a:rPr>
+              <a:t> hay </a:t>
+            </a:r>
+            <a:r>
+              <a:rPr lang="en-US" dirty="0" err="1">
+                <a:latin typeface="Helvetica Neue"/>
+              </a:rPr>
+              <a:t>chuyển</a:t>
+            </a:r>
+            <a:r>
+              <a:rPr lang="en-US" dirty="0">
+                <a:latin typeface="Helvetica Neue"/>
+              </a:rPr>
+              <a:t> qua </a:t>
+            </a:r>
+            <a:r>
+              <a:rPr lang="en-US" dirty="0" err="1">
+                <a:latin typeface="Helvetica Neue"/>
+              </a:rPr>
+              <a:t>giai</a:t>
+            </a:r>
+            <a:r>
+              <a:rPr lang="en-US" dirty="0">
+                <a:latin typeface="Helvetica Neue"/>
+              </a:rPr>
+              <a:t> </a:t>
+            </a:r>
+            <a:r>
+              <a:rPr lang="en-US" dirty="0" err="1">
+                <a:latin typeface="Helvetica Neue"/>
+              </a:rPr>
+              <a:t>đoạn</a:t>
+            </a:r>
+            <a:r>
+              <a:rPr lang="en-US" dirty="0">
+                <a:latin typeface="Helvetica Neue"/>
+              </a:rPr>
+              <a:t>: &lt;1900, [1990; 1950), [1950; 2000], &gt;2000.</a:t>
             </a:r>
           </a:p>
           <a:p>
@@ -19136,37 +19132,13 @@
               <a:rPr lang="en-US" dirty="0" err="1">
                 <a:latin typeface="Helvetica Neue"/>
               </a:rPr>
-              <a:t>Giữ</a:t>
-            </a:r>
-            <a:r>
-              <a:rPr lang="en-US" dirty="0">
-                <a:latin typeface="Helvetica Neue"/>
-              </a:rPr>
-              <a:t> </a:t>
-            </a:r>
-            <a:r>
-              <a:rPr lang="en-US" dirty="0" err="1">
-                <a:latin typeface="Helvetica Neue"/>
-              </a:rPr>
-              <a:t>nguyên</a:t>
-            </a:r>
-            <a:r>
-              <a:rPr lang="en-US" dirty="0">
-                <a:latin typeface="Helvetica Neue"/>
-              </a:rPr>
-              <a:t> </a:t>
-            </a:r>
-            <a:r>
-              <a:rPr lang="en-US" dirty="0" err="1">
-                <a:latin typeface="Helvetica Neue"/>
-              </a:rPr>
-              <a:t>các</a:t>
-            </a:r>
-            <a:r>
-              <a:rPr lang="en-US" dirty="0">
-                <a:latin typeface="Helvetica Neue"/>
-              </a:rPr>
-              <a:t> </a:t>
+              <a:t>Xóa</a:t>
+            </a:r>
+            <a:r>
+              <a:rPr lang="en-US" dirty="0">
+                <a:latin typeface="Helvetica Neue"/>
+              </a:rPr>
+              <a:t> 3 </a:t>
             </a:r>
             <a:r>
               <a:rPr lang="en-US" dirty="0" err="1">
@@ -19184,7 +19156,7 @@
               <a:rPr lang="en-US" dirty="0" err="1">
                 <a:latin typeface="Helvetica Neue"/>
               </a:rPr>
-              <a:t>taxes_land</a:t>
+              <a:t>info_property_id</a:t>
             </a:r>
             <a:r>
               <a:rPr lang="en-US" dirty="0">
@@ -19196,103 +19168,31 @@
               <a:rPr lang="en-US" dirty="0" err="1">
                 <a:latin typeface="Helvetica Neue"/>
               </a:rPr>
-              <a:t>taxes_improvements</a:t>
-            </a:r>
-            <a:r>
-              <a:rPr lang="en-US" dirty="0">
-                <a:latin typeface="Helvetica Neue"/>
-              </a:rPr>
-              <a:t>. </a:t>
-            </a:r>
-            <a:r>
-              <a:rPr lang="en-US" dirty="0" err="1">
-                <a:latin typeface="Helvetica Neue"/>
-              </a:rPr>
-              <a:t>Xóa</a:t>
-            </a:r>
-            <a:r>
-              <a:rPr lang="en-US" dirty="0">
-                <a:latin typeface="Helvetica Neue"/>
-              </a:rPr>
-              <a:t> </a:t>
-            </a:r>
-            <a:r>
-              <a:rPr lang="en-US" dirty="0" err="1">
-                <a:latin typeface="Helvetica Neue"/>
-              </a:rPr>
-              <a:t>cột</a:t>
-            </a:r>
-            <a:r>
-              <a:rPr lang="en-US" dirty="0">
-                <a:latin typeface="Helvetica Neue"/>
-              </a:rPr>
-              <a:t> </a:t>
-            </a:r>
-            <a:r>
-              <a:rPr lang="en-US" dirty="0" err="1">
-                <a:latin typeface="Helvetica Neue"/>
-              </a:rPr>
-              <a:t>taxes_total</a:t>
-            </a:r>
-            <a:r>
-              <a:rPr lang="en-US" dirty="0">
-                <a:latin typeface="Helvetica Neue"/>
-              </a:rPr>
-              <a:t>. </a:t>
-            </a:r>
-            <a:r>
-              <a:rPr lang="en-US" dirty="0" err="1">
-                <a:latin typeface="Helvetica Neue"/>
-              </a:rPr>
-              <a:t>Rút</a:t>
-            </a:r>
-            <a:r>
-              <a:rPr lang="en-US" dirty="0">
-                <a:latin typeface="Helvetica Neue"/>
-              </a:rPr>
-              <a:t> </a:t>
-            </a:r>
-            <a:r>
-              <a:rPr lang="en-US" dirty="0" err="1">
-                <a:latin typeface="Helvetica Neue"/>
-              </a:rPr>
-              <a:t>trích</a:t>
-            </a:r>
-            <a:r>
-              <a:rPr lang="en-US" dirty="0">
-                <a:latin typeface="Helvetica Neue"/>
-              </a:rPr>
-              <a:t> </a:t>
-            </a:r>
-            <a:r>
-              <a:rPr lang="en-US" dirty="0" err="1">
-                <a:latin typeface="Helvetica Neue"/>
-              </a:rPr>
-              <a:t>tiền</a:t>
-            </a:r>
-            <a:r>
-              <a:rPr lang="en-US" dirty="0">
-                <a:latin typeface="Helvetica Neue"/>
-              </a:rPr>
-              <a:t> </a:t>
-            </a:r>
-            <a:r>
-              <a:rPr lang="en-US" dirty="0" err="1">
-                <a:latin typeface="Helvetica Neue"/>
-              </a:rPr>
-              <a:t>từ</a:t>
-            </a:r>
-            <a:r>
-              <a:rPr lang="en-US" dirty="0">
-                <a:latin typeface="Helvetica Neue"/>
-              </a:rPr>
-              <a:t> </a:t>
-            </a:r>
-            <a:r>
-              <a:rPr lang="en-US" dirty="0" err="1">
-                <a:latin typeface="Helvetica Neue"/>
-              </a:rPr>
-              <a:t>taxes_taxes</a:t>
+              <a:t>info_county</a:t>
+            </a:r>
+            <a:r>
+              <a:rPr lang="en-US" dirty="0">
+                <a:latin typeface="Helvetica Neue"/>
+              </a:rPr>
+              <a:t> </a:t>
+            </a:r>
+            <a:r>
+              <a:rPr lang="en-US" dirty="0" err="1">
+                <a:latin typeface="Helvetica Neue"/>
+              </a:rPr>
+              <a:t>và</a:t>
+            </a:r>
+            <a:r>
+              <a:rPr lang="en-US" dirty="0">
+                <a:latin typeface="Helvetica Neue"/>
+              </a:rPr>
+              <a:t> </a:t>
+            </a:r>
+            <a:r>
+              <a:rPr lang="en-US" dirty="0" err="1">
+                <a:latin typeface="Helvetica Neue"/>
+              </a:rPr>
+              <a:t>info_parcel_number</a:t>
             </a:r>
             <a:r>
               <a:rPr lang="en-US" dirty="0">
@@ -19316,73 +19216,37 @@
               <a:rPr lang="en-US" dirty="0" err="1">
                 <a:latin typeface="Helvetica Neue"/>
               </a:rPr>
-              <a:t>nó</a:t>
-            </a:r>
-            <a:r>
-              <a:rPr lang="en-US" dirty="0">
-                <a:latin typeface="Helvetica Neue"/>
-              </a:rPr>
-              <a:t> </a:t>
-            </a:r>
-            <a:r>
-              <a:rPr lang="en-US" dirty="0" err="1">
-                <a:latin typeface="Helvetica Neue"/>
-              </a:rPr>
-              <a:t>chứa</a:t>
-            </a:r>
-            <a:r>
-              <a:rPr lang="en-US" dirty="0">
-                <a:latin typeface="Helvetica Neue"/>
-              </a:rPr>
-              <a:t> </a:t>
-            </a:r>
-            <a:r>
-              <a:rPr lang="en-US" dirty="0" err="1">
-                <a:latin typeface="Helvetica Neue"/>
-              </a:rPr>
-              <a:t>cả</a:t>
-            </a:r>
-            <a:r>
-              <a:rPr lang="en-US" dirty="0">
-                <a:latin typeface="Helvetica Neue"/>
-              </a:rPr>
-              <a:t> </a:t>
-            </a:r>
-            <a:r>
-              <a:rPr lang="en-US" dirty="0" err="1">
-                <a:latin typeface="Helvetica Neue"/>
-              </a:rPr>
-              <a:t>thông</a:t>
-            </a:r>
-            <a:r>
-              <a:rPr lang="en-US" dirty="0">
-                <a:latin typeface="Helvetica Neue"/>
-              </a:rPr>
-              <a:t> tin </a:t>
-            </a:r>
-            <a:r>
-              <a:rPr lang="en-US" dirty="0" err="1">
-                <a:latin typeface="Helvetica Neue"/>
-              </a:rPr>
-              <a:t>dạng</a:t>
-            </a:r>
-            <a:r>
-              <a:rPr lang="en-US" dirty="0">
-                <a:latin typeface="Helvetica Neue"/>
-              </a:rPr>
-              <a:t> </a:t>
-            </a:r>
-            <a:r>
-              <a:rPr lang="en-US" dirty="0" err="1">
-                <a:latin typeface="Helvetica Neue"/>
-              </a:rPr>
-              <a:t>tiền</a:t>
-            </a:r>
-            <a:r>
-              <a:rPr lang="en-US" dirty="0">
-                <a:latin typeface="Helvetica Neue"/>
-              </a:rPr>
-              <a:t> </a:t>
+              <a:t>chúng</a:t>
+            </a:r>
+            <a:r>
+              <a:rPr lang="en-US" dirty="0">
+                <a:latin typeface="Helvetica Neue"/>
+              </a:rPr>
+              <a:t> </a:t>
+            </a:r>
+            <a:r>
+              <a:rPr lang="en-US" dirty="0" err="1">
+                <a:latin typeface="Helvetica Neue"/>
+              </a:rPr>
+              <a:t>khác</a:t>
+            </a:r>
+            <a:r>
+              <a:rPr lang="en-US" dirty="0">
+                <a:latin typeface="Helvetica Neue"/>
+              </a:rPr>
+              <a:t> </a:t>
+            </a:r>
+            <a:r>
+              <a:rPr lang="en-US" dirty="0" err="1">
+                <a:latin typeface="Helvetica Neue"/>
+              </a:rPr>
+              <a:t>biệt</a:t>
+            </a:r>
+            <a:r>
+              <a:rPr lang="en-US" dirty="0">
+                <a:latin typeface="Helvetica Neue"/>
+              </a:rPr>
+              <a:t> 100% </a:t>
             </a:r>
             <a:r>
               <a:rPr lang="en-US" dirty="0" err="1">
@@ -19394,31 +19258,79 @@
               <a:rPr lang="en-US" dirty="0">
                 <a:latin typeface="Helvetica Neue"/>
               </a:rPr>
-              <a:t> %, </a:t>
-            </a:r>
-            <a:r>
-              <a:rPr lang="en-US" dirty="0" err="1">
-                <a:latin typeface="Helvetica Neue"/>
-              </a:rPr>
-              <a:t>ví</a:t>
-            </a:r>
-            <a:r>
-              <a:rPr lang="en-US" dirty="0">
-                <a:latin typeface="Helvetica Neue"/>
-              </a:rPr>
-              <a:t> </a:t>
-            </a:r>
-            <a:r>
-              <a:rPr lang="en-US" dirty="0" err="1">
-                <a:latin typeface="Helvetica Neue"/>
-              </a:rPr>
-              <a:t>dụ</a:t>
-            </a:r>
-            <a:r>
-              <a:rPr lang="en-US" dirty="0">
-                <a:latin typeface="Helvetica Neue"/>
-              </a:rPr>
-              <a:t>: 6969 (1.23 %).</a:t>
+              <a:t> </a:t>
+            </a:r>
+            <a:r>
+              <a:rPr lang="en-US" dirty="0" err="1">
+                <a:latin typeface="Helvetica Neue"/>
+              </a:rPr>
+              <a:t>không</a:t>
+            </a:r>
+            <a:r>
+              <a:rPr lang="en-US" dirty="0">
+                <a:latin typeface="Helvetica Neue"/>
+              </a:rPr>
+              <a:t> </a:t>
+            </a:r>
+            <a:r>
+              <a:rPr lang="en-US" dirty="0" err="1">
+                <a:latin typeface="Helvetica Neue"/>
+              </a:rPr>
+              <a:t>có</a:t>
+            </a:r>
+            <a:r>
+              <a:rPr lang="en-US" dirty="0">
+                <a:latin typeface="Helvetica Neue"/>
+              </a:rPr>
+              <a:t> ý </a:t>
+            </a:r>
+            <a:r>
+              <a:rPr lang="en-US" dirty="0" err="1">
+                <a:latin typeface="Helvetica Neue"/>
+              </a:rPr>
+              <a:t>nghĩa</a:t>
+            </a:r>
+            <a:r>
+              <a:rPr lang="en-US" dirty="0">
+                <a:latin typeface="Helvetica Neue"/>
+              </a:rPr>
+              <a:t> </a:t>
+            </a:r>
+            <a:r>
+              <a:rPr lang="en-US" dirty="0" err="1">
+                <a:latin typeface="Helvetica Neue"/>
+              </a:rPr>
+              <a:t>khi</a:t>
+            </a:r>
+            <a:r>
+              <a:rPr lang="en-US" dirty="0">
+                <a:latin typeface="Helvetica Neue"/>
+              </a:rPr>
+              <a:t> </a:t>
+            </a:r>
+            <a:r>
+              <a:rPr lang="en-US" dirty="0" err="1">
+                <a:latin typeface="Helvetica Neue"/>
+              </a:rPr>
+              <a:t>huấn</a:t>
+            </a:r>
+            <a:r>
+              <a:rPr lang="en-US" dirty="0">
+                <a:latin typeface="Helvetica Neue"/>
+              </a:rPr>
+              <a:t> </a:t>
+            </a:r>
+            <a:r>
+              <a:rPr lang="en-US" dirty="0" err="1">
+                <a:latin typeface="Helvetica Neue"/>
+              </a:rPr>
+              <a:t>luyện</a:t>
+            </a:r>
+            <a:r>
+              <a:rPr lang="en-US" dirty="0">
+                <a:latin typeface="Helvetica Neue"/>
+              </a:rPr>
+              <a:t>.</a:t>
             </a:r>
           </a:p>
           <a:p>
@@ -19461,7 +19373,7 @@
               <a:rPr lang="en-US" dirty="0" err="1">
                 <a:latin typeface="Helvetica Neue"/>
               </a:rPr>
-              <a:t>các</a:t>
+              <a:t>hai</a:t>
             </a:r>
             <a:r>
               <a:rPr lang="en-US" dirty="0">
@@ -19479,13 +19391,13 @@
               <a:rPr lang="en-US" dirty="0">
                 <a:latin typeface="Helvetica Neue"/>
               </a:rPr>
-              <a:t> school, foreclosures, </a:t>
-            </a:r>
-            <a:r>
-              <a:rPr lang="en-US" dirty="0" err="1">
-                <a:latin typeface="Helvetica Neue"/>
-              </a:rPr>
-              <a:t>total_crime</a:t>
+              <a:t> </a:t>
+            </a:r>
+            <a:r>
+              <a:rPr lang="en-US" dirty="0" err="1">
+                <a:latin typeface="Helvetica Neue"/>
+              </a:rPr>
+              <a:t>taxes_land</a:t>
             </a:r>
             <a:r>
               <a:rPr lang="en-US" dirty="0">
@@ -19497,7 +19409,187 @@
               <a:rPr lang="en-US" dirty="0" err="1">
                 <a:latin typeface="Helvetica Neue"/>
               </a:rPr>
-              <a:t>violent_crime</a:t>
+              <a:t>taxes_improvements</a:t>
+            </a:r>
+            <a:r>
+              <a:rPr lang="en-US" dirty="0">
+                <a:latin typeface="Helvetica Neue"/>
+              </a:rPr>
+              <a:t>. </a:t>
+            </a:r>
+            <a:r>
+              <a:rPr lang="en-US" dirty="0" err="1">
+                <a:latin typeface="Helvetica Neue"/>
+              </a:rPr>
+              <a:t>Xóa</a:t>
+            </a:r>
+            <a:r>
+              <a:rPr lang="en-US" dirty="0">
+                <a:latin typeface="Helvetica Neue"/>
+              </a:rPr>
+              <a:t> </a:t>
+            </a:r>
+            <a:r>
+              <a:rPr lang="en-US" dirty="0" err="1">
+                <a:latin typeface="Helvetica Neue"/>
+              </a:rPr>
+              <a:t>cột</a:t>
+            </a:r>
+            <a:r>
+              <a:rPr lang="en-US" dirty="0">
+                <a:latin typeface="Helvetica Neue"/>
+              </a:rPr>
+              <a:t> </a:t>
+            </a:r>
+            <a:r>
+              <a:rPr lang="en-US" dirty="0" err="1">
+                <a:latin typeface="Helvetica Neue"/>
+              </a:rPr>
+              <a:t>taxes_total</a:t>
+            </a:r>
+            <a:r>
+              <a:rPr lang="en-US" dirty="0">
+                <a:latin typeface="Helvetica Neue"/>
+              </a:rPr>
+              <a:t>. </a:t>
+            </a:r>
+            <a:r>
+              <a:rPr lang="en-US" dirty="0" err="1">
+                <a:latin typeface="Helvetica Neue"/>
+              </a:rPr>
+              <a:t>Rút</a:t>
+            </a:r>
+            <a:r>
+              <a:rPr lang="en-US" dirty="0">
+                <a:latin typeface="Helvetica Neue"/>
+              </a:rPr>
+              <a:t> </a:t>
+            </a:r>
+            <a:r>
+              <a:rPr lang="en-US" dirty="0" err="1">
+                <a:latin typeface="Helvetica Neue"/>
+              </a:rPr>
+              <a:t>trích</a:t>
+            </a:r>
+            <a:r>
+              <a:rPr lang="en-US" dirty="0">
+                <a:latin typeface="Helvetica Neue"/>
+              </a:rPr>
+              <a:t> </a:t>
+            </a:r>
+            <a:r>
+              <a:rPr lang="en-US" dirty="0" err="1">
+                <a:latin typeface="Helvetica Neue"/>
+              </a:rPr>
+              <a:t>tiền</a:t>
+            </a:r>
+            <a:r>
+              <a:rPr lang="en-US" dirty="0">
+                <a:latin typeface="Helvetica Neue"/>
+              </a:rPr>
+              <a:t> </a:t>
+            </a:r>
+            <a:r>
+              <a:rPr lang="en-US" dirty="0" err="1">
+                <a:latin typeface="Helvetica Neue"/>
+              </a:rPr>
+              <a:t>từ</a:t>
+            </a:r>
+            <a:r>
+              <a:rPr lang="en-US" dirty="0">
+                <a:latin typeface="Helvetica Neue"/>
+              </a:rPr>
+              <a:t> </a:t>
+            </a:r>
+            <a:r>
+              <a:rPr lang="en-US" dirty="0" err="1">
+                <a:latin typeface="Helvetica Neue"/>
+              </a:rPr>
+              <a:t>taxes_taxes</a:t>
+            </a:r>
+            <a:r>
+              <a:rPr lang="en-US" dirty="0">
+                <a:latin typeface="Helvetica Neue"/>
+              </a:rPr>
+              <a:t> </a:t>
+            </a:r>
+            <a:r>
+              <a:rPr lang="en-US" dirty="0" err="1">
+                <a:latin typeface="Helvetica Neue"/>
+              </a:rPr>
+              <a:t>vì</a:t>
+            </a:r>
+            <a:r>
+              <a:rPr lang="en-US" dirty="0">
+                <a:latin typeface="Helvetica Neue"/>
+              </a:rPr>
+              <a:t> </a:t>
+            </a:r>
+            <a:r>
+              <a:rPr lang="en-US" dirty="0" err="1">
+                <a:latin typeface="Helvetica Neue"/>
+              </a:rPr>
+              <a:t>nó</a:t>
+            </a:r>
+            <a:r>
+              <a:rPr lang="en-US" dirty="0">
+                <a:latin typeface="Helvetica Neue"/>
+              </a:rPr>
+              <a:t> </a:t>
+            </a:r>
+            <a:r>
+              <a:rPr lang="en-US" dirty="0" err="1">
+                <a:latin typeface="Helvetica Neue"/>
+              </a:rPr>
+              <a:t>chứa</a:t>
+            </a:r>
+            <a:r>
+              <a:rPr lang="en-US" dirty="0">
+                <a:latin typeface="Helvetica Neue"/>
+              </a:rPr>
+              <a:t> </a:t>
+            </a:r>
+            <a:r>
+              <a:rPr lang="en-US" dirty="0" err="1">
+                <a:latin typeface="Helvetica Neue"/>
+              </a:rPr>
+              <a:t>cả</a:t>
+            </a:r>
+            <a:r>
+              <a:rPr lang="en-US" dirty="0">
+                <a:latin typeface="Helvetica Neue"/>
+              </a:rPr>
+              <a:t> </a:t>
+            </a:r>
+            <a:r>
+              <a:rPr lang="en-US" dirty="0" err="1">
+                <a:latin typeface="Helvetica Neue"/>
+              </a:rPr>
+              <a:t>thông</a:t>
+            </a:r>
+            <a:r>
+              <a:rPr lang="en-US" dirty="0">
+                <a:latin typeface="Helvetica Neue"/>
+              </a:rPr>
+              <a:t> tin </a:t>
+            </a:r>
+            <a:r>
+              <a:rPr lang="en-US" dirty="0" err="1">
+                <a:latin typeface="Helvetica Neue"/>
+              </a:rPr>
+              <a:t>dạng</a:t>
+            </a:r>
+            <a:r>
+              <a:rPr lang="en-US" dirty="0">
+                <a:latin typeface="Helvetica Neue"/>
+              </a:rPr>
+              <a:t> </a:t>
+            </a:r>
+            <a:r>
+              <a:rPr lang="en-US" dirty="0" err="1">
+                <a:latin typeface="Helvetica Neue"/>
+              </a:rPr>
+              <a:t>tiền</a:t>
             </a:r>
             <a:r>
               <a:rPr lang="en-US" dirty="0">
@@ -19515,19 +19607,31 @@
               <a:rPr lang="en-US" dirty="0">
                 <a:latin typeface="Helvetica Neue"/>
               </a:rPr>
-              <a:t> </a:t>
-            </a:r>
-            <a:r>
-              <a:rPr lang="en-US" dirty="0" err="1">
-                <a:latin typeface="Helvetica Neue"/>
-              </a:rPr>
-              <a:t>property_crime</a:t>
-            </a:r>
-            <a:r>
-              <a:rPr lang="en-US" dirty="0">
-                <a:latin typeface="Helvetica Neue"/>
-              </a:rPr>
-              <a:t>.</a:t>
+              <a:t> %, </a:t>
+            </a:r>
+            <a:r>
+              <a:rPr lang="en-US" dirty="0" err="1">
+                <a:latin typeface="Helvetica Neue"/>
+              </a:rPr>
+              <a:t>ví</a:t>
+            </a:r>
+            <a:r>
+              <a:rPr lang="en-US" dirty="0">
+                <a:latin typeface="Helvetica Neue"/>
+              </a:rPr>
+              <a:t> </a:t>
+            </a:r>
+            <a:r>
+              <a:rPr lang="en-US" dirty="0" err="1">
+                <a:latin typeface="Helvetica Neue"/>
+              </a:rPr>
+              <a:t>dụ</a:t>
+            </a:r>
+            <a:r>
+              <a:rPr lang="en-US" dirty="0">
+                <a:latin typeface="Helvetica Neue"/>
+              </a:rPr>
+              <a:t>: 6969 (1.23 %).</a:t>
             </a:r>
           </a:p>
           <a:p>
@@ -19541,6 +19645,115 @@
                 <a:latin typeface="Helvetica Neue"/>
               </a:rPr>
               <a:t>10. </a:t>
+            </a:r>
+            <a:r>
+              <a:rPr lang="en-US" dirty="0" err="1">
+                <a:latin typeface="Helvetica Neue"/>
+              </a:rPr>
+              <a:t>Giữ</a:t>
+            </a:r>
+            <a:r>
+              <a:rPr lang="en-US" dirty="0">
+                <a:latin typeface="Helvetica Neue"/>
+              </a:rPr>
+              <a:t> </a:t>
+            </a:r>
+            <a:r>
+              <a:rPr lang="en-US" dirty="0" err="1">
+                <a:latin typeface="Helvetica Neue"/>
+              </a:rPr>
+              <a:t>nguyên</a:t>
+            </a:r>
+            <a:r>
+              <a:rPr lang="en-US" dirty="0">
+                <a:latin typeface="Helvetica Neue"/>
+              </a:rPr>
+              <a:t> </a:t>
+            </a:r>
+            <a:r>
+              <a:rPr lang="en-US" dirty="0" err="1">
+                <a:latin typeface="Helvetica Neue"/>
+              </a:rPr>
+              <a:t>các</a:t>
+            </a:r>
+            <a:r>
+              <a:rPr lang="en-US" dirty="0">
+                <a:latin typeface="Helvetica Neue"/>
+              </a:rPr>
+              <a:t> </a:t>
+            </a:r>
+            <a:r>
+              <a:rPr lang="en-US" dirty="0" err="1">
+                <a:latin typeface="Helvetica Neue"/>
+              </a:rPr>
+              <a:t>cột</a:t>
+            </a:r>
+            <a:r>
+              <a:rPr lang="en-US" dirty="0">
+                <a:latin typeface="Helvetica Neue"/>
+              </a:rPr>
+              <a:t> school, foreclosures, </a:t>
+            </a:r>
+            <a:r>
+              <a:rPr lang="en-US" dirty="0" err="1">
+                <a:latin typeface="Helvetica Neue"/>
+              </a:rPr>
+              <a:t>total_crime</a:t>
+            </a:r>
+            <a:r>
+              <a:rPr lang="en-US" dirty="0">
+                <a:latin typeface="Helvetica Neue"/>
+              </a:rPr>
+              <a:t>, </a:t>
+            </a:r>
+            <a:r>
+              <a:rPr lang="en-US" dirty="0" err="1">
+                <a:latin typeface="Helvetica Neue"/>
+              </a:rPr>
+              <a:t>violent_crime</a:t>
+            </a:r>
+            <a:r>
+              <a:rPr lang="en-US" dirty="0">
+                <a:latin typeface="Helvetica Neue"/>
+              </a:rPr>
+              <a:t> </a:t>
+            </a:r>
+            <a:r>
+              <a:rPr lang="en-US" dirty="0" err="1">
+                <a:latin typeface="Helvetica Neue"/>
+              </a:rPr>
+              <a:t>và</a:t>
+            </a:r>
+            <a:r>
+              <a:rPr lang="en-US" dirty="0">
+                <a:latin typeface="Helvetica Neue"/>
+              </a:rPr>
+              <a:t> </a:t>
+            </a:r>
+            <a:r>
+              <a:rPr lang="en-US" dirty="0" err="1">
+                <a:latin typeface="Helvetica Neue"/>
+              </a:rPr>
+              <a:t>property_crime</a:t>
+            </a:r>
+            <a:r>
+              <a:rPr lang="en-US" dirty="0">
+                <a:latin typeface="Helvetica Neue"/>
+              </a:rPr>
+              <a:t>.</a:t>
+            </a:r>
+          </a:p>
+          <a:p>
+            <a:pPr algn="just">
+              <a:spcAft>
+                <a:spcPts val="600"/>
+              </a:spcAft>
+            </a:pPr>
+            <a:r>
+              <a:rPr lang="en-US" dirty="0">
+                <a:latin typeface="Helvetica Neue"/>
+              </a:rPr>
+              <a:t>11. </a:t>
             </a:r>
             <a:r>
               <a:rPr lang="en-US" dirty="0" err="1">
@@ -19999,8 +20212,8 @@
         </p:nvSpPr>
         <p:spPr>
           <a:xfrm>
-            <a:off x="589935" y="710115"/>
-            <a:ext cx="11155532" cy="1908215"/>
+            <a:off x="442844" y="710115"/>
+            <a:ext cx="11302623" cy="1908215"/>
           </a:xfrm>
           <a:prstGeom prst="rect">
             <a:avLst/>
@@ -21010,8 +21223,8 @@
         </p:nvSpPr>
         <p:spPr>
           <a:xfrm>
-            <a:off x="589935" y="3106949"/>
-            <a:ext cx="11155532" cy="1785104"/>
+            <a:off x="442844" y="2722518"/>
+            <a:ext cx="11302621" cy="1785104"/>
           </a:xfrm>
           <a:prstGeom prst="rect">
             <a:avLst/>
@@ -21563,6 +21776,921 @@
             </a:r>
             <a:r>
               <a:rPr lang="en-US" dirty="0">
+                <a:latin typeface="Helvetica Neue"/>
+              </a:rPr>
+              <a:t>.</a:t>
+            </a:r>
+          </a:p>
+        </p:txBody>
+      </p:sp>
+      <p:sp>
+        <p:nvSpPr>
+          <p:cNvPr id="10" name="Rectangle 9">
+            <a:extLst>
+              <a:ext uri="{FF2B5EF4-FFF2-40B4-BE49-F238E27FC236}">
+                <a16:creationId xmlns:a16="http://schemas.microsoft.com/office/drawing/2014/main" id="{35D09FE0-830C-4386-86EB-02D7BF2C883A}"/>
+              </a:ext>
+            </a:extLst>
+          </p:cNvPr>
+          <p:cNvSpPr/>
+          <p:nvPr/>
+        </p:nvSpPr>
+        <p:spPr>
+          <a:xfrm>
+            <a:off x="442845" y="4688562"/>
+            <a:ext cx="11377577" cy="1785104"/>
+          </a:xfrm>
+          <a:prstGeom prst="rect">
+            <a:avLst/>
+          </a:prstGeom>
+          <a:ln>
+            <a:solidFill>
+              <a:srgbClr val="FF0000"/>
+            </a:solidFill>
+          </a:ln>
+        </p:spPr>
+        <p:txBody>
+          <a:bodyPr wrap="square">
+            <a:spAutoFit/>
+          </a:bodyPr>
+          <a:lstStyle/>
+          <a:p>
+            <a:pPr algn="just">
+              <a:spcAft>
+                <a:spcPts val="600"/>
+              </a:spcAft>
+            </a:pPr>
+            <a:r>
+              <a:rPr lang="en-US" b="1" dirty="0" err="1">
+                <a:latin typeface="Helvetica Neue"/>
+              </a:rPr>
+              <a:t>Các</a:t>
+            </a:r>
+            <a:r>
+              <a:rPr lang="en-US" b="1" dirty="0">
+                <a:latin typeface="Helvetica Neue"/>
+              </a:rPr>
+              <a:t> </a:t>
+            </a:r>
+            <a:r>
+              <a:rPr lang="en-US" b="1" dirty="0" err="1">
+                <a:latin typeface="Helvetica Neue"/>
+              </a:rPr>
+              <a:t>siêu</a:t>
+            </a:r>
+            <a:r>
+              <a:rPr lang="en-US" b="1" dirty="0">
+                <a:latin typeface="Helvetica Neue"/>
+              </a:rPr>
+              <a:t> </a:t>
+            </a:r>
+            <a:r>
+              <a:rPr lang="en-US" b="1" dirty="0" err="1">
+                <a:latin typeface="Helvetica Neue"/>
+              </a:rPr>
+              <a:t>tham</a:t>
+            </a:r>
+            <a:r>
+              <a:rPr lang="en-US" b="1" dirty="0">
+                <a:latin typeface="Helvetica Neue"/>
+              </a:rPr>
+              <a:t> </a:t>
+            </a:r>
+            <a:r>
+              <a:rPr lang="en-US" b="1" dirty="0" err="1">
+                <a:latin typeface="Helvetica Neue"/>
+              </a:rPr>
+              <a:t>số</a:t>
+            </a:r>
+            <a:r>
+              <a:rPr lang="en-US" b="1" dirty="0">
+                <a:latin typeface="Helvetica Neue"/>
+              </a:rPr>
+              <a:t> </a:t>
+            </a:r>
+            <a:r>
+              <a:rPr lang="en-US" b="1" dirty="0" err="1">
+                <a:latin typeface="Helvetica Neue"/>
+              </a:rPr>
+              <a:t>cần</a:t>
+            </a:r>
+            <a:r>
+              <a:rPr lang="en-US" b="1" dirty="0">
+                <a:latin typeface="Helvetica Neue"/>
+              </a:rPr>
+              <a:t> l</a:t>
+            </a:r>
+            <a:r>
+              <a:rPr lang="vi-VN" b="1" dirty="0">
+                <a:latin typeface="Helvetica Neue"/>
+              </a:rPr>
+              <a:t>ư</a:t>
+            </a:r>
+            <a:r>
+              <a:rPr lang="en-US" b="1" dirty="0">
+                <a:latin typeface="Helvetica Neue"/>
+              </a:rPr>
+              <a:t>u ý:</a:t>
+            </a:r>
+          </a:p>
+          <a:p>
+            <a:pPr marL="285750" indent="-285750" algn="just">
+              <a:spcAft>
+                <a:spcPts val="600"/>
+              </a:spcAft>
+              <a:buFontTx/>
+              <a:buChar char="-"/>
+            </a:pPr>
+            <a:r>
+              <a:rPr lang="en-US" dirty="0" err="1">
+                <a:solidFill>
+                  <a:srgbClr val="002060"/>
+                </a:solidFill>
+                <a:latin typeface="Helvetica Neue"/>
+              </a:rPr>
+              <a:t>month_to_season</a:t>
+            </a:r>
+            <a:r>
+              <a:rPr lang="en-US" dirty="0">
+                <a:solidFill>
+                  <a:srgbClr val="002060"/>
+                </a:solidFill>
+                <a:latin typeface="Helvetica Neue"/>
+              </a:rPr>
+              <a:t>: </a:t>
+            </a:r>
+            <a:r>
+              <a:rPr lang="en-US" dirty="0" err="1">
+                <a:latin typeface="Helvetica Neue"/>
+              </a:rPr>
+              <a:t>có</a:t>
+            </a:r>
+            <a:r>
+              <a:rPr lang="en-US" dirty="0">
+                <a:latin typeface="Helvetica Neue"/>
+              </a:rPr>
+              <a:t> </a:t>
+            </a:r>
+            <a:r>
+              <a:rPr lang="en-US" dirty="0" err="1">
+                <a:latin typeface="Helvetica Neue"/>
+              </a:rPr>
+              <a:t>chuyển</a:t>
+            </a:r>
+            <a:r>
+              <a:rPr lang="en-US" dirty="0">
+                <a:latin typeface="Helvetica Neue"/>
+              </a:rPr>
+              <a:t> </a:t>
+            </a:r>
+            <a:r>
+              <a:rPr lang="en-US" dirty="0" err="1">
+                <a:latin typeface="Helvetica Neue"/>
+              </a:rPr>
+              <a:t>tháng</a:t>
+            </a:r>
+            <a:r>
+              <a:rPr lang="en-US" dirty="0">
+                <a:latin typeface="Helvetica Neue"/>
+              </a:rPr>
+              <a:t> </a:t>
+            </a:r>
+            <a:r>
+              <a:rPr lang="en-US" dirty="0" err="1">
+                <a:latin typeface="Helvetica Neue"/>
+              </a:rPr>
+              <a:t>bán</a:t>
+            </a:r>
+            <a:r>
+              <a:rPr lang="en-US" dirty="0">
+                <a:latin typeface="Helvetica Neue"/>
+              </a:rPr>
+              <a:t> </a:t>
+            </a:r>
+            <a:r>
+              <a:rPr lang="en-US" dirty="0" err="1">
+                <a:latin typeface="Helvetica Neue"/>
+              </a:rPr>
+              <a:t>nhà</a:t>
+            </a:r>
+            <a:r>
+              <a:rPr lang="en-US" dirty="0">
+                <a:latin typeface="Helvetica Neue"/>
+              </a:rPr>
+              <a:t> </a:t>
+            </a:r>
+            <a:r>
+              <a:rPr lang="en-US" dirty="0" err="1">
+                <a:latin typeface="Helvetica Neue"/>
+              </a:rPr>
+              <a:t>thành</a:t>
+            </a:r>
+            <a:r>
+              <a:rPr lang="en-US" dirty="0">
+                <a:latin typeface="Helvetica Neue"/>
+              </a:rPr>
+              <a:t> </a:t>
+            </a:r>
+            <a:r>
+              <a:rPr lang="en-US" dirty="0" err="1">
+                <a:latin typeface="Helvetica Neue"/>
+              </a:rPr>
+              <a:t>bán</a:t>
+            </a:r>
+            <a:r>
+              <a:rPr lang="en-US" dirty="0">
+                <a:latin typeface="Helvetica Neue"/>
+              </a:rPr>
+              <a:t> </a:t>
+            </a:r>
+            <a:r>
+              <a:rPr lang="en-US" dirty="0" err="1">
+                <a:latin typeface="Helvetica Neue"/>
+              </a:rPr>
+              <a:t>nhà</a:t>
+            </a:r>
+            <a:r>
+              <a:rPr lang="en-US" dirty="0">
+                <a:latin typeface="Helvetica Neue"/>
+              </a:rPr>
+              <a:t> </a:t>
+            </a:r>
+            <a:r>
+              <a:rPr lang="en-US" dirty="0" err="1">
+                <a:latin typeface="Helvetica Neue"/>
+              </a:rPr>
+              <a:t>theo</a:t>
+            </a:r>
+            <a:r>
+              <a:rPr lang="en-US" dirty="0">
+                <a:latin typeface="Helvetica Neue"/>
+              </a:rPr>
+              <a:t> </a:t>
+            </a:r>
+            <a:r>
+              <a:rPr lang="en-US" dirty="0" err="1">
+                <a:latin typeface="Helvetica Neue"/>
+              </a:rPr>
+              <a:t>bốn</a:t>
+            </a:r>
+            <a:r>
+              <a:rPr lang="en-US" dirty="0">
+                <a:latin typeface="Helvetica Neue"/>
+              </a:rPr>
+              <a:t> </a:t>
+            </a:r>
+            <a:r>
+              <a:rPr lang="en-US" dirty="0" err="1">
+                <a:latin typeface="Helvetica Neue"/>
+              </a:rPr>
+              <a:t>mùa</a:t>
+            </a:r>
+            <a:r>
+              <a:rPr lang="en-US" dirty="0">
+                <a:latin typeface="Helvetica Neue"/>
+              </a:rPr>
+              <a:t>? (True/False).</a:t>
+            </a:r>
+          </a:p>
+          <a:p>
+            <a:pPr marL="285750" indent="-285750" algn="just">
+              <a:spcAft>
+                <a:spcPts val="600"/>
+              </a:spcAft>
+              <a:buFontTx/>
+              <a:buChar char="-"/>
+            </a:pPr>
+            <a:r>
+              <a:rPr lang="en-US" dirty="0" err="1">
+                <a:solidFill>
+                  <a:srgbClr val="002060"/>
+                </a:solidFill>
+                <a:latin typeface="Helvetica Neue"/>
+              </a:rPr>
+              <a:t>year_to_period</a:t>
+            </a:r>
+            <a:r>
+              <a:rPr lang="en-US" dirty="0">
+                <a:latin typeface="Helvetica Neue"/>
+              </a:rPr>
+              <a:t>: </a:t>
+            </a:r>
+            <a:r>
+              <a:rPr lang="en-US" dirty="0" err="1">
+                <a:latin typeface="Helvetica Neue"/>
+              </a:rPr>
+              <a:t>có</a:t>
+            </a:r>
+            <a:r>
+              <a:rPr lang="en-US" dirty="0">
+                <a:latin typeface="Helvetica Neue"/>
+              </a:rPr>
+              <a:t> </a:t>
+            </a:r>
+            <a:r>
+              <a:rPr lang="en-US" dirty="0" err="1">
+                <a:latin typeface="Helvetica Neue"/>
+              </a:rPr>
+              <a:t>chuyển</a:t>
+            </a:r>
+            <a:r>
+              <a:rPr lang="en-US" dirty="0">
+                <a:latin typeface="Helvetica Neue"/>
+              </a:rPr>
+              <a:t> </a:t>
+            </a:r>
+            <a:r>
+              <a:rPr lang="en-US" dirty="0" err="1">
+                <a:latin typeface="Helvetica Neue"/>
+              </a:rPr>
+              <a:t>thời</a:t>
+            </a:r>
+            <a:r>
+              <a:rPr lang="en-US" dirty="0">
+                <a:latin typeface="Helvetica Neue"/>
+              </a:rPr>
+              <a:t> </a:t>
+            </a:r>
+            <a:r>
+              <a:rPr lang="en-US" dirty="0" err="1">
+                <a:latin typeface="Helvetica Neue"/>
+              </a:rPr>
+              <a:t>gian</a:t>
+            </a:r>
+            <a:r>
+              <a:rPr lang="en-US" dirty="0">
+                <a:latin typeface="Helvetica Neue"/>
+              </a:rPr>
+              <a:t> </a:t>
+            </a:r>
+            <a:r>
+              <a:rPr lang="en-US" dirty="0" err="1">
+                <a:latin typeface="Helvetica Neue"/>
+              </a:rPr>
+              <a:t>xây</a:t>
+            </a:r>
+            <a:r>
+              <a:rPr lang="en-US" dirty="0">
+                <a:latin typeface="Helvetica Neue"/>
+              </a:rPr>
+              <a:t> </a:t>
+            </a:r>
+            <a:r>
+              <a:rPr lang="en-US" dirty="0" err="1">
+                <a:latin typeface="Helvetica Neue"/>
+              </a:rPr>
+              <a:t>nhà</a:t>
+            </a:r>
+            <a:r>
+              <a:rPr lang="en-US" dirty="0">
+                <a:latin typeface="Helvetica Neue"/>
+              </a:rPr>
+              <a:t> </a:t>
+            </a:r>
+            <a:r>
+              <a:rPr lang="en-US" dirty="0" err="1">
+                <a:latin typeface="Helvetica Neue"/>
+              </a:rPr>
+              <a:t>thành</a:t>
+            </a:r>
+            <a:r>
+              <a:rPr lang="en-US" dirty="0">
+                <a:latin typeface="Helvetica Neue"/>
+              </a:rPr>
+              <a:t> </a:t>
+            </a:r>
+            <a:r>
+              <a:rPr lang="en-US" dirty="0" err="1">
+                <a:latin typeface="Helvetica Neue"/>
+              </a:rPr>
+              <a:t>các</a:t>
+            </a:r>
+            <a:r>
+              <a:rPr lang="en-US" dirty="0">
+                <a:latin typeface="Helvetica Neue"/>
+              </a:rPr>
+              <a:t> </a:t>
+            </a:r>
+            <a:r>
+              <a:rPr lang="en-US" dirty="0" err="1">
+                <a:latin typeface="Helvetica Neue"/>
+              </a:rPr>
+              <a:t>khoảng</a:t>
+            </a:r>
+            <a:r>
+              <a:rPr lang="en-US" dirty="0">
+                <a:latin typeface="Helvetica Neue"/>
+              </a:rPr>
+              <a:t> </a:t>
+            </a:r>
+            <a:r>
+              <a:rPr lang="en-US" dirty="0" err="1">
+                <a:latin typeface="Helvetica Neue"/>
+              </a:rPr>
+              <a:t>thời</a:t>
+            </a:r>
+            <a:r>
+              <a:rPr lang="en-US" dirty="0">
+                <a:latin typeface="Helvetica Neue"/>
+              </a:rPr>
+              <a:t> </a:t>
+            </a:r>
+            <a:r>
+              <a:rPr lang="en-US" dirty="0" err="1">
+                <a:latin typeface="Helvetica Neue"/>
+              </a:rPr>
+              <a:t>gian</a:t>
+            </a:r>
+            <a:r>
+              <a:rPr lang="en-US" dirty="0">
+                <a:latin typeface="Helvetica Neue"/>
+              </a:rPr>
+              <a:t> </a:t>
+            </a:r>
+            <a:r>
+              <a:rPr lang="en-US" dirty="0" err="1">
+                <a:latin typeface="Helvetica Neue"/>
+              </a:rPr>
+              <a:t>mà</a:t>
+            </a:r>
+            <a:r>
+              <a:rPr lang="en-US" dirty="0">
+                <a:latin typeface="Helvetica Neue"/>
+              </a:rPr>
+              <a:t> </a:t>
+            </a:r>
+            <a:r>
+              <a:rPr lang="en-US" dirty="0" err="1">
+                <a:latin typeface="Helvetica Neue"/>
+              </a:rPr>
+              <a:t>nhóm</a:t>
+            </a:r>
+            <a:r>
+              <a:rPr lang="en-US" dirty="0">
+                <a:latin typeface="Helvetica Neue"/>
+              </a:rPr>
+              <a:t> </a:t>
+            </a:r>
+            <a:r>
+              <a:rPr lang="en-US" dirty="0" err="1">
+                <a:latin typeface="Helvetica Neue"/>
+              </a:rPr>
+              <a:t>cho</a:t>
+            </a:r>
+            <a:r>
+              <a:rPr lang="en-US" dirty="0">
+                <a:latin typeface="Helvetica Neue"/>
+              </a:rPr>
+              <a:t> tr</a:t>
+            </a:r>
+            <a:r>
+              <a:rPr lang="vi-VN" dirty="0">
+                <a:latin typeface="Helvetica Neue"/>
+              </a:rPr>
+              <a:t>ư</a:t>
+            </a:r>
+            <a:r>
+              <a:rPr lang="en-US" dirty="0" err="1">
+                <a:latin typeface="Helvetica Neue"/>
+              </a:rPr>
+              <a:t>ớc</a:t>
+            </a:r>
+            <a:r>
+              <a:rPr lang="en-US" dirty="0">
+                <a:latin typeface="Helvetica Neue"/>
+              </a:rPr>
+              <a:t>? (True/False).</a:t>
+            </a:r>
+          </a:p>
+          <a:p>
+            <a:pPr marL="285750" indent="-285750" algn="just">
+              <a:spcAft>
+                <a:spcPts val="600"/>
+              </a:spcAft>
+              <a:buFontTx/>
+              <a:buChar char="-"/>
+            </a:pPr>
+            <a:r>
+              <a:rPr lang="en-US" dirty="0" err="1">
+                <a:solidFill>
+                  <a:srgbClr val="002060"/>
+                </a:solidFill>
+                <a:latin typeface="Helvetica Neue"/>
+              </a:rPr>
+              <a:t>num_top_types</a:t>
+            </a:r>
+            <a:r>
+              <a:rPr lang="en-US" dirty="0">
+                <a:latin typeface="Helvetica Neue"/>
+              </a:rPr>
+              <a:t>: </a:t>
+            </a:r>
+            <a:r>
+              <a:rPr lang="en-US" dirty="0" err="1">
+                <a:latin typeface="Helvetica Neue"/>
+              </a:rPr>
+              <a:t>số</a:t>
+            </a:r>
+            <a:r>
+              <a:rPr lang="en-US" dirty="0">
+                <a:latin typeface="Helvetica Neue"/>
+              </a:rPr>
+              <a:t> l</a:t>
+            </a:r>
+            <a:r>
+              <a:rPr lang="vi-VN" dirty="0">
+                <a:latin typeface="Helvetica Neue"/>
+              </a:rPr>
+              <a:t>ư</a:t>
+            </a:r>
+            <a:r>
+              <a:rPr lang="en-US" dirty="0" err="1">
+                <a:latin typeface="Helvetica Neue"/>
+              </a:rPr>
+              <a:t>ợng</a:t>
+            </a:r>
+            <a:r>
+              <a:rPr lang="en-US" dirty="0">
+                <a:latin typeface="Helvetica Neue"/>
+              </a:rPr>
+              <a:t> top types </a:t>
+            </a:r>
+            <a:r>
+              <a:rPr lang="en-US" dirty="0" err="1">
+                <a:latin typeface="Helvetica Neue"/>
+              </a:rPr>
+              <a:t>nh</a:t>
+            </a:r>
+            <a:r>
+              <a:rPr lang="vi-VN" dirty="0">
+                <a:latin typeface="Helvetica Neue"/>
+              </a:rPr>
+              <a:t>ư</a:t>
+            </a:r>
+            <a:r>
+              <a:rPr lang="en-US" dirty="0">
+                <a:latin typeface="Helvetica Neue"/>
+              </a:rPr>
+              <a:t> BT03 (</a:t>
+            </a:r>
+            <a:r>
+              <a:rPr lang="en-US" dirty="0" err="1">
+                <a:latin typeface="Helvetica Neue"/>
+              </a:rPr>
+              <a:t>số</a:t>
+            </a:r>
+            <a:r>
+              <a:rPr lang="en-US" dirty="0">
+                <a:latin typeface="Helvetica Neue"/>
+              </a:rPr>
+              <a:t> </a:t>
+            </a:r>
+            <a:r>
+              <a:rPr lang="en-US" dirty="0" err="1">
+                <a:latin typeface="Helvetica Neue"/>
+              </a:rPr>
+              <a:t>nguyên</a:t>
+            </a:r>
+            <a:r>
+              <a:rPr lang="en-US" dirty="0">
+                <a:latin typeface="Helvetica Neue"/>
+              </a:rPr>
+              <a:t> </a:t>
+            </a:r>
+            <a:r>
+              <a:rPr lang="en-US" dirty="0" err="1">
+                <a:latin typeface="Helvetica Neue"/>
+              </a:rPr>
+              <a:t>dương</a:t>
+            </a:r>
+            <a:r>
+              <a:rPr lang="en-US" dirty="0">
+                <a:latin typeface="Helvetica Neue"/>
+              </a:rPr>
+              <a:t>).</a:t>
+            </a:r>
+          </a:p>
+          <a:p>
+            <a:pPr algn="just">
+              <a:spcAft>
+                <a:spcPts val="600"/>
+              </a:spcAft>
+            </a:pPr>
+            <a:r>
+              <a:rPr lang="en-US" dirty="0" err="1">
+                <a:solidFill>
+                  <a:schemeClr val="accent6">
+                    <a:lumMod val="75000"/>
+                  </a:schemeClr>
+                </a:solidFill>
+                <a:latin typeface="Helvetica Neue"/>
+              </a:rPr>
+              <a:t>Các</a:t>
+            </a:r>
+            <a:r>
+              <a:rPr lang="en-US" dirty="0">
+                <a:solidFill>
+                  <a:schemeClr val="accent6">
+                    <a:lumMod val="75000"/>
+                  </a:schemeClr>
+                </a:solidFill>
+                <a:latin typeface="Helvetica Neue"/>
+              </a:rPr>
+              <a:t> </a:t>
+            </a:r>
+            <a:r>
+              <a:rPr lang="en-US" dirty="0" err="1">
+                <a:solidFill>
+                  <a:schemeClr val="accent6">
+                    <a:lumMod val="75000"/>
+                  </a:schemeClr>
+                </a:solidFill>
+                <a:latin typeface="Helvetica Neue"/>
+              </a:rPr>
+              <a:t>siêu</a:t>
+            </a:r>
+            <a:r>
+              <a:rPr lang="en-US" dirty="0">
+                <a:solidFill>
+                  <a:schemeClr val="accent6">
+                    <a:lumMod val="75000"/>
+                  </a:schemeClr>
+                </a:solidFill>
+                <a:latin typeface="Helvetica Neue"/>
+              </a:rPr>
+              <a:t> </a:t>
+            </a:r>
+            <a:r>
+              <a:rPr lang="en-US" dirty="0" err="1">
+                <a:solidFill>
+                  <a:schemeClr val="accent6">
+                    <a:lumMod val="75000"/>
+                  </a:schemeClr>
+                </a:solidFill>
+                <a:latin typeface="Helvetica Neue"/>
+              </a:rPr>
+              <a:t>tham</a:t>
+            </a:r>
+            <a:r>
+              <a:rPr lang="en-US" dirty="0">
+                <a:solidFill>
+                  <a:schemeClr val="accent6">
+                    <a:lumMod val="75000"/>
+                  </a:schemeClr>
+                </a:solidFill>
+                <a:latin typeface="Helvetica Neue"/>
+              </a:rPr>
+              <a:t> </a:t>
+            </a:r>
+            <a:r>
+              <a:rPr lang="en-US" dirty="0" err="1">
+                <a:solidFill>
+                  <a:schemeClr val="accent6">
+                    <a:lumMod val="75000"/>
+                  </a:schemeClr>
+                </a:solidFill>
+                <a:latin typeface="Helvetica Neue"/>
+              </a:rPr>
+              <a:t>số</a:t>
+            </a:r>
+            <a:r>
+              <a:rPr lang="en-US" dirty="0">
+                <a:solidFill>
+                  <a:schemeClr val="accent6">
+                    <a:lumMod val="75000"/>
+                  </a:schemeClr>
+                </a:solidFill>
+                <a:latin typeface="Helvetica Neue"/>
+              </a:rPr>
+              <a:t> </a:t>
+            </a:r>
+            <a:r>
+              <a:rPr lang="en-US" dirty="0" err="1">
+                <a:solidFill>
+                  <a:schemeClr val="accent6">
+                    <a:lumMod val="75000"/>
+                  </a:schemeClr>
+                </a:solidFill>
+                <a:latin typeface="Helvetica Neue"/>
+              </a:rPr>
+              <a:t>này</a:t>
+            </a:r>
+            <a:r>
+              <a:rPr lang="en-US" dirty="0">
+                <a:solidFill>
+                  <a:schemeClr val="accent6">
+                    <a:lumMod val="75000"/>
+                  </a:schemeClr>
+                </a:solidFill>
+                <a:latin typeface="Helvetica Neue"/>
+              </a:rPr>
+              <a:t> </a:t>
+            </a:r>
+            <a:r>
+              <a:rPr lang="en-US" dirty="0" err="1">
+                <a:solidFill>
+                  <a:schemeClr val="accent6">
+                    <a:lumMod val="75000"/>
+                  </a:schemeClr>
+                </a:solidFill>
+                <a:latin typeface="Helvetica Neue"/>
+              </a:rPr>
+              <a:t>cũng</a:t>
+            </a:r>
+            <a:r>
+              <a:rPr lang="en-US" dirty="0">
+                <a:solidFill>
+                  <a:schemeClr val="accent6">
+                    <a:lumMod val="75000"/>
+                  </a:schemeClr>
+                </a:solidFill>
+                <a:latin typeface="Helvetica Neue"/>
+              </a:rPr>
+              <a:t> </a:t>
+            </a:r>
+            <a:r>
+              <a:rPr lang="en-US" dirty="0" err="1">
+                <a:solidFill>
+                  <a:schemeClr val="accent6">
+                    <a:lumMod val="75000"/>
+                  </a:schemeClr>
+                </a:solidFill>
+                <a:latin typeface="Helvetica Neue"/>
+              </a:rPr>
+              <a:t>sẽ</a:t>
+            </a:r>
+            <a:r>
+              <a:rPr lang="en-US" dirty="0">
+                <a:solidFill>
+                  <a:schemeClr val="accent6">
+                    <a:lumMod val="75000"/>
+                  </a:schemeClr>
+                </a:solidFill>
+                <a:latin typeface="Helvetica Neue"/>
+              </a:rPr>
+              <a:t> đ</a:t>
+            </a:r>
+            <a:r>
+              <a:rPr lang="vi-VN" dirty="0">
+                <a:solidFill>
+                  <a:schemeClr val="accent6">
+                    <a:lumMod val="75000"/>
+                  </a:schemeClr>
+                </a:solidFill>
+                <a:latin typeface="Helvetica Neue"/>
+              </a:rPr>
+              <a:t>ư</a:t>
+            </a:r>
+            <a:r>
+              <a:rPr lang="en-US" dirty="0" err="1">
+                <a:solidFill>
+                  <a:schemeClr val="accent6">
+                    <a:lumMod val="75000"/>
+                  </a:schemeClr>
+                </a:solidFill>
+                <a:latin typeface="Helvetica Neue"/>
+              </a:rPr>
+              <a:t>ợc</a:t>
+            </a:r>
+            <a:r>
+              <a:rPr lang="en-US" dirty="0">
+                <a:solidFill>
+                  <a:schemeClr val="accent6">
+                    <a:lumMod val="75000"/>
+                  </a:schemeClr>
+                </a:solidFill>
+                <a:latin typeface="Helvetica Neue"/>
+              </a:rPr>
+              <a:t> </a:t>
+            </a:r>
+            <a:r>
+              <a:rPr lang="en-US" dirty="0" err="1">
+                <a:solidFill>
+                  <a:schemeClr val="accent6">
+                    <a:lumMod val="75000"/>
+                  </a:schemeClr>
+                </a:solidFill>
+                <a:latin typeface="Helvetica Neue"/>
+              </a:rPr>
+              <a:t>học</a:t>
+            </a:r>
+            <a:r>
+              <a:rPr lang="en-US" dirty="0">
+                <a:solidFill>
+                  <a:schemeClr val="accent6">
+                    <a:lumMod val="75000"/>
+                  </a:schemeClr>
+                </a:solidFill>
+                <a:latin typeface="Helvetica Neue"/>
+              </a:rPr>
+              <a:t> </a:t>
+            </a:r>
+            <a:r>
+              <a:rPr lang="en-US" dirty="0" err="1">
+                <a:solidFill>
+                  <a:schemeClr val="accent6">
+                    <a:lumMod val="75000"/>
+                  </a:schemeClr>
+                </a:solidFill>
+                <a:latin typeface="Helvetica Neue"/>
+              </a:rPr>
+              <a:t>trong</a:t>
+            </a:r>
+            <a:r>
+              <a:rPr lang="en-US" dirty="0">
+                <a:solidFill>
+                  <a:schemeClr val="accent6">
+                    <a:lumMod val="75000"/>
+                  </a:schemeClr>
+                </a:solidFill>
+                <a:latin typeface="Helvetica Neue"/>
+              </a:rPr>
+              <a:t> </a:t>
+            </a:r>
+            <a:r>
+              <a:rPr lang="en-US" dirty="0" err="1">
+                <a:solidFill>
+                  <a:schemeClr val="accent6">
+                    <a:lumMod val="75000"/>
+                  </a:schemeClr>
+                </a:solidFill>
+                <a:latin typeface="Helvetica Neue"/>
+              </a:rPr>
+              <a:t>mô</a:t>
+            </a:r>
+            <a:r>
+              <a:rPr lang="en-US" dirty="0">
+                <a:solidFill>
+                  <a:schemeClr val="accent6">
+                    <a:lumMod val="75000"/>
+                  </a:schemeClr>
+                </a:solidFill>
+                <a:latin typeface="Helvetica Neue"/>
+              </a:rPr>
+              <a:t> </a:t>
+            </a:r>
+            <a:r>
+              <a:rPr lang="en-US" dirty="0" err="1">
+                <a:solidFill>
+                  <a:schemeClr val="accent6">
+                    <a:lumMod val="75000"/>
+                  </a:schemeClr>
+                </a:solidFill>
+                <a:latin typeface="Helvetica Neue"/>
+              </a:rPr>
+              <a:t>hình</a:t>
+            </a:r>
+            <a:r>
+              <a:rPr lang="en-US" dirty="0">
+                <a:solidFill>
+                  <a:schemeClr val="accent6">
+                    <a:lumMod val="75000"/>
+                  </a:schemeClr>
+                </a:solidFill>
+                <a:latin typeface="Helvetica Neue"/>
+              </a:rPr>
+              <a:t> </a:t>
+            </a:r>
+            <a:r>
+              <a:rPr lang="en-US" dirty="0" err="1">
+                <a:solidFill>
+                  <a:schemeClr val="accent6">
+                    <a:lumMod val="75000"/>
+                  </a:schemeClr>
+                </a:solidFill>
+                <a:latin typeface="Helvetica Neue"/>
+              </a:rPr>
+              <a:t>máy</a:t>
+            </a:r>
+            <a:r>
+              <a:rPr lang="en-US" dirty="0">
+                <a:solidFill>
+                  <a:schemeClr val="accent6">
+                    <a:lumMod val="75000"/>
+                  </a:schemeClr>
+                </a:solidFill>
+                <a:latin typeface="Helvetica Neue"/>
+              </a:rPr>
+              <a:t> </a:t>
+            </a:r>
+            <a:r>
+              <a:rPr lang="en-US" dirty="0" err="1">
+                <a:solidFill>
+                  <a:schemeClr val="accent6">
+                    <a:lumMod val="75000"/>
+                  </a:schemeClr>
+                </a:solidFill>
+                <a:latin typeface="Helvetica Neue"/>
+              </a:rPr>
+              <a:t>học</a:t>
+            </a:r>
+            <a:r>
+              <a:rPr lang="en-US" dirty="0">
+                <a:solidFill>
+                  <a:schemeClr val="accent6">
+                    <a:lumMod val="75000"/>
+                  </a:schemeClr>
+                </a:solidFill>
                 <a:latin typeface="Helvetica Neue"/>
               </a:rPr>
               <a:t>.</a:t>
@@ -21841,7 +22969,7 @@
         <p:spPr>
           <a:xfrm>
             <a:off x="1324088" y="741072"/>
-            <a:ext cx="10548364" cy="646331"/>
+            <a:ext cx="10548364" cy="923330"/>
           </a:xfrm>
           <a:prstGeom prst="rect">
             <a:avLst/>
@@ -22055,6 +23183,96 @@
                 <a:latin typeface="Helvetica Neue"/>
               </a:rPr>
               <a:t> Linear Regression </a:t>
+            </a:r>
+            <a:r>
+              <a:rPr lang="en-US" i="1" dirty="0">
+                <a:solidFill>
+                  <a:srgbClr val="000000"/>
+                </a:solidFill>
+                <a:latin typeface="Helvetica Neue"/>
+              </a:rPr>
+              <a:t>(</a:t>
+            </a:r>
+            <a:r>
+              <a:rPr lang="en-US" i="1" dirty="0" err="1">
+                <a:solidFill>
+                  <a:srgbClr val="000000"/>
+                </a:solidFill>
+                <a:latin typeface="Helvetica Neue"/>
+              </a:rPr>
+              <a:t>month_to_seasons</a:t>
+            </a:r>
+            <a:r>
+              <a:rPr lang="en-US" i="1" dirty="0">
+                <a:solidFill>
+                  <a:srgbClr val="000000"/>
+                </a:solidFill>
+                <a:latin typeface="Helvetica Neue"/>
+              </a:rPr>
+              <a:t>=True, </a:t>
+            </a:r>
+            <a:r>
+              <a:rPr lang="en-US" i="1" dirty="0" err="1">
+                <a:solidFill>
+                  <a:srgbClr val="000000"/>
+                </a:solidFill>
+                <a:latin typeface="Helvetica Neue"/>
+              </a:rPr>
+              <a:t>year_to_period</a:t>
+            </a:r>
+            <a:r>
+              <a:rPr lang="en-US" i="1" dirty="0">
+                <a:solidFill>
+                  <a:srgbClr val="000000"/>
+                </a:solidFill>
+                <a:latin typeface="Helvetica Neue"/>
+              </a:rPr>
+              <a:t>=True </a:t>
+            </a:r>
+            <a:r>
+              <a:rPr lang="en-US" i="1" dirty="0" err="1">
+                <a:solidFill>
+                  <a:srgbClr val="000000"/>
+                </a:solidFill>
+                <a:latin typeface="Helvetica Neue"/>
+              </a:rPr>
+              <a:t>và</a:t>
+            </a:r>
+            <a:r>
+              <a:rPr lang="en-US" i="1" dirty="0">
+                <a:solidFill>
+                  <a:srgbClr val="000000"/>
+                </a:solidFill>
+                <a:latin typeface="Helvetica Neue"/>
+              </a:rPr>
+              <a:t> </a:t>
+            </a:r>
+            <a:r>
+              <a:rPr lang="en-US" i="1" dirty="0" err="1">
+                <a:solidFill>
+                  <a:srgbClr val="000000"/>
+                </a:solidFill>
+                <a:latin typeface="Helvetica Neue"/>
+              </a:rPr>
+              <a:t>num_top_types</a:t>
+            </a:r>
+            <a:r>
+              <a:rPr lang="en-US" i="1" dirty="0">
+                <a:solidFill>
+                  <a:srgbClr val="000000"/>
+                </a:solidFill>
+                <a:latin typeface="Helvetica Neue"/>
+              </a:rPr>
+              <a:t>=5)</a:t>
+            </a:r>
+            <a:r>
+              <a:rPr lang="en-US" dirty="0">
+                <a:solidFill>
+                  <a:srgbClr val="000000"/>
+                </a:solidFill>
+                <a:latin typeface="Helvetica Neue"/>
+              </a:rPr>
+              <a:t> </a:t>
             </a:r>
             <a:r>
               <a:rPr lang="en-US" dirty="0" err="1">
@@ -23132,7 +24350,7 @@
         <p:spPr>
           <a:xfrm>
             <a:off x="1804236" y="3771117"/>
-            <a:ext cx="9884020" cy="646331"/>
+            <a:ext cx="9884020" cy="923330"/>
           </a:xfrm>
           <a:prstGeom prst="rect">
             <a:avLst/>
@@ -23366,13 +24584,103 @@
               <a:t> Linear Regression </a:t>
             </a:r>
             <a:r>
-              <a:rPr lang="en-US" dirty="0" err="1">
-                <a:solidFill>
-                  <a:srgbClr val="000000"/>
-                </a:solidFill>
-                <a:latin typeface="Helvetica Neue"/>
-              </a:rPr>
-              <a:t>đê</a:t>
+              <a:rPr lang="en-US" i="1" dirty="0">
+                <a:solidFill>
+                  <a:srgbClr val="000000"/>
+                </a:solidFill>
+                <a:latin typeface="Helvetica Neue"/>
+              </a:rPr>
+              <a:t>(</a:t>
+            </a:r>
+            <a:r>
+              <a:rPr lang="en-US" i="1" dirty="0" err="1">
+                <a:solidFill>
+                  <a:srgbClr val="000000"/>
+                </a:solidFill>
+                <a:latin typeface="Helvetica Neue"/>
+              </a:rPr>
+              <a:t>month_to_seasons</a:t>
+            </a:r>
+            <a:r>
+              <a:rPr lang="en-US" i="1" dirty="0">
+                <a:solidFill>
+                  <a:srgbClr val="000000"/>
+                </a:solidFill>
+                <a:latin typeface="Helvetica Neue"/>
+              </a:rPr>
+              <a:t>=True, </a:t>
+            </a:r>
+            <a:r>
+              <a:rPr lang="en-US" i="1" dirty="0" err="1">
+                <a:solidFill>
+                  <a:srgbClr val="000000"/>
+                </a:solidFill>
+                <a:latin typeface="Helvetica Neue"/>
+              </a:rPr>
+              <a:t>year_to_period</a:t>
+            </a:r>
+            <a:r>
+              <a:rPr lang="en-US" i="1" dirty="0">
+                <a:solidFill>
+                  <a:srgbClr val="000000"/>
+                </a:solidFill>
+                <a:latin typeface="Helvetica Neue"/>
+              </a:rPr>
+              <a:t>=True </a:t>
+            </a:r>
+            <a:r>
+              <a:rPr lang="en-US" i="1" dirty="0" err="1">
+                <a:solidFill>
+                  <a:srgbClr val="000000"/>
+                </a:solidFill>
+                <a:latin typeface="Helvetica Neue"/>
+              </a:rPr>
+              <a:t>và</a:t>
+            </a:r>
+            <a:r>
+              <a:rPr lang="en-US" i="1" dirty="0">
+                <a:solidFill>
+                  <a:srgbClr val="000000"/>
+                </a:solidFill>
+                <a:latin typeface="Helvetica Neue"/>
+              </a:rPr>
+              <a:t> </a:t>
+            </a:r>
+            <a:r>
+              <a:rPr lang="en-US" i="1" dirty="0" err="1">
+                <a:solidFill>
+                  <a:srgbClr val="000000"/>
+                </a:solidFill>
+                <a:latin typeface="Helvetica Neue"/>
+              </a:rPr>
+              <a:t>num_top_types</a:t>
+            </a:r>
+            <a:r>
+              <a:rPr lang="en-US" i="1" dirty="0">
+                <a:solidFill>
+                  <a:srgbClr val="000000"/>
+                </a:solidFill>
+                <a:latin typeface="Helvetica Neue"/>
+              </a:rPr>
+              <a:t>=5)</a:t>
+            </a:r>
+            <a:r>
+              <a:rPr lang="en-US" dirty="0">
+                <a:solidFill>
+                  <a:srgbClr val="000000"/>
+                </a:solidFill>
+                <a:latin typeface="Helvetica Neue"/>
+              </a:rPr>
+              <a:t> </a:t>
+            </a:r>
+            <a:r>
+              <a:rPr lang="en-US" dirty="0" err="1">
+                <a:solidFill>
+                  <a:srgbClr val="000000"/>
+                </a:solidFill>
+                <a:latin typeface="Helvetica Neue"/>
+              </a:rPr>
+              <a:t>để</a:t>
             </a:r>
             <a:r>
               <a:rPr lang="en-US" dirty="0">
@@ -23636,22 +24944,13 @@
               <a:t>chỉ</a:t>
             </a:r>
             <a:r>
-              <a:rPr lang="en-US">
+              <a:rPr lang="en-US" dirty="0">
                 <a:solidFill>
                   <a:srgbClr val="00B050"/>
                 </a:solidFill>
                 <a:latin typeface="Helvetica Neue"/>
               </a:rPr>
-              <a:t> 36.76</a:t>
-            </a:r>
-            <a:r>
-              <a:rPr lang="en-US" dirty="0">
-                <a:solidFill>
-                  <a:srgbClr val="00B050"/>
-                </a:solidFill>
-                <a:latin typeface="Helvetica Neue"/>
-              </a:rPr>
-              <a:t>%</a:t>
+              <a:t> 36.76%</a:t>
             </a:r>
             <a:r>
               <a:rPr lang="en-US" dirty="0">
@@ -23676,6 +24975,1322 @@
 </file>
 
 <file path=ppt/slides/slide18.xml><?xml version="1.0" encoding="utf-8"?>
+<p:sld xmlns:a="http://schemas.openxmlformats.org/drawingml/2006/main" xmlns:r="http://schemas.openxmlformats.org/officeDocument/2006/relationships" xmlns:p="http://schemas.openxmlformats.org/presentationml/2006/main">
+  <p:cSld>
+    <p:spTree>
+      <p:nvGrpSpPr>
+        <p:cNvPr id="1" name=""/>
+        <p:cNvGrpSpPr/>
+        <p:nvPr/>
+      </p:nvGrpSpPr>
+      <p:grpSpPr>
+        <a:xfrm>
+          <a:off x="0" y="0"/>
+          <a:ext cx="0" cy="0"/>
+          <a:chOff x="0" y="0"/>
+          <a:chExt cx="0" cy="0"/>
+        </a:xfrm>
+      </p:grpSpPr>
+      <p:sp>
+        <p:nvSpPr>
+          <p:cNvPr id="5" name="Title 3">
+            <a:extLst>
+              <a:ext uri="{FF2B5EF4-FFF2-40B4-BE49-F238E27FC236}">
+                <a16:creationId xmlns:a16="http://schemas.microsoft.com/office/drawing/2014/main" id="{19108840-FFCC-42C7-88AD-7039908F3F4D}"/>
+              </a:ext>
+            </a:extLst>
+          </p:cNvPr>
+          <p:cNvSpPr>
+            <a:spLocks noGrp="1"/>
+          </p:cNvSpPr>
+          <p:nvPr>
+            <p:ph type="title"/>
+          </p:nvPr>
+        </p:nvSpPr>
+        <p:spPr>
+          <a:xfrm>
+            <a:off x="675250" y="5474331"/>
+            <a:ext cx="9929936" cy="689514"/>
+          </a:xfrm>
+        </p:spPr>
+        <p:txBody>
+          <a:bodyPr>
+            <a:noAutofit/>
+          </a:bodyPr>
+          <a:lstStyle/>
+          <a:p>
+            <a:pPr algn="r"/>
+            <a:r>
+              <a:rPr lang="en-US" sz="2400" b="1" dirty="0" err="1">
+                <a:solidFill>
+                  <a:schemeClr val="bg1"/>
+                </a:solidFill>
+                <a:latin typeface="Calibri (Body)"/>
+              </a:rPr>
+              <a:t>Mô</a:t>
+            </a:r>
+            <a:r>
+              <a:rPr lang="en-US" sz="2400" b="1" dirty="0">
+                <a:solidFill>
+                  <a:schemeClr val="bg1"/>
+                </a:solidFill>
+                <a:latin typeface="Calibri (Body)"/>
+              </a:rPr>
+              <a:t> </a:t>
+            </a:r>
+            <a:r>
+              <a:rPr lang="en-US" sz="2400" b="1" dirty="0" err="1">
+                <a:solidFill>
+                  <a:schemeClr val="bg1"/>
+                </a:solidFill>
+                <a:latin typeface="Calibri (Body)"/>
+              </a:rPr>
+              <a:t>hình</a:t>
+            </a:r>
+            <a:r>
+              <a:rPr lang="en-US" sz="2400" b="1" dirty="0">
+                <a:solidFill>
+                  <a:schemeClr val="bg1"/>
+                </a:solidFill>
+                <a:latin typeface="Calibri (Body)"/>
+              </a:rPr>
+              <a:t> </a:t>
+            </a:r>
+            <a:r>
+              <a:rPr lang="en-US" sz="2400" b="1" dirty="0" err="1">
+                <a:solidFill>
+                  <a:schemeClr val="bg1"/>
+                </a:solidFill>
+                <a:latin typeface="Calibri (Body)"/>
+              </a:rPr>
+              <a:t>hóa</a:t>
+            </a:r>
+            <a:r>
+              <a:rPr lang="en-US" sz="2400" b="1" dirty="0">
+                <a:solidFill>
+                  <a:schemeClr val="bg1"/>
+                </a:solidFill>
+                <a:latin typeface="Calibri (Body)"/>
+              </a:rPr>
+              <a:t> </a:t>
+            </a:r>
+            <a:r>
+              <a:rPr lang="en-US" sz="2400" b="1" dirty="0" err="1">
+                <a:solidFill>
+                  <a:schemeClr val="bg1"/>
+                </a:solidFill>
+                <a:latin typeface="Calibri (Body)"/>
+              </a:rPr>
+              <a:t>dữ</a:t>
+            </a:r>
+            <a:r>
+              <a:rPr lang="en-US" sz="2400" b="1" dirty="0">
+                <a:solidFill>
+                  <a:schemeClr val="bg1"/>
+                </a:solidFill>
+                <a:latin typeface="Calibri (Body)"/>
+              </a:rPr>
+              <a:t> </a:t>
+            </a:r>
+            <a:r>
+              <a:rPr lang="en-US" sz="2400" b="1" dirty="0" err="1">
+                <a:solidFill>
+                  <a:schemeClr val="bg1"/>
+                </a:solidFill>
+                <a:latin typeface="Calibri (Body)"/>
+              </a:rPr>
+              <a:t>liệu</a:t>
+            </a:r>
+            <a:r>
+              <a:rPr lang="en-US" sz="2400" b="1" dirty="0">
+                <a:solidFill>
+                  <a:schemeClr val="bg1"/>
+                </a:solidFill>
+                <a:latin typeface="Calibri (Body)"/>
+              </a:rPr>
+              <a:t> – </a:t>
+            </a:r>
+            <a:r>
+              <a:rPr lang="en-US" sz="2400" b="1" dirty="0" err="1">
+                <a:solidFill>
+                  <a:schemeClr val="bg1"/>
+                </a:solidFill>
+                <a:latin typeface="Calibri (Body)"/>
+              </a:rPr>
+              <a:t>LINear</a:t>
+            </a:r>
+            <a:r>
+              <a:rPr lang="en-US" sz="2400" b="1" dirty="0">
+                <a:solidFill>
+                  <a:schemeClr val="bg1"/>
+                </a:solidFill>
+                <a:latin typeface="Calibri (Body)"/>
+              </a:rPr>
+              <a:t> regression</a:t>
+            </a:r>
+          </a:p>
+        </p:txBody>
+      </p:sp>
+      <p:sp>
+        <p:nvSpPr>
+          <p:cNvPr id="14" name="Slide Number Placeholder 13">
+            <a:extLst>
+              <a:ext uri="{FF2B5EF4-FFF2-40B4-BE49-F238E27FC236}">
+                <a16:creationId xmlns:a16="http://schemas.microsoft.com/office/drawing/2014/main" id="{980EF428-8355-4A47-B751-792490A6FC45}"/>
+              </a:ext>
+            </a:extLst>
+          </p:cNvPr>
+          <p:cNvSpPr>
+            <a:spLocks noGrp="1"/>
+          </p:cNvSpPr>
+          <p:nvPr>
+            <p:ph type="sldNum" sz="quarter" idx="12"/>
+          </p:nvPr>
+        </p:nvSpPr>
+        <p:spPr/>
+        <p:txBody>
+          <a:bodyPr/>
+          <a:lstStyle/>
+          <a:p>
+            <a:fld id="{D57F1E4F-1CFF-5643-939E-217C01CDF565}" type="slidenum">
+              <a:rPr lang="en-US" smtClean="0"/>
+              <a:pPr/>
+              <a:t>18</a:t>
+            </a:fld>
+            <a:endParaRPr lang="en-US" dirty="0"/>
+          </a:p>
+        </p:txBody>
+      </p:sp>
+      <p:pic>
+        <p:nvPicPr>
+          <p:cNvPr id="6" name="Picture 10" descr="Image result for model scikit learn icon">
+            <a:extLst>
+              <a:ext uri="{FF2B5EF4-FFF2-40B4-BE49-F238E27FC236}">
+                <a16:creationId xmlns:a16="http://schemas.microsoft.com/office/drawing/2014/main" id="{07C4DCFC-0297-4ECA-8584-DAB16A6A24F3}"/>
+              </a:ext>
+            </a:extLst>
+          </p:cNvPr>
+          <p:cNvPicPr>
+            <a:picLocks noChangeAspect="1" noChangeArrowheads="1"/>
+          </p:cNvPicPr>
+          <p:nvPr/>
+        </p:nvPicPr>
+        <p:blipFill>
+          <a:blip r:embed="rId3">
+            <a:extLst>
+              <a:ext uri="{28A0092B-C50C-407E-A947-70E740481C1C}">
+                <a14:useLocalDpi xmlns:a14="http://schemas.microsoft.com/office/drawing/2010/main" val="0"/>
+              </a:ext>
+            </a:extLst>
+          </a:blip>
+          <a:srcRect/>
+          <a:stretch>
+            <a:fillRect/>
+          </a:stretch>
+        </p:blipFill>
+        <p:spPr bwMode="auto">
+          <a:xfrm>
+            <a:off x="10605186" y="5274129"/>
+            <a:ext cx="1052510" cy="1071214"/>
+          </a:xfrm>
+          <a:prstGeom prst="rect">
+            <a:avLst/>
+          </a:prstGeom>
+          <a:noFill/>
+          <a:extLst>
+            <a:ext uri="{909E8E84-426E-40DD-AFC4-6F175D3DCCD1}">
+              <a14:hiddenFill xmlns:a14="http://schemas.microsoft.com/office/drawing/2010/main">
+                <a:solidFill>
+                  <a:srgbClr val="FFFFFF"/>
+                </a:solidFill>
+              </a14:hiddenFill>
+            </a:ext>
+          </a:extLst>
+        </p:spPr>
+      </p:pic>
+      <p:pic>
+        <p:nvPicPr>
+          <p:cNvPr id="13" name="Picture 12">
+            <a:extLst>
+              <a:ext uri="{FF2B5EF4-FFF2-40B4-BE49-F238E27FC236}">
+                <a16:creationId xmlns:a16="http://schemas.microsoft.com/office/drawing/2014/main" id="{C8BE17A2-542D-4E90-B654-7683154D4E51}"/>
+              </a:ext>
+            </a:extLst>
+          </p:cNvPr>
+          <p:cNvPicPr>
+            <a:picLocks noChangeAspect="1"/>
+          </p:cNvPicPr>
+          <p:nvPr/>
+        </p:nvPicPr>
+        <p:blipFill>
+          <a:blip r:embed="rId4"/>
+          <a:stretch>
+            <a:fillRect/>
+          </a:stretch>
+        </p:blipFill>
+        <p:spPr>
+          <a:xfrm>
+            <a:off x="445565" y="694155"/>
+            <a:ext cx="7562809" cy="4349793"/>
+          </a:xfrm>
+          <a:prstGeom prst="rect">
+            <a:avLst/>
+          </a:prstGeom>
+        </p:spPr>
+      </p:pic>
+      <p:sp>
+        <p:nvSpPr>
+          <p:cNvPr id="15" name="Rectangle 14">
+            <a:extLst>
+              <a:ext uri="{FF2B5EF4-FFF2-40B4-BE49-F238E27FC236}">
+                <a16:creationId xmlns:a16="http://schemas.microsoft.com/office/drawing/2014/main" id="{0E515C83-7CFE-48A3-A5BF-396CF2E498D4}"/>
+              </a:ext>
+            </a:extLst>
+          </p:cNvPr>
+          <p:cNvSpPr/>
+          <p:nvPr/>
+        </p:nvSpPr>
+        <p:spPr>
+          <a:xfrm>
+            <a:off x="8008375" y="694155"/>
+            <a:ext cx="3738060" cy="2308324"/>
+          </a:xfrm>
+          <a:prstGeom prst="rect">
+            <a:avLst/>
+          </a:prstGeom>
+        </p:spPr>
+        <p:txBody>
+          <a:bodyPr wrap="square">
+            <a:spAutoFit/>
+          </a:bodyPr>
+          <a:lstStyle/>
+          <a:p>
+            <a:pPr algn="just">
+              <a:spcAft>
+                <a:spcPts val="600"/>
+              </a:spcAft>
+            </a:pPr>
+            <a:r>
+              <a:rPr lang="en-US" dirty="0" err="1">
+                <a:solidFill>
+                  <a:srgbClr val="000000"/>
+                </a:solidFill>
+                <a:latin typeface="Helvetica Neue"/>
+              </a:rPr>
+              <a:t>Mô</a:t>
+            </a:r>
+            <a:r>
+              <a:rPr lang="en-US" dirty="0">
+                <a:solidFill>
+                  <a:srgbClr val="000000"/>
+                </a:solidFill>
+                <a:latin typeface="Helvetica Neue"/>
+              </a:rPr>
+              <a:t> </a:t>
+            </a:r>
+            <a:r>
+              <a:rPr lang="en-US" dirty="0" err="1">
+                <a:solidFill>
+                  <a:srgbClr val="000000"/>
+                </a:solidFill>
+                <a:latin typeface="Helvetica Neue"/>
+              </a:rPr>
+              <a:t>hình</a:t>
+            </a:r>
+            <a:r>
+              <a:rPr lang="en-US" dirty="0">
+                <a:solidFill>
+                  <a:srgbClr val="000000"/>
+                </a:solidFill>
+                <a:latin typeface="Helvetica Neue"/>
+              </a:rPr>
+              <a:t> </a:t>
+            </a:r>
+            <a:r>
+              <a:rPr lang="en-US" b="1" dirty="0">
+                <a:solidFill>
+                  <a:srgbClr val="000000"/>
+                </a:solidFill>
+                <a:latin typeface="Helvetica Neue"/>
+              </a:rPr>
+              <a:t>Linear Regression </a:t>
+            </a:r>
+            <a:r>
+              <a:rPr lang="en-US" dirty="0" err="1">
+                <a:solidFill>
+                  <a:srgbClr val="000000"/>
+                </a:solidFill>
+                <a:latin typeface="Helvetica Neue"/>
+              </a:rPr>
+              <a:t>quá</a:t>
+            </a:r>
+            <a:r>
+              <a:rPr lang="en-US" dirty="0">
+                <a:solidFill>
+                  <a:srgbClr val="000000"/>
+                </a:solidFill>
+                <a:latin typeface="Helvetica Neue"/>
+              </a:rPr>
+              <a:t> </a:t>
+            </a:r>
+            <a:r>
+              <a:rPr lang="en-US" dirty="0" err="1">
+                <a:solidFill>
+                  <a:srgbClr val="000000"/>
+                </a:solidFill>
+                <a:latin typeface="Helvetica Neue"/>
+              </a:rPr>
+              <a:t>yếu</a:t>
+            </a:r>
+            <a:r>
+              <a:rPr lang="en-US" dirty="0">
+                <a:solidFill>
+                  <a:srgbClr val="000000"/>
+                </a:solidFill>
+                <a:latin typeface="Helvetica Neue"/>
+              </a:rPr>
+              <a:t> </a:t>
+            </a:r>
+            <a:r>
+              <a:rPr lang="en-US" dirty="0" err="1">
+                <a:solidFill>
+                  <a:srgbClr val="000000"/>
+                </a:solidFill>
+                <a:latin typeface="Helvetica Neue"/>
+              </a:rPr>
+              <a:t>trong</a:t>
+            </a:r>
+            <a:r>
+              <a:rPr lang="en-US" dirty="0">
+                <a:solidFill>
+                  <a:srgbClr val="000000"/>
+                </a:solidFill>
+                <a:latin typeface="Helvetica Neue"/>
+              </a:rPr>
+              <a:t> </a:t>
+            </a:r>
+            <a:r>
+              <a:rPr lang="en-US" dirty="0" err="1">
+                <a:solidFill>
+                  <a:srgbClr val="000000"/>
+                </a:solidFill>
+                <a:latin typeface="Helvetica Neue"/>
+              </a:rPr>
+              <a:t>tình</a:t>
+            </a:r>
+            <a:r>
+              <a:rPr lang="en-US" dirty="0">
+                <a:solidFill>
+                  <a:srgbClr val="000000"/>
+                </a:solidFill>
+                <a:latin typeface="Helvetica Neue"/>
+              </a:rPr>
+              <a:t> </a:t>
+            </a:r>
+            <a:r>
+              <a:rPr lang="en-US" dirty="0" err="1">
+                <a:solidFill>
+                  <a:srgbClr val="000000"/>
+                </a:solidFill>
+                <a:latin typeface="Helvetica Neue"/>
+              </a:rPr>
+              <a:t>huống</a:t>
+            </a:r>
+            <a:r>
+              <a:rPr lang="en-US" dirty="0">
+                <a:solidFill>
+                  <a:srgbClr val="000000"/>
+                </a:solidFill>
+                <a:latin typeface="Helvetica Neue"/>
+              </a:rPr>
+              <a:t> </a:t>
+            </a:r>
+            <a:r>
+              <a:rPr lang="en-US" dirty="0" err="1">
+                <a:solidFill>
+                  <a:srgbClr val="000000"/>
+                </a:solidFill>
+                <a:latin typeface="Helvetica Neue"/>
+              </a:rPr>
+              <a:t>này</a:t>
+            </a:r>
+            <a:r>
+              <a:rPr lang="en-US" dirty="0">
+                <a:solidFill>
+                  <a:srgbClr val="000000"/>
+                </a:solidFill>
+                <a:latin typeface="Helvetica Neue"/>
+              </a:rPr>
+              <a:t> </a:t>
+            </a:r>
+            <a:r>
+              <a:rPr lang="en-US" dirty="0" err="1">
+                <a:solidFill>
+                  <a:srgbClr val="000000"/>
+                </a:solidFill>
+                <a:latin typeface="Helvetica Neue"/>
+              </a:rPr>
+              <a:t>nên</a:t>
+            </a:r>
+            <a:r>
+              <a:rPr lang="en-US" dirty="0">
+                <a:solidFill>
+                  <a:srgbClr val="000000"/>
+                </a:solidFill>
+                <a:latin typeface="Helvetica Neue"/>
+              </a:rPr>
+              <a:t> </a:t>
+            </a:r>
+            <a:r>
+              <a:rPr lang="en-US" dirty="0" err="1">
+                <a:solidFill>
+                  <a:srgbClr val="000000"/>
+                </a:solidFill>
+                <a:latin typeface="Helvetica Neue"/>
+              </a:rPr>
+              <a:t>dự</a:t>
+            </a:r>
+            <a:r>
+              <a:rPr lang="en-US" dirty="0">
+                <a:solidFill>
+                  <a:srgbClr val="000000"/>
+                </a:solidFill>
+                <a:latin typeface="Helvetica Neue"/>
+              </a:rPr>
+              <a:t> </a:t>
+            </a:r>
+            <a:r>
+              <a:rPr lang="en-US" dirty="0" err="1">
+                <a:solidFill>
+                  <a:srgbClr val="000000"/>
+                </a:solidFill>
+                <a:latin typeface="Helvetica Neue"/>
+              </a:rPr>
+              <a:t>đoán</a:t>
+            </a:r>
+            <a:r>
+              <a:rPr lang="en-US" dirty="0">
+                <a:solidFill>
+                  <a:srgbClr val="000000"/>
+                </a:solidFill>
+                <a:latin typeface="Helvetica Neue"/>
+              </a:rPr>
+              <a:t> </a:t>
+            </a:r>
+            <a:r>
+              <a:rPr lang="en-US" dirty="0" err="1">
+                <a:solidFill>
+                  <a:srgbClr val="000000"/>
+                </a:solidFill>
+                <a:latin typeface="Helvetica Neue"/>
+              </a:rPr>
+              <a:t>bị</a:t>
+            </a:r>
+            <a:r>
+              <a:rPr lang="en-US" dirty="0">
+                <a:solidFill>
+                  <a:srgbClr val="000000"/>
+                </a:solidFill>
+                <a:latin typeface="Helvetica Neue"/>
+              </a:rPr>
+              <a:t> underfitting, </a:t>
+            </a:r>
+            <a:r>
+              <a:rPr lang="en-US" dirty="0" err="1">
+                <a:solidFill>
+                  <a:srgbClr val="000000"/>
+                </a:solidFill>
+                <a:latin typeface="Helvetica Neue"/>
+              </a:rPr>
+              <a:t>khi</a:t>
+            </a:r>
+            <a:r>
+              <a:rPr lang="en-US" dirty="0">
+                <a:solidFill>
+                  <a:srgbClr val="000000"/>
+                </a:solidFill>
+                <a:latin typeface="Helvetica Neue"/>
+              </a:rPr>
+              <a:t> </a:t>
+            </a:r>
+            <a:r>
+              <a:rPr lang="en-US" dirty="0" err="1">
+                <a:solidFill>
+                  <a:srgbClr val="000000"/>
+                </a:solidFill>
+                <a:latin typeface="Helvetica Neue"/>
+              </a:rPr>
+              <a:t>tăng</a:t>
+            </a:r>
+            <a:r>
+              <a:rPr lang="en-US" dirty="0">
+                <a:solidFill>
+                  <a:srgbClr val="000000"/>
+                </a:solidFill>
+                <a:latin typeface="Helvetica Neue"/>
+              </a:rPr>
+              <a:t> </a:t>
+            </a:r>
+            <a:r>
+              <a:rPr lang="en-US" dirty="0" err="1">
+                <a:solidFill>
+                  <a:srgbClr val="000000"/>
+                </a:solidFill>
+                <a:latin typeface="Helvetica Neue"/>
+              </a:rPr>
+              <a:t>chiều</a:t>
+            </a:r>
+            <a:r>
+              <a:rPr lang="en-US" dirty="0">
+                <a:solidFill>
+                  <a:srgbClr val="000000"/>
+                </a:solidFill>
+                <a:latin typeface="Helvetica Neue"/>
+              </a:rPr>
+              <a:t> </a:t>
+            </a:r>
+            <a:r>
+              <a:rPr lang="en-US" dirty="0" err="1">
+                <a:solidFill>
+                  <a:srgbClr val="000000"/>
+                </a:solidFill>
+                <a:latin typeface="Helvetica Neue"/>
+              </a:rPr>
+              <a:t>dữ</a:t>
+            </a:r>
+            <a:r>
+              <a:rPr lang="en-US" dirty="0">
+                <a:solidFill>
+                  <a:srgbClr val="000000"/>
+                </a:solidFill>
+                <a:latin typeface="Helvetica Neue"/>
+              </a:rPr>
+              <a:t> </a:t>
+            </a:r>
+            <a:r>
+              <a:rPr lang="en-US" dirty="0" err="1">
+                <a:solidFill>
+                  <a:srgbClr val="000000"/>
+                </a:solidFill>
+                <a:latin typeface="Helvetica Neue"/>
+              </a:rPr>
+              <a:t>liệu</a:t>
+            </a:r>
+            <a:r>
+              <a:rPr lang="en-US" dirty="0">
+                <a:solidFill>
+                  <a:srgbClr val="000000"/>
+                </a:solidFill>
+                <a:latin typeface="Helvetica Neue"/>
+              </a:rPr>
+              <a:t> </a:t>
+            </a:r>
+            <a:r>
+              <a:rPr lang="en-US" dirty="0" err="1">
+                <a:solidFill>
+                  <a:srgbClr val="000000"/>
+                </a:solidFill>
+                <a:latin typeface="Helvetica Neue"/>
+              </a:rPr>
+              <a:t>lên</a:t>
+            </a:r>
+            <a:r>
+              <a:rPr lang="en-US" dirty="0">
+                <a:solidFill>
+                  <a:srgbClr val="000000"/>
+                </a:solidFill>
+                <a:latin typeface="Helvetica Neue"/>
+              </a:rPr>
+              <a:t> </a:t>
+            </a:r>
+            <a:r>
+              <a:rPr lang="en-US" i="1" dirty="0">
+                <a:solidFill>
+                  <a:srgbClr val="000000"/>
+                </a:solidFill>
+                <a:latin typeface="Helvetica Neue"/>
+              </a:rPr>
+              <a:t>(</a:t>
+            </a:r>
+            <a:r>
+              <a:rPr lang="en-US" i="1" dirty="0" err="1">
+                <a:solidFill>
+                  <a:srgbClr val="000000"/>
+                </a:solidFill>
+                <a:latin typeface="Helvetica Neue"/>
+              </a:rPr>
+              <a:t>đó</a:t>
+            </a:r>
+            <a:r>
+              <a:rPr lang="en-US" i="1" dirty="0">
+                <a:solidFill>
+                  <a:srgbClr val="000000"/>
+                </a:solidFill>
+                <a:latin typeface="Helvetica Neue"/>
+              </a:rPr>
+              <a:t> </a:t>
+            </a:r>
+            <a:r>
+              <a:rPr lang="en-US" i="1" dirty="0" err="1">
+                <a:solidFill>
+                  <a:srgbClr val="000000"/>
+                </a:solidFill>
+                <a:latin typeface="Helvetica Neue"/>
+              </a:rPr>
+              <a:t>là</a:t>
+            </a:r>
+            <a:r>
+              <a:rPr lang="en-US" i="1" dirty="0">
+                <a:solidFill>
+                  <a:srgbClr val="000000"/>
+                </a:solidFill>
+                <a:latin typeface="Helvetica Neue"/>
+              </a:rPr>
+              <a:t> </a:t>
+            </a:r>
+            <a:r>
+              <a:rPr lang="en-US" i="1" dirty="0" err="1">
+                <a:solidFill>
+                  <a:srgbClr val="000000"/>
+                </a:solidFill>
+                <a:latin typeface="Helvetica Neue"/>
+              </a:rPr>
+              <a:t>cho</a:t>
+            </a:r>
+            <a:r>
+              <a:rPr lang="en-US" i="1" dirty="0">
+                <a:solidFill>
+                  <a:srgbClr val="000000"/>
+                </a:solidFill>
+                <a:latin typeface="Helvetica Neue"/>
+              </a:rPr>
+              <a:t> </a:t>
+            </a:r>
+            <a:r>
+              <a:rPr lang="en-US" i="1" dirty="0" err="1">
+                <a:solidFill>
+                  <a:srgbClr val="000000"/>
+                </a:solidFill>
+                <a:latin typeface="Helvetica Neue"/>
+              </a:rPr>
+              <a:t>các</a:t>
+            </a:r>
+            <a:r>
+              <a:rPr lang="en-US" i="1" dirty="0">
+                <a:solidFill>
+                  <a:srgbClr val="000000"/>
+                </a:solidFill>
+                <a:latin typeface="Helvetica Neue"/>
+              </a:rPr>
+              <a:t> </a:t>
+            </a:r>
+            <a:r>
+              <a:rPr lang="en-US" i="1" dirty="0" err="1">
+                <a:solidFill>
+                  <a:srgbClr val="000000"/>
+                </a:solidFill>
+                <a:latin typeface="Helvetica Neue"/>
+              </a:rPr>
+              <a:t>siêu</a:t>
+            </a:r>
+            <a:r>
+              <a:rPr lang="en-US" i="1" dirty="0">
+                <a:solidFill>
+                  <a:srgbClr val="000000"/>
+                </a:solidFill>
+                <a:latin typeface="Helvetica Neue"/>
+              </a:rPr>
+              <a:t> </a:t>
+            </a:r>
+            <a:r>
+              <a:rPr lang="en-US" i="1" dirty="0" err="1">
+                <a:solidFill>
+                  <a:srgbClr val="000000"/>
+                </a:solidFill>
+                <a:latin typeface="Helvetica Neue"/>
+              </a:rPr>
+              <a:t>tham</a:t>
+            </a:r>
+            <a:r>
+              <a:rPr lang="en-US" i="1" dirty="0">
+                <a:solidFill>
+                  <a:srgbClr val="000000"/>
+                </a:solidFill>
+                <a:latin typeface="Helvetica Neue"/>
+              </a:rPr>
+              <a:t> </a:t>
+            </a:r>
+            <a:r>
+              <a:rPr lang="en-US" i="1" dirty="0" err="1">
+                <a:solidFill>
+                  <a:srgbClr val="000000"/>
+                </a:solidFill>
+                <a:latin typeface="Helvetica Neue"/>
+              </a:rPr>
+              <a:t>số</a:t>
+            </a:r>
+            <a:r>
+              <a:rPr lang="en-US" i="1" dirty="0">
+                <a:solidFill>
+                  <a:srgbClr val="000000"/>
+                </a:solidFill>
+                <a:latin typeface="Helvetica Neue"/>
+              </a:rPr>
+              <a:t> </a:t>
+            </a:r>
+            <a:r>
+              <a:rPr lang="en-US" i="1" dirty="0" err="1">
+                <a:solidFill>
+                  <a:srgbClr val="000000"/>
+                </a:solidFill>
+                <a:latin typeface="Helvetica Neue"/>
+              </a:rPr>
+              <a:t>bằng</a:t>
+            </a:r>
+            <a:r>
+              <a:rPr lang="en-US" i="1" dirty="0">
+                <a:solidFill>
+                  <a:srgbClr val="000000"/>
+                </a:solidFill>
+                <a:latin typeface="Helvetica Neue"/>
+              </a:rPr>
+              <a:t> False, </a:t>
+            </a:r>
+            <a:r>
+              <a:rPr lang="en-US" i="1" dirty="0" err="1">
+                <a:solidFill>
+                  <a:srgbClr val="000000"/>
+                </a:solidFill>
+                <a:latin typeface="Helvetica Neue"/>
+              </a:rPr>
+              <a:t>tăng</a:t>
+            </a:r>
+            <a:r>
+              <a:rPr lang="en-US" i="1" dirty="0">
+                <a:solidFill>
+                  <a:srgbClr val="000000"/>
+                </a:solidFill>
+                <a:latin typeface="Helvetica Neue"/>
+              </a:rPr>
+              <a:t> </a:t>
+            </a:r>
+            <a:r>
+              <a:rPr lang="en-US" i="1" dirty="0" err="1">
+                <a:solidFill>
+                  <a:srgbClr val="000000"/>
+                </a:solidFill>
+                <a:latin typeface="Helvetica Neue"/>
+              </a:rPr>
+              <a:t>số</a:t>
+            </a:r>
+            <a:r>
+              <a:rPr lang="en-US" i="1" dirty="0">
+                <a:solidFill>
+                  <a:srgbClr val="000000"/>
+                </a:solidFill>
+                <a:latin typeface="Helvetica Neue"/>
+              </a:rPr>
+              <a:t> l</a:t>
+            </a:r>
+            <a:r>
+              <a:rPr lang="vi-VN" i="1" dirty="0">
+                <a:solidFill>
+                  <a:srgbClr val="000000"/>
+                </a:solidFill>
+                <a:latin typeface="Helvetica Neue"/>
+              </a:rPr>
+              <a:t>ư</a:t>
+            </a:r>
+            <a:r>
+              <a:rPr lang="en-US" i="1" dirty="0" err="1">
+                <a:solidFill>
+                  <a:srgbClr val="000000"/>
+                </a:solidFill>
+                <a:latin typeface="Helvetica Neue"/>
+              </a:rPr>
+              <a:t>ợng</a:t>
+            </a:r>
+            <a:r>
+              <a:rPr lang="en-US" i="1" dirty="0">
+                <a:solidFill>
+                  <a:srgbClr val="000000"/>
+                </a:solidFill>
+                <a:latin typeface="Helvetica Neue"/>
+              </a:rPr>
+              <a:t> </a:t>
+            </a:r>
+            <a:r>
+              <a:rPr lang="en-US" i="1" dirty="0" err="1">
+                <a:solidFill>
+                  <a:srgbClr val="000000"/>
+                </a:solidFill>
+                <a:latin typeface="Helvetica Neue"/>
+              </a:rPr>
+              <a:t>num_top_types</a:t>
+            </a:r>
+            <a:r>
+              <a:rPr lang="en-US" i="1" dirty="0">
+                <a:solidFill>
+                  <a:srgbClr val="000000"/>
+                </a:solidFill>
+                <a:latin typeface="Helvetica Neue"/>
+              </a:rPr>
+              <a:t>)</a:t>
+            </a:r>
+            <a:r>
+              <a:rPr lang="en-US" dirty="0">
+                <a:solidFill>
+                  <a:srgbClr val="000000"/>
+                </a:solidFill>
+                <a:latin typeface="Helvetica Neue"/>
+              </a:rPr>
+              <a:t> </a:t>
+            </a:r>
+            <a:r>
+              <a:rPr lang="en-US" dirty="0" err="1">
+                <a:solidFill>
+                  <a:srgbClr val="000000"/>
+                </a:solidFill>
+                <a:latin typeface="Helvetica Neue"/>
+              </a:rPr>
+              <a:t>thì</a:t>
+            </a:r>
+            <a:r>
+              <a:rPr lang="en-US" dirty="0">
+                <a:solidFill>
+                  <a:srgbClr val="000000"/>
+                </a:solidFill>
+                <a:latin typeface="Helvetica Neue"/>
+              </a:rPr>
+              <a:t> </a:t>
+            </a:r>
+            <a:r>
+              <a:rPr lang="en-US" dirty="0" err="1">
+                <a:solidFill>
+                  <a:srgbClr val="000000"/>
+                </a:solidFill>
+                <a:latin typeface="Helvetica Neue"/>
+              </a:rPr>
+              <a:t>thấy</a:t>
+            </a:r>
+            <a:r>
+              <a:rPr lang="en-US" dirty="0">
+                <a:solidFill>
+                  <a:srgbClr val="000000"/>
+                </a:solidFill>
+                <a:latin typeface="Helvetica Neue"/>
+              </a:rPr>
+              <a:t> </a:t>
+            </a:r>
+            <a:r>
+              <a:rPr lang="en-US" dirty="0" err="1">
+                <a:solidFill>
+                  <a:srgbClr val="000000"/>
+                </a:solidFill>
+                <a:latin typeface="Helvetica Neue"/>
+              </a:rPr>
+              <a:t>giúp</a:t>
+            </a:r>
+            <a:r>
+              <a:rPr lang="en-US" dirty="0">
+                <a:solidFill>
+                  <a:srgbClr val="000000"/>
+                </a:solidFill>
+                <a:latin typeface="Helvetica Neue"/>
+              </a:rPr>
+              <a:t> </a:t>
+            </a:r>
+            <a:r>
+              <a:rPr lang="en-US" dirty="0" err="1">
+                <a:solidFill>
+                  <a:srgbClr val="000000"/>
+                </a:solidFill>
+                <a:latin typeface="Helvetica Neue"/>
+              </a:rPr>
+              <a:t>học</a:t>
+            </a:r>
+            <a:r>
+              <a:rPr lang="en-US" dirty="0">
+                <a:solidFill>
+                  <a:srgbClr val="000000"/>
+                </a:solidFill>
+                <a:latin typeface="Helvetica Neue"/>
+              </a:rPr>
+              <a:t> </a:t>
+            </a:r>
+            <a:r>
+              <a:rPr lang="en-US" dirty="0" err="1">
+                <a:solidFill>
+                  <a:srgbClr val="000000"/>
+                </a:solidFill>
+                <a:latin typeface="Helvetica Neue"/>
+              </a:rPr>
+              <a:t>tốt</a:t>
+            </a:r>
+            <a:r>
+              <a:rPr lang="en-US" dirty="0">
+                <a:solidFill>
+                  <a:srgbClr val="000000"/>
+                </a:solidFill>
+                <a:latin typeface="Helvetica Neue"/>
+              </a:rPr>
+              <a:t> h</a:t>
+            </a:r>
+            <a:r>
+              <a:rPr lang="vi-VN" dirty="0">
+                <a:solidFill>
+                  <a:srgbClr val="000000"/>
+                </a:solidFill>
+                <a:latin typeface="Helvetica Neue"/>
+              </a:rPr>
+              <a:t>ơ</a:t>
+            </a:r>
+            <a:r>
+              <a:rPr lang="en-US" dirty="0">
+                <a:solidFill>
+                  <a:srgbClr val="000000"/>
+                </a:solidFill>
+                <a:latin typeface="Helvetica Neue"/>
+              </a:rPr>
+              <a:t>n </a:t>
+            </a:r>
+            <a:r>
+              <a:rPr lang="en-US" dirty="0" err="1">
+                <a:solidFill>
+                  <a:srgbClr val="000000"/>
+                </a:solidFill>
+                <a:latin typeface="Helvetica Neue"/>
+              </a:rPr>
+              <a:t>một</a:t>
+            </a:r>
+            <a:r>
+              <a:rPr lang="en-US" dirty="0">
+                <a:solidFill>
+                  <a:srgbClr val="000000"/>
+                </a:solidFill>
+                <a:latin typeface="Helvetica Neue"/>
+              </a:rPr>
+              <a:t> </a:t>
+            </a:r>
+            <a:r>
+              <a:rPr lang="en-US" dirty="0" err="1">
+                <a:solidFill>
+                  <a:srgbClr val="000000"/>
+                </a:solidFill>
+                <a:latin typeface="Helvetica Neue"/>
+              </a:rPr>
+              <a:t>chút</a:t>
+            </a:r>
+            <a:r>
+              <a:rPr lang="en-US" dirty="0">
+                <a:solidFill>
+                  <a:srgbClr val="000000"/>
+                </a:solidFill>
+                <a:latin typeface="Helvetica Neue"/>
+              </a:rPr>
+              <a:t>, </a:t>
+            </a:r>
+            <a:r>
+              <a:rPr lang="en-US" dirty="0" err="1">
+                <a:solidFill>
+                  <a:srgbClr val="000000"/>
+                </a:solidFill>
+                <a:latin typeface="Helvetica Neue"/>
+              </a:rPr>
+              <a:t>nh</a:t>
+            </a:r>
+            <a:r>
+              <a:rPr lang="vi-VN" dirty="0">
+                <a:solidFill>
+                  <a:srgbClr val="000000"/>
+                </a:solidFill>
+                <a:latin typeface="Helvetica Neue"/>
+              </a:rPr>
+              <a:t>ư</a:t>
+            </a:r>
+            <a:r>
+              <a:rPr lang="en-US" dirty="0">
+                <a:solidFill>
+                  <a:srgbClr val="000000"/>
+                </a:solidFill>
+                <a:latin typeface="Helvetica Neue"/>
+              </a:rPr>
+              <a:t>ng </a:t>
+            </a:r>
+            <a:r>
+              <a:rPr lang="en-US" dirty="0" err="1">
+                <a:solidFill>
+                  <a:srgbClr val="000000"/>
+                </a:solidFill>
+                <a:latin typeface="Helvetica Neue"/>
+              </a:rPr>
+              <a:t>vẫn</a:t>
+            </a:r>
+            <a:r>
+              <a:rPr lang="en-US" dirty="0">
+                <a:solidFill>
+                  <a:srgbClr val="000000"/>
+                </a:solidFill>
+                <a:latin typeface="Helvetica Neue"/>
+              </a:rPr>
+              <a:t> </a:t>
+            </a:r>
+            <a:r>
+              <a:rPr lang="en-US" dirty="0" err="1">
+                <a:solidFill>
+                  <a:srgbClr val="000000"/>
+                </a:solidFill>
+                <a:latin typeface="Helvetica Neue"/>
+              </a:rPr>
+              <a:t>bị</a:t>
+            </a:r>
+            <a:r>
+              <a:rPr lang="en-US" dirty="0">
+                <a:solidFill>
+                  <a:srgbClr val="000000"/>
+                </a:solidFill>
+                <a:latin typeface="Helvetica Neue"/>
+              </a:rPr>
+              <a:t> underfitting.</a:t>
+            </a:r>
+            <a:endParaRPr lang="en-US" dirty="0">
+              <a:latin typeface="Helvetica Neue"/>
+            </a:endParaRPr>
+          </a:p>
+        </p:txBody>
+      </p:sp>
+      <p:sp>
+        <p:nvSpPr>
+          <p:cNvPr id="16" name="Rectangle 15">
+            <a:extLst>
+              <a:ext uri="{FF2B5EF4-FFF2-40B4-BE49-F238E27FC236}">
+                <a16:creationId xmlns:a16="http://schemas.microsoft.com/office/drawing/2014/main" id="{7D73B70E-9F49-4A7D-91B6-C25A39549F41}"/>
+              </a:ext>
+            </a:extLst>
+          </p:cNvPr>
+          <p:cNvSpPr/>
+          <p:nvPr/>
+        </p:nvSpPr>
+        <p:spPr>
+          <a:xfrm>
+            <a:off x="8008375" y="3375710"/>
+            <a:ext cx="3738060" cy="1200329"/>
+          </a:xfrm>
+          <a:prstGeom prst="rect">
+            <a:avLst/>
+          </a:prstGeom>
+        </p:spPr>
+        <p:txBody>
+          <a:bodyPr wrap="square">
+            <a:spAutoFit/>
+          </a:bodyPr>
+          <a:lstStyle/>
+          <a:p>
+            <a:pPr algn="just">
+              <a:spcAft>
+                <a:spcPts val="600"/>
+              </a:spcAft>
+            </a:pPr>
+            <a:r>
+              <a:rPr lang="en-US" dirty="0" err="1">
+                <a:latin typeface="Helvetica Neue"/>
+              </a:rPr>
+              <a:t>Độ</a:t>
+            </a:r>
+            <a:r>
+              <a:rPr lang="en-US" dirty="0">
+                <a:latin typeface="Helvetica Neue"/>
+              </a:rPr>
+              <a:t> </a:t>
+            </a:r>
+            <a:r>
+              <a:rPr lang="en-US" dirty="0" err="1">
+                <a:latin typeface="Helvetica Neue"/>
+              </a:rPr>
+              <a:t>lỗi</a:t>
+            </a:r>
+            <a:r>
+              <a:rPr lang="en-US" dirty="0">
+                <a:latin typeface="Helvetica Neue"/>
+              </a:rPr>
+              <a:t> </a:t>
+            </a:r>
+            <a:r>
+              <a:rPr lang="en-US" dirty="0" err="1">
+                <a:latin typeface="Helvetica Neue"/>
+              </a:rPr>
+              <a:t>trên</a:t>
+            </a:r>
+            <a:r>
+              <a:rPr lang="en-US" dirty="0">
+                <a:latin typeface="Helvetica Neue"/>
+              </a:rPr>
+              <a:t> </a:t>
+            </a:r>
+            <a:r>
+              <a:rPr lang="en-US" dirty="0" err="1">
+                <a:latin typeface="Helvetica Neue"/>
+              </a:rPr>
+              <a:t>tập</a:t>
+            </a:r>
+            <a:r>
+              <a:rPr lang="en-US" dirty="0">
+                <a:latin typeface="Helvetica Neue"/>
+              </a:rPr>
+              <a:t> validation </a:t>
+            </a:r>
+            <a:r>
+              <a:rPr lang="en-US" dirty="0" err="1">
+                <a:latin typeface="Helvetica Neue"/>
+              </a:rPr>
+              <a:t>thấp</a:t>
+            </a:r>
+            <a:r>
+              <a:rPr lang="en-US" dirty="0">
+                <a:latin typeface="Helvetica Neue"/>
+              </a:rPr>
+              <a:t> </a:t>
+            </a:r>
+            <a:r>
+              <a:rPr lang="en-US" dirty="0" err="1">
+                <a:latin typeface="Helvetica Neue"/>
+              </a:rPr>
+              <a:t>nhất</a:t>
+            </a:r>
+            <a:r>
+              <a:rPr lang="en-US" dirty="0">
+                <a:latin typeface="Helvetica Neue"/>
+              </a:rPr>
+              <a:t> </a:t>
+            </a:r>
+            <a:r>
+              <a:rPr lang="en-US" dirty="0" err="1">
+                <a:latin typeface="Helvetica Neue"/>
+              </a:rPr>
+              <a:t>là</a:t>
+            </a:r>
+            <a:r>
+              <a:rPr lang="en-US" dirty="0">
+                <a:latin typeface="Helvetica Neue"/>
+              </a:rPr>
+              <a:t> </a:t>
+            </a:r>
+            <a:r>
+              <a:rPr lang="en-US" dirty="0">
+                <a:solidFill>
+                  <a:srgbClr val="FF0000"/>
+                </a:solidFill>
+                <a:latin typeface="Helvetica Neue"/>
+              </a:rPr>
+              <a:t>58.66%, </a:t>
+            </a:r>
+            <a:r>
+              <a:rPr lang="en-US" dirty="0" err="1">
+                <a:latin typeface="Helvetica Neue"/>
+              </a:rPr>
+              <a:t>với</a:t>
+            </a:r>
+            <a:r>
+              <a:rPr lang="en-US" dirty="0">
+                <a:latin typeface="Helvetica Neue"/>
+              </a:rPr>
+              <a:t> </a:t>
+            </a:r>
+            <a:r>
+              <a:rPr lang="en-US" dirty="0" err="1">
+                <a:solidFill>
+                  <a:srgbClr val="00B050"/>
+                </a:solidFill>
+                <a:latin typeface="Helvetica Neue"/>
+              </a:rPr>
+              <a:t>month_to_season</a:t>
+            </a:r>
+            <a:r>
+              <a:rPr lang="en-US" dirty="0">
+                <a:solidFill>
+                  <a:srgbClr val="00B050"/>
+                </a:solidFill>
+                <a:latin typeface="Helvetica Neue"/>
+              </a:rPr>
+              <a:t> = False, </a:t>
+            </a:r>
+            <a:r>
+              <a:rPr lang="en-US" dirty="0" err="1">
+                <a:solidFill>
+                  <a:srgbClr val="00B050"/>
+                </a:solidFill>
+                <a:latin typeface="Helvetica Neue"/>
+              </a:rPr>
+              <a:t>year_to_period</a:t>
+            </a:r>
+            <a:r>
+              <a:rPr lang="en-US" dirty="0">
+                <a:solidFill>
+                  <a:srgbClr val="00B050"/>
+                </a:solidFill>
+                <a:latin typeface="Helvetica Neue"/>
+              </a:rPr>
+              <a:t> = False </a:t>
+            </a:r>
+            <a:r>
+              <a:rPr lang="en-US" dirty="0" err="1">
+                <a:solidFill>
+                  <a:srgbClr val="00B050"/>
+                </a:solidFill>
+                <a:latin typeface="Helvetica Neue"/>
+              </a:rPr>
+              <a:t>và</a:t>
+            </a:r>
+            <a:r>
+              <a:rPr lang="en-US" dirty="0">
+                <a:solidFill>
+                  <a:srgbClr val="00B050"/>
+                </a:solidFill>
+                <a:latin typeface="Helvetica Neue"/>
+              </a:rPr>
+              <a:t> </a:t>
+            </a:r>
+            <a:r>
+              <a:rPr lang="en-US" dirty="0" err="1">
+                <a:solidFill>
+                  <a:srgbClr val="00B050"/>
+                </a:solidFill>
+                <a:latin typeface="Helvetica Neue"/>
+              </a:rPr>
+              <a:t>num_top_types</a:t>
+            </a:r>
+            <a:r>
+              <a:rPr lang="en-US" dirty="0">
+                <a:solidFill>
+                  <a:srgbClr val="00B050"/>
+                </a:solidFill>
+                <a:latin typeface="Helvetica Neue"/>
+              </a:rPr>
+              <a:t> = 11</a:t>
+            </a:r>
+            <a:r>
+              <a:rPr lang="en-US" dirty="0">
+                <a:latin typeface="Helvetica Neue"/>
+              </a:rPr>
+              <a:t>.</a:t>
+            </a:r>
+          </a:p>
+        </p:txBody>
+      </p:sp>
+    </p:spTree>
+    <p:extLst>
+      <p:ext uri="{BB962C8B-B14F-4D97-AF65-F5344CB8AC3E}">
+        <p14:creationId xmlns:p14="http://schemas.microsoft.com/office/powerpoint/2010/main" val="2118345360"/>
+      </p:ext>
+    </p:extLst>
+  </p:cSld>
+  <p:clrMapOvr>
+    <a:masterClrMapping/>
+  </p:clrMapOvr>
+</p:sld>
+</file>
+
+<file path=ppt/slides/slide19.xml><?xml version="1.0" encoding="utf-8"?>
 <p:sld xmlns:a="http://schemas.openxmlformats.org/drawingml/2006/main" xmlns:r="http://schemas.openxmlformats.org/officeDocument/2006/relationships" xmlns:p="http://schemas.openxmlformats.org/presentationml/2006/main">
   <p:cSld>
     <p:bg>
@@ -24000,7 +26615,7 @@
             <a:fld id="{D57F1E4F-1CFF-5643-939E-217C01CDF565}" type="slidenum">
               <a:rPr lang="en-US" smtClean="0"/>
               <a:pPr/>
-              <a:t>18</a:t>
+              <a:t>19</a:t>
             </a:fld>
             <a:endParaRPr lang="en-US" dirty="0"/>
           </a:p>
@@ -24010,232 +26625,6 @@
     <p:extLst>
       <p:ext uri="{BB962C8B-B14F-4D97-AF65-F5344CB8AC3E}">
         <p14:creationId xmlns:p14="http://schemas.microsoft.com/office/powerpoint/2010/main" val="2132395915"/>
-      </p:ext>
-    </p:extLst>
-  </p:cSld>
-  <p:clrMapOvr>
-    <a:masterClrMapping/>
-  </p:clrMapOvr>
-</p:sld>
-</file>
-
-<file path=ppt/slides/slide19.xml><?xml version="1.0" encoding="utf-8"?>
-<p:sld xmlns:a="http://schemas.openxmlformats.org/drawingml/2006/main" xmlns:r="http://schemas.openxmlformats.org/officeDocument/2006/relationships" xmlns:p="http://schemas.openxmlformats.org/presentationml/2006/main">
-  <p:cSld>
-    <p:spTree>
-      <p:nvGrpSpPr>
-        <p:cNvPr id="1" name=""/>
-        <p:cNvGrpSpPr/>
-        <p:nvPr/>
-      </p:nvGrpSpPr>
-      <p:grpSpPr>
-        <a:xfrm>
-          <a:off x="0" y="0"/>
-          <a:ext cx="0" cy="0"/>
-          <a:chOff x="0" y="0"/>
-          <a:chExt cx="0" cy="0"/>
-        </a:xfrm>
-      </p:grpSpPr>
-      <p:sp>
-        <p:nvSpPr>
-          <p:cNvPr id="5" name="Title 3">
-            <a:extLst>
-              <a:ext uri="{FF2B5EF4-FFF2-40B4-BE49-F238E27FC236}">
-                <a16:creationId xmlns:a16="http://schemas.microsoft.com/office/drawing/2014/main" id="{19108840-FFCC-42C7-88AD-7039908F3F4D}"/>
-              </a:ext>
-            </a:extLst>
-          </p:cNvPr>
-          <p:cNvSpPr>
-            <a:spLocks noGrp="1"/>
-          </p:cNvSpPr>
-          <p:nvPr>
-            <p:ph type="title"/>
-          </p:nvPr>
-        </p:nvSpPr>
-        <p:spPr>
-          <a:xfrm>
-            <a:off x="675250" y="5474331"/>
-            <a:ext cx="9929936" cy="689514"/>
-          </a:xfrm>
-        </p:spPr>
-        <p:txBody>
-          <a:bodyPr>
-            <a:noAutofit/>
-          </a:bodyPr>
-          <a:lstStyle/>
-          <a:p>
-            <a:pPr algn="r"/>
-            <a:r>
-              <a:rPr lang="en-US" sz="2400" b="1" dirty="0" err="1">
-                <a:solidFill>
-                  <a:schemeClr val="bg1"/>
-                </a:solidFill>
-                <a:latin typeface="Calibri (Body)"/>
-              </a:rPr>
-              <a:t>Mô</a:t>
-            </a:r>
-            <a:r>
-              <a:rPr lang="en-US" sz="2400" b="1" dirty="0">
-                <a:solidFill>
-                  <a:schemeClr val="bg1"/>
-                </a:solidFill>
-                <a:latin typeface="Calibri (Body)"/>
-              </a:rPr>
-              <a:t> </a:t>
-            </a:r>
-            <a:r>
-              <a:rPr lang="en-US" sz="2400" b="1" dirty="0" err="1">
-                <a:solidFill>
-                  <a:schemeClr val="bg1"/>
-                </a:solidFill>
-                <a:latin typeface="Calibri (Body)"/>
-              </a:rPr>
-              <a:t>hình</a:t>
-            </a:r>
-            <a:r>
-              <a:rPr lang="en-US" sz="2400" b="1" dirty="0">
-                <a:solidFill>
-                  <a:schemeClr val="bg1"/>
-                </a:solidFill>
-                <a:latin typeface="Calibri (Body)"/>
-              </a:rPr>
-              <a:t> </a:t>
-            </a:r>
-            <a:r>
-              <a:rPr lang="en-US" sz="2400" b="1" dirty="0" err="1">
-                <a:solidFill>
-                  <a:schemeClr val="bg1"/>
-                </a:solidFill>
-                <a:latin typeface="Calibri (Body)"/>
-              </a:rPr>
-              <a:t>hóa</a:t>
-            </a:r>
-            <a:r>
-              <a:rPr lang="en-US" sz="2400" b="1" dirty="0">
-                <a:solidFill>
-                  <a:schemeClr val="bg1"/>
-                </a:solidFill>
-                <a:latin typeface="Calibri (Body)"/>
-              </a:rPr>
-              <a:t> </a:t>
-            </a:r>
-            <a:r>
-              <a:rPr lang="en-US" sz="2400" b="1" dirty="0" err="1">
-                <a:solidFill>
-                  <a:schemeClr val="bg1"/>
-                </a:solidFill>
-                <a:latin typeface="Calibri (Body)"/>
-              </a:rPr>
-              <a:t>dữ</a:t>
-            </a:r>
-            <a:r>
-              <a:rPr lang="en-US" sz="2400" b="1" dirty="0">
-                <a:solidFill>
-                  <a:schemeClr val="bg1"/>
-                </a:solidFill>
-                <a:latin typeface="Calibri (Body)"/>
-              </a:rPr>
-              <a:t> </a:t>
-            </a:r>
-            <a:r>
-              <a:rPr lang="en-US" sz="2400" b="1" dirty="0" err="1">
-                <a:solidFill>
-                  <a:schemeClr val="bg1"/>
-                </a:solidFill>
-                <a:latin typeface="Calibri (Body)"/>
-              </a:rPr>
-              <a:t>liệu</a:t>
-            </a:r>
-            <a:endParaRPr lang="en-US" sz="2400" b="1" dirty="0">
-              <a:solidFill>
-                <a:schemeClr val="bg1"/>
-              </a:solidFill>
-              <a:latin typeface="Calibri (Body)"/>
-            </a:endParaRPr>
-          </a:p>
-        </p:txBody>
-      </p:sp>
-      <p:sp>
-        <p:nvSpPr>
-          <p:cNvPr id="14" name="Slide Number Placeholder 13">
-            <a:extLst>
-              <a:ext uri="{FF2B5EF4-FFF2-40B4-BE49-F238E27FC236}">
-                <a16:creationId xmlns:a16="http://schemas.microsoft.com/office/drawing/2014/main" id="{980EF428-8355-4A47-B751-792490A6FC45}"/>
-              </a:ext>
-            </a:extLst>
-          </p:cNvPr>
-          <p:cNvSpPr>
-            <a:spLocks noGrp="1"/>
-          </p:cNvSpPr>
-          <p:nvPr>
-            <p:ph type="sldNum" sz="quarter" idx="12"/>
-          </p:nvPr>
-        </p:nvSpPr>
-        <p:spPr/>
-        <p:txBody>
-          <a:bodyPr/>
-          <a:lstStyle/>
-          <a:p>
-            <a:fld id="{D57F1E4F-1CFF-5643-939E-217C01CDF565}" type="slidenum">
-              <a:rPr lang="en-US" smtClean="0"/>
-              <a:pPr/>
-              <a:t>19</a:t>
-            </a:fld>
-            <a:endParaRPr lang="en-US" dirty="0"/>
-          </a:p>
-        </p:txBody>
-      </p:sp>
-      <p:pic>
-        <p:nvPicPr>
-          <p:cNvPr id="7" name="Picture 12" descr="Related image">
-            <a:extLst>
-              <a:ext uri="{FF2B5EF4-FFF2-40B4-BE49-F238E27FC236}">
-                <a16:creationId xmlns:a16="http://schemas.microsoft.com/office/drawing/2014/main" id="{C9CA41F6-E708-45F5-829B-6B8F1FFCD662}"/>
-              </a:ext>
-            </a:extLst>
-          </p:cNvPr>
-          <p:cNvPicPr>
-            <a:picLocks noChangeAspect="1" noChangeArrowheads="1"/>
-          </p:cNvPicPr>
-          <p:nvPr/>
-        </p:nvPicPr>
-        <p:blipFill>
-          <a:blip r:embed="rId3">
-            <a:extLst>
-              <a:ext uri="{28A0092B-C50C-407E-A947-70E740481C1C}">
-                <a14:useLocalDpi xmlns:a14="http://schemas.microsoft.com/office/drawing/2010/main" val="0"/>
-              </a:ext>
-            </a:extLst>
-          </a:blip>
-          <a:srcRect/>
-          <a:stretch>
-            <a:fillRect/>
-          </a:stretch>
-        </p:blipFill>
-        <p:spPr bwMode="auto">
-          <a:xfrm>
-            <a:off x="10605186" y="5255500"/>
-            <a:ext cx="1052509" cy="1061860"/>
-          </a:xfrm>
-          <a:prstGeom prst="rect">
-            <a:avLst/>
-          </a:prstGeom>
-          <a:noFill/>
-          <a:extLst>
-            <a:ext uri="{909E8E84-426E-40DD-AFC4-6F175D3DCCD1}">
-              <a14:hiddenFill xmlns:a14="http://schemas.microsoft.com/office/drawing/2010/main">
-                <a:solidFill>
-                  <a:srgbClr val="FFFFFF"/>
-                </a:solidFill>
-              </a14:hiddenFill>
-            </a:ext>
-          </a:extLst>
-        </p:spPr>
-      </p:pic>
-    </p:spTree>
-    <p:extLst>
-      <p:ext uri="{BB962C8B-B14F-4D97-AF65-F5344CB8AC3E}">
-        <p14:creationId xmlns:p14="http://schemas.microsoft.com/office/powerpoint/2010/main" val="2563927765"/>
       </p:ext>
     </p:extLst>
   </p:cSld>
@@ -24920,6 +27309,232 @@
 </file>
 
 <file path=ppt/slides/slide20.xml><?xml version="1.0" encoding="utf-8"?>
+<p:sld xmlns:a="http://schemas.openxmlformats.org/drawingml/2006/main" xmlns:r="http://schemas.openxmlformats.org/officeDocument/2006/relationships" xmlns:p="http://schemas.openxmlformats.org/presentationml/2006/main">
+  <p:cSld>
+    <p:spTree>
+      <p:nvGrpSpPr>
+        <p:cNvPr id="1" name=""/>
+        <p:cNvGrpSpPr/>
+        <p:nvPr/>
+      </p:nvGrpSpPr>
+      <p:grpSpPr>
+        <a:xfrm>
+          <a:off x="0" y="0"/>
+          <a:ext cx="0" cy="0"/>
+          <a:chOff x="0" y="0"/>
+          <a:chExt cx="0" cy="0"/>
+        </a:xfrm>
+      </p:grpSpPr>
+      <p:sp>
+        <p:nvSpPr>
+          <p:cNvPr id="5" name="Title 3">
+            <a:extLst>
+              <a:ext uri="{FF2B5EF4-FFF2-40B4-BE49-F238E27FC236}">
+                <a16:creationId xmlns:a16="http://schemas.microsoft.com/office/drawing/2014/main" id="{19108840-FFCC-42C7-88AD-7039908F3F4D}"/>
+              </a:ext>
+            </a:extLst>
+          </p:cNvPr>
+          <p:cNvSpPr>
+            <a:spLocks noGrp="1"/>
+          </p:cNvSpPr>
+          <p:nvPr>
+            <p:ph type="title"/>
+          </p:nvPr>
+        </p:nvSpPr>
+        <p:spPr>
+          <a:xfrm>
+            <a:off x="675250" y="5474331"/>
+            <a:ext cx="9929936" cy="689514"/>
+          </a:xfrm>
+        </p:spPr>
+        <p:txBody>
+          <a:bodyPr>
+            <a:noAutofit/>
+          </a:bodyPr>
+          <a:lstStyle/>
+          <a:p>
+            <a:pPr algn="r"/>
+            <a:r>
+              <a:rPr lang="en-US" sz="2400" b="1" dirty="0" err="1">
+                <a:solidFill>
+                  <a:schemeClr val="bg1"/>
+                </a:solidFill>
+                <a:latin typeface="Calibri (Body)"/>
+              </a:rPr>
+              <a:t>Mô</a:t>
+            </a:r>
+            <a:r>
+              <a:rPr lang="en-US" sz="2400" b="1" dirty="0">
+                <a:solidFill>
+                  <a:schemeClr val="bg1"/>
+                </a:solidFill>
+                <a:latin typeface="Calibri (Body)"/>
+              </a:rPr>
+              <a:t> </a:t>
+            </a:r>
+            <a:r>
+              <a:rPr lang="en-US" sz="2400" b="1" dirty="0" err="1">
+                <a:solidFill>
+                  <a:schemeClr val="bg1"/>
+                </a:solidFill>
+                <a:latin typeface="Calibri (Body)"/>
+              </a:rPr>
+              <a:t>hình</a:t>
+            </a:r>
+            <a:r>
+              <a:rPr lang="en-US" sz="2400" b="1" dirty="0">
+                <a:solidFill>
+                  <a:schemeClr val="bg1"/>
+                </a:solidFill>
+                <a:latin typeface="Calibri (Body)"/>
+              </a:rPr>
+              <a:t> </a:t>
+            </a:r>
+            <a:r>
+              <a:rPr lang="en-US" sz="2400" b="1" dirty="0" err="1">
+                <a:solidFill>
+                  <a:schemeClr val="bg1"/>
+                </a:solidFill>
+                <a:latin typeface="Calibri (Body)"/>
+              </a:rPr>
+              <a:t>hóa</a:t>
+            </a:r>
+            <a:r>
+              <a:rPr lang="en-US" sz="2400" b="1" dirty="0">
+                <a:solidFill>
+                  <a:schemeClr val="bg1"/>
+                </a:solidFill>
+                <a:latin typeface="Calibri (Body)"/>
+              </a:rPr>
+              <a:t> </a:t>
+            </a:r>
+            <a:r>
+              <a:rPr lang="en-US" sz="2400" b="1" dirty="0" err="1">
+                <a:solidFill>
+                  <a:schemeClr val="bg1"/>
+                </a:solidFill>
+                <a:latin typeface="Calibri (Body)"/>
+              </a:rPr>
+              <a:t>dữ</a:t>
+            </a:r>
+            <a:r>
+              <a:rPr lang="en-US" sz="2400" b="1" dirty="0">
+                <a:solidFill>
+                  <a:schemeClr val="bg1"/>
+                </a:solidFill>
+                <a:latin typeface="Calibri (Body)"/>
+              </a:rPr>
+              <a:t> </a:t>
+            </a:r>
+            <a:r>
+              <a:rPr lang="en-US" sz="2400" b="1" dirty="0" err="1">
+                <a:solidFill>
+                  <a:schemeClr val="bg1"/>
+                </a:solidFill>
+                <a:latin typeface="Calibri (Body)"/>
+              </a:rPr>
+              <a:t>liệu</a:t>
+            </a:r>
+            <a:endParaRPr lang="en-US" sz="2400" b="1" dirty="0">
+              <a:solidFill>
+                <a:schemeClr val="bg1"/>
+              </a:solidFill>
+              <a:latin typeface="Calibri (Body)"/>
+            </a:endParaRPr>
+          </a:p>
+        </p:txBody>
+      </p:sp>
+      <p:sp>
+        <p:nvSpPr>
+          <p:cNvPr id="14" name="Slide Number Placeholder 13">
+            <a:extLst>
+              <a:ext uri="{FF2B5EF4-FFF2-40B4-BE49-F238E27FC236}">
+                <a16:creationId xmlns:a16="http://schemas.microsoft.com/office/drawing/2014/main" id="{980EF428-8355-4A47-B751-792490A6FC45}"/>
+              </a:ext>
+            </a:extLst>
+          </p:cNvPr>
+          <p:cNvSpPr>
+            <a:spLocks noGrp="1"/>
+          </p:cNvSpPr>
+          <p:nvPr>
+            <p:ph type="sldNum" sz="quarter" idx="12"/>
+          </p:nvPr>
+        </p:nvSpPr>
+        <p:spPr/>
+        <p:txBody>
+          <a:bodyPr/>
+          <a:lstStyle/>
+          <a:p>
+            <a:fld id="{D57F1E4F-1CFF-5643-939E-217C01CDF565}" type="slidenum">
+              <a:rPr lang="en-US" smtClean="0"/>
+              <a:pPr/>
+              <a:t>20</a:t>
+            </a:fld>
+            <a:endParaRPr lang="en-US" dirty="0"/>
+          </a:p>
+        </p:txBody>
+      </p:sp>
+      <p:pic>
+        <p:nvPicPr>
+          <p:cNvPr id="7" name="Picture 12" descr="Related image">
+            <a:extLst>
+              <a:ext uri="{FF2B5EF4-FFF2-40B4-BE49-F238E27FC236}">
+                <a16:creationId xmlns:a16="http://schemas.microsoft.com/office/drawing/2014/main" id="{C9CA41F6-E708-45F5-829B-6B8F1FFCD662}"/>
+              </a:ext>
+            </a:extLst>
+          </p:cNvPr>
+          <p:cNvPicPr>
+            <a:picLocks noChangeAspect="1" noChangeArrowheads="1"/>
+          </p:cNvPicPr>
+          <p:nvPr/>
+        </p:nvPicPr>
+        <p:blipFill>
+          <a:blip r:embed="rId3">
+            <a:extLst>
+              <a:ext uri="{28A0092B-C50C-407E-A947-70E740481C1C}">
+                <a14:useLocalDpi xmlns:a14="http://schemas.microsoft.com/office/drawing/2010/main" val="0"/>
+              </a:ext>
+            </a:extLst>
+          </a:blip>
+          <a:srcRect/>
+          <a:stretch>
+            <a:fillRect/>
+          </a:stretch>
+        </p:blipFill>
+        <p:spPr bwMode="auto">
+          <a:xfrm>
+            <a:off x="10605186" y="5255500"/>
+            <a:ext cx="1052509" cy="1061860"/>
+          </a:xfrm>
+          <a:prstGeom prst="rect">
+            <a:avLst/>
+          </a:prstGeom>
+          <a:noFill/>
+          <a:extLst>
+            <a:ext uri="{909E8E84-426E-40DD-AFC4-6F175D3DCCD1}">
+              <a14:hiddenFill xmlns:a14="http://schemas.microsoft.com/office/drawing/2010/main">
+                <a:solidFill>
+                  <a:srgbClr val="FFFFFF"/>
+                </a:solidFill>
+              </a14:hiddenFill>
+            </a:ext>
+          </a:extLst>
+        </p:spPr>
+      </p:pic>
+    </p:spTree>
+    <p:extLst>
+      <p:ext uri="{BB962C8B-B14F-4D97-AF65-F5344CB8AC3E}">
+        <p14:creationId xmlns:p14="http://schemas.microsoft.com/office/powerpoint/2010/main" val="2563927765"/>
+      </p:ext>
+    </p:extLst>
+  </p:cSld>
+  <p:clrMapOvr>
+    <a:masterClrMapping/>
+  </p:clrMapOvr>
+</p:sld>
+</file>
+
+<file path=ppt/slides/slide21.xml><?xml version="1.0" encoding="utf-8"?>
 <p:sld xmlns:a="http://schemas.openxmlformats.org/drawingml/2006/main" xmlns:r="http://schemas.openxmlformats.org/officeDocument/2006/relationships" xmlns:p="http://schemas.openxmlformats.org/presentationml/2006/main">
   <p:cSld>
     <p:bg>
@@ -25244,7 +27859,7 @@
             <a:fld id="{D57F1E4F-1CFF-5643-939E-217C01CDF565}" type="slidenum">
               <a:rPr lang="en-US" smtClean="0"/>
               <a:pPr/>
-              <a:t>20</a:t>
+              <a:t>21</a:t>
             </a:fld>
             <a:endParaRPr lang="en-US" dirty="0"/>
           </a:p>
@@ -25263,7 +27878,7 @@
 </p:sld>
 </file>
 
-<file path=ppt/slides/slide21.xml><?xml version="1.0" encoding="utf-8"?>
+<file path=ppt/slides/slide22.xml><?xml version="1.0" encoding="utf-8"?>
 <p:sld xmlns:a="http://schemas.openxmlformats.org/drawingml/2006/main" xmlns:r="http://schemas.openxmlformats.org/officeDocument/2006/relationships" xmlns:p="http://schemas.openxmlformats.org/presentationml/2006/main">
   <p:cSld>
     <p:bg>
@@ -25578,7 +28193,7 @@
             <a:fld id="{D57F1E4F-1CFF-5643-939E-217C01CDF565}" type="slidenum">
               <a:rPr lang="en-US" smtClean="0"/>
               <a:pPr/>
-              <a:t>21</a:t>
+              <a:t>22</a:t>
             </a:fld>
             <a:endParaRPr lang="en-US" dirty="0"/>
           </a:p>

</xml_diff>

<commit_message>
done model K-Neighbors Regressor
</commit_message>
<xml_diff>
--- a/report-slide/BaoCaoCuoiKy_DS.pptx
+++ b/report-slide/BaoCaoCuoiKy_DS.pptx
@@ -5,10 +5,10 @@
     <p:sldMasterId id="2147483648" r:id="rId1"/>
   </p:sldMasterIdLst>
   <p:notesMasterIdLst>
-    <p:notesMasterId r:id="rId24"/>
+    <p:notesMasterId r:id="rId25"/>
   </p:notesMasterIdLst>
   <p:handoutMasterIdLst>
-    <p:handoutMasterId r:id="rId25"/>
+    <p:handoutMasterId r:id="rId26"/>
   </p:handoutMasterIdLst>
   <p:sldIdLst>
     <p:sldId id="256" r:id="rId2"/>
@@ -29,10 +29,11 @@
     <p:sldId id="299" r:id="rId17"/>
     <p:sldId id="294" r:id="rId18"/>
     <p:sldId id="300" r:id="rId19"/>
-    <p:sldId id="297" r:id="rId20"/>
-    <p:sldId id="295" r:id="rId21"/>
-    <p:sldId id="298" r:id="rId22"/>
-    <p:sldId id="273" r:id="rId23"/>
+    <p:sldId id="301" r:id="rId20"/>
+    <p:sldId id="297" r:id="rId21"/>
+    <p:sldId id="295" r:id="rId22"/>
+    <p:sldId id="298" r:id="rId23"/>
+    <p:sldId id="273" r:id="rId24"/>
   </p:sldIdLst>
   <p:sldSz cx="12192000" cy="6858000"/>
   <p:notesSz cx="6858000" cy="9144000"/>
@@ -3895,7 +3896,7 @@
     </p:spTree>
     <p:extLst>
       <p:ext uri="{BB962C8B-B14F-4D97-AF65-F5344CB8AC3E}">
-        <p14:creationId xmlns:p14="http://schemas.microsoft.com/office/powerpoint/2010/main" val="573627637"/>
+        <p14:creationId xmlns:p14="http://schemas.microsoft.com/office/powerpoint/2010/main" val="1256343594"/>
       </p:ext>
     </p:extLst>
   </p:cSld>
@@ -3998,7 +3999,7 @@
     </p:spTree>
     <p:extLst>
       <p:ext uri="{BB962C8B-B14F-4D97-AF65-F5344CB8AC3E}">
-        <p14:creationId xmlns:p14="http://schemas.microsoft.com/office/powerpoint/2010/main" val="2813689372"/>
+        <p14:creationId xmlns:p14="http://schemas.microsoft.com/office/powerpoint/2010/main" val="573627637"/>
       </p:ext>
     </p:extLst>
   </p:cSld>
@@ -4093,6 +4094,109 @@
             <a:fld id="{AB2EF4F0-B01F-49F6-8BE3-F23017C9D067}" type="slidenum">
               <a:rPr lang="en-US" smtClean="0"/>
               <a:t>21</a:t>
+            </a:fld>
+            <a:endParaRPr lang="en-US"/>
+          </a:p>
+        </p:txBody>
+      </p:sp>
+    </p:spTree>
+    <p:extLst>
+      <p:ext uri="{BB962C8B-B14F-4D97-AF65-F5344CB8AC3E}">
+        <p14:creationId xmlns:p14="http://schemas.microsoft.com/office/powerpoint/2010/main" val="2813689372"/>
+      </p:ext>
+    </p:extLst>
+  </p:cSld>
+  <p:clrMapOvr>
+    <a:masterClrMapping/>
+  </p:clrMapOvr>
+</p:notes>
+</file>
+
+<file path=ppt/notesSlides/notesSlide19.xml><?xml version="1.0" encoding="utf-8"?>
+<p:notes xmlns:a="http://schemas.openxmlformats.org/drawingml/2006/main" xmlns:r="http://schemas.openxmlformats.org/officeDocument/2006/relationships" xmlns:p="http://schemas.openxmlformats.org/presentationml/2006/main">
+  <p:cSld>
+    <p:spTree>
+      <p:nvGrpSpPr>
+        <p:cNvPr id="1" name=""/>
+        <p:cNvGrpSpPr/>
+        <p:nvPr/>
+      </p:nvGrpSpPr>
+      <p:grpSpPr>
+        <a:xfrm>
+          <a:off x="0" y="0"/>
+          <a:ext cx="0" cy="0"/>
+          <a:chOff x="0" y="0"/>
+          <a:chExt cx="0" cy="0"/>
+        </a:xfrm>
+      </p:grpSpPr>
+      <p:sp>
+        <p:nvSpPr>
+          <p:cNvPr id="2" name="Slide Image Placeholder 1"/>
+          <p:cNvSpPr>
+            <a:spLocks noGrp="1" noRot="1" noChangeAspect="1"/>
+          </p:cNvSpPr>
+          <p:nvPr>
+            <p:ph type="sldImg"/>
+          </p:nvPr>
+        </p:nvSpPr>
+        <p:spPr/>
+      </p:sp>
+      <p:sp>
+        <p:nvSpPr>
+          <p:cNvPr id="3" name="Notes Placeholder 2"/>
+          <p:cNvSpPr>
+            <a:spLocks noGrp="1"/>
+          </p:cNvSpPr>
+          <p:nvPr>
+            <p:ph type="body" idx="1"/>
+          </p:nvPr>
+        </p:nvSpPr>
+        <p:spPr/>
+        <p:txBody>
+          <a:bodyPr/>
+          <a:lstStyle/>
+          <a:p>
+            <a:endParaRPr lang="en-US" dirty="0"/>
+          </a:p>
+        </p:txBody>
+      </p:sp>
+      <p:sp>
+        <p:nvSpPr>
+          <p:cNvPr id="4" name="Footer Placeholder 3"/>
+          <p:cNvSpPr>
+            <a:spLocks noGrp="1"/>
+          </p:cNvSpPr>
+          <p:nvPr>
+            <p:ph type="ftr" sz="quarter" idx="4"/>
+          </p:nvPr>
+        </p:nvSpPr>
+        <p:spPr/>
+        <p:txBody>
+          <a:bodyPr/>
+          <a:lstStyle/>
+          <a:p>
+            <a:endParaRPr lang="en-US"/>
+          </a:p>
+        </p:txBody>
+      </p:sp>
+      <p:sp>
+        <p:nvSpPr>
+          <p:cNvPr id="5" name="Slide Number Placeholder 4"/>
+          <p:cNvSpPr>
+            <a:spLocks noGrp="1"/>
+          </p:cNvSpPr>
+          <p:nvPr>
+            <p:ph type="sldNum" sz="quarter" idx="5"/>
+          </p:nvPr>
+        </p:nvSpPr>
+        <p:spPr/>
+        <p:txBody>
+          <a:bodyPr/>
+          <a:lstStyle/>
+          <a:p>
+            <a:fld id="{AB2EF4F0-B01F-49F6-8BE3-F23017C9D067}" type="slidenum">
+              <a:rPr lang="en-US" smtClean="0"/>
+              <a:t>22</a:t>
             </a:fld>
             <a:endParaRPr lang="en-US"/>
           </a:p>
@@ -19113,7 +19217,7 @@
               <a:rPr lang="en-US" dirty="0">
                 <a:latin typeface="Helvetica Neue"/>
               </a:rPr>
-              <a:t>: &lt;1900, [1990; 1950), [1950; 2000], &gt;2000.</a:t>
+              <a:t>: &lt;1900, [1990; 1950), [1950; 2000), &gt;2000.</a:t>
             </a:r>
           </a:p>
           <a:p>
@@ -22947,7 +23051,7 @@
         <p:spPr>
           <a:xfrm>
             <a:off x="473576" y="694155"/>
-            <a:ext cx="850512" cy="740166"/>
+            <a:ext cx="1045508" cy="923330"/>
           </a:xfrm>
           <a:prstGeom prst="rect">
             <a:avLst/>
@@ -22968,8 +23072,8 @@
         </p:nvSpPr>
         <p:spPr>
           <a:xfrm>
-            <a:off x="1324088" y="741072"/>
-            <a:ext cx="10548364" cy="923330"/>
+            <a:off x="1519084" y="741072"/>
+            <a:ext cx="10353368" cy="923330"/>
           </a:xfrm>
           <a:prstGeom prst="rect">
             <a:avLst/>
@@ -23534,6 +23638,42 @@
                 <a:latin typeface="Helvetica Neue"/>
               </a:rPr>
               <a:t> </a:t>
+            </a:r>
+            <a:r>
+              <a:rPr lang="en-US" dirty="0" err="1">
+                <a:solidFill>
+                  <a:srgbClr val="FF0000"/>
+                </a:solidFill>
+                <a:latin typeface="Helvetica Neue"/>
+              </a:rPr>
+              <a:t>trên</a:t>
+            </a:r>
+            <a:r>
+              <a:rPr lang="en-US" dirty="0">
+                <a:solidFill>
+                  <a:srgbClr val="FF0000"/>
+                </a:solidFill>
+                <a:latin typeface="Helvetica Neue"/>
+              </a:rPr>
+              <a:t> </a:t>
+            </a:r>
+            <a:r>
+              <a:rPr lang="en-US" dirty="0" err="1">
+                <a:solidFill>
+                  <a:srgbClr val="FF0000"/>
+                </a:solidFill>
+                <a:latin typeface="Helvetica Neue"/>
+              </a:rPr>
+              <a:t>tập</a:t>
+            </a:r>
+            <a:r>
+              <a:rPr lang="en-US" dirty="0">
+                <a:solidFill>
+                  <a:srgbClr val="FF0000"/>
+                </a:solidFill>
+                <a:latin typeface="Helvetica Neue"/>
+              </a:rPr>
+              <a:t> validation </a:t>
             </a:r>
             <a:r>
               <a:rPr lang="en-US" dirty="0" err="1">
@@ -23608,7 +23748,7 @@
         </p:blipFill>
         <p:spPr>
           <a:xfrm>
-            <a:off x="10357596" y="1952639"/>
+            <a:off x="10357596" y="2041127"/>
             <a:ext cx="1308149" cy="1079781"/>
           </a:xfrm>
           <a:prstGeom prst="rect">
@@ -23630,7 +23770,7 @@
         </p:nvSpPr>
         <p:spPr>
           <a:xfrm>
-            <a:off x="473577" y="2123197"/>
+            <a:off x="473577" y="2211685"/>
             <a:ext cx="9884020" cy="646331"/>
           </a:xfrm>
           <a:prstGeom prst="rect">
@@ -24327,8 +24467,8 @@
         </p:blipFill>
         <p:spPr>
           <a:xfrm>
-            <a:off x="473576" y="3429000"/>
-            <a:ext cx="1221503" cy="1255912"/>
+            <a:off x="675250" y="3651235"/>
+            <a:ext cx="1019829" cy="1048557"/>
           </a:xfrm>
           <a:prstGeom prst="rect">
             <a:avLst/>
@@ -24933,6 +25073,42 @@
                 <a:latin typeface="Helvetica Neue"/>
               </a:rPr>
               <a:t> </a:t>
+            </a:r>
+            <a:r>
+              <a:rPr lang="en-US" dirty="0" err="1">
+                <a:solidFill>
+                  <a:srgbClr val="00B050"/>
+                </a:solidFill>
+                <a:latin typeface="Helvetica Neue"/>
+              </a:rPr>
+              <a:t>trên</a:t>
+            </a:r>
+            <a:r>
+              <a:rPr lang="en-US" dirty="0">
+                <a:solidFill>
+                  <a:srgbClr val="00B050"/>
+                </a:solidFill>
+                <a:latin typeface="Helvetica Neue"/>
+              </a:rPr>
+              <a:t> </a:t>
+            </a:r>
+            <a:r>
+              <a:rPr lang="en-US" dirty="0" err="1">
+                <a:solidFill>
+                  <a:srgbClr val="00B050"/>
+                </a:solidFill>
+                <a:latin typeface="Helvetica Neue"/>
+              </a:rPr>
+              <a:t>tập</a:t>
+            </a:r>
+            <a:r>
+              <a:rPr lang="en-US" dirty="0">
+                <a:solidFill>
+                  <a:srgbClr val="00B050"/>
+                </a:solidFill>
+                <a:latin typeface="Helvetica Neue"/>
+              </a:rPr>
+              <a:t> validation </a:t>
             </a:r>
             <a:r>
               <a:rPr lang="en-US" dirty="0" err="1">
@@ -26291,6 +26467,1355 @@
 </file>
 
 <file path=ppt/slides/slide19.xml><?xml version="1.0" encoding="utf-8"?>
+<p:sld xmlns:a="http://schemas.openxmlformats.org/drawingml/2006/main" xmlns:r="http://schemas.openxmlformats.org/officeDocument/2006/relationships" xmlns:p="http://schemas.openxmlformats.org/presentationml/2006/main">
+  <p:cSld>
+    <p:spTree>
+      <p:nvGrpSpPr>
+        <p:cNvPr id="1" name=""/>
+        <p:cNvGrpSpPr/>
+        <p:nvPr/>
+      </p:nvGrpSpPr>
+      <p:grpSpPr>
+        <a:xfrm>
+          <a:off x="0" y="0"/>
+          <a:ext cx="0" cy="0"/>
+          <a:chOff x="0" y="0"/>
+          <a:chExt cx="0" cy="0"/>
+        </a:xfrm>
+      </p:grpSpPr>
+      <p:sp>
+        <p:nvSpPr>
+          <p:cNvPr id="5" name="Title 3">
+            <a:extLst>
+              <a:ext uri="{FF2B5EF4-FFF2-40B4-BE49-F238E27FC236}">
+                <a16:creationId xmlns:a16="http://schemas.microsoft.com/office/drawing/2014/main" id="{19108840-FFCC-42C7-88AD-7039908F3F4D}"/>
+              </a:ext>
+            </a:extLst>
+          </p:cNvPr>
+          <p:cNvSpPr>
+            <a:spLocks noGrp="1"/>
+          </p:cNvSpPr>
+          <p:nvPr>
+            <p:ph type="title"/>
+          </p:nvPr>
+        </p:nvSpPr>
+        <p:spPr>
+          <a:xfrm>
+            <a:off x="675250" y="5474331"/>
+            <a:ext cx="9929936" cy="689514"/>
+          </a:xfrm>
+        </p:spPr>
+        <p:txBody>
+          <a:bodyPr>
+            <a:noAutofit/>
+          </a:bodyPr>
+          <a:lstStyle/>
+          <a:p>
+            <a:pPr algn="r"/>
+            <a:r>
+              <a:rPr lang="en-US" sz="2400" b="1" dirty="0" err="1">
+                <a:solidFill>
+                  <a:schemeClr val="bg1"/>
+                </a:solidFill>
+                <a:latin typeface="Calibri (Body)"/>
+              </a:rPr>
+              <a:t>Mô</a:t>
+            </a:r>
+            <a:r>
+              <a:rPr lang="en-US" sz="2400" b="1" dirty="0">
+                <a:solidFill>
+                  <a:schemeClr val="bg1"/>
+                </a:solidFill>
+                <a:latin typeface="Calibri (Body)"/>
+              </a:rPr>
+              <a:t> </a:t>
+            </a:r>
+            <a:r>
+              <a:rPr lang="en-US" sz="2400" b="1" dirty="0" err="1">
+                <a:solidFill>
+                  <a:schemeClr val="bg1"/>
+                </a:solidFill>
+                <a:latin typeface="Calibri (Body)"/>
+              </a:rPr>
+              <a:t>hình</a:t>
+            </a:r>
+            <a:r>
+              <a:rPr lang="en-US" sz="2400" b="1" dirty="0">
+                <a:solidFill>
+                  <a:schemeClr val="bg1"/>
+                </a:solidFill>
+                <a:latin typeface="Calibri (Body)"/>
+              </a:rPr>
+              <a:t> </a:t>
+            </a:r>
+            <a:r>
+              <a:rPr lang="en-US" sz="2400" b="1" dirty="0" err="1">
+                <a:solidFill>
+                  <a:schemeClr val="bg1"/>
+                </a:solidFill>
+                <a:latin typeface="Calibri (Body)"/>
+              </a:rPr>
+              <a:t>hóa</a:t>
+            </a:r>
+            <a:r>
+              <a:rPr lang="en-US" sz="2400" b="1" dirty="0">
+                <a:solidFill>
+                  <a:schemeClr val="bg1"/>
+                </a:solidFill>
+                <a:latin typeface="Calibri (Body)"/>
+              </a:rPr>
+              <a:t> </a:t>
+            </a:r>
+            <a:r>
+              <a:rPr lang="en-US" sz="2400" b="1" dirty="0" err="1">
+                <a:solidFill>
+                  <a:schemeClr val="bg1"/>
+                </a:solidFill>
+                <a:latin typeface="Calibri (Body)"/>
+              </a:rPr>
+              <a:t>dữ</a:t>
+            </a:r>
+            <a:r>
+              <a:rPr lang="en-US" sz="2400" b="1" dirty="0">
+                <a:solidFill>
+                  <a:schemeClr val="bg1"/>
+                </a:solidFill>
+                <a:latin typeface="Calibri (Body)"/>
+              </a:rPr>
+              <a:t> </a:t>
+            </a:r>
+            <a:r>
+              <a:rPr lang="en-US" sz="2400" b="1" dirty="0" err="1">
+                <a:solidFill>
+                  <a:schemeClr val="bg1"/>
+                </a:solidFill>
+                <a:latin typeface="Calibri (Body)"/>
+              </a:rPr>
+              <a:t>liệu</a:t>
+            </a:r>
+            <a:r>
+              <a:rPr lang="en-US" sz="2400" b="1" dirty="0">
+                <a:solidFill>
+                  <a:schemeClr val="bg1"/>
+                </a:solidFill>
+                <a:latin typeface="Calibri (Body)"/>
+              </a:rPr>
+              <a:t> – K-neighbors regressor</a:t>
+            </a:r>
+          </a:p>
+        </p:txBody>
+      </p:sp>
+      <p:sp>
+        <p:nvSpPr>
+          <p:cNvPr id="14" name="Slide Number Placeholder 13">
+            <a:extLst>
+              <a:ext uri="{FF2B5EF4-FFF2-40B4-BE49-F238E27FC236}">
+                <a16:creationId xmlns:a16="http://schemas.microsoft.com/office/drawing/2014/main" id="{980EF428-8355-4A47-B751-792490A6FC45}"/>
+              </a:ext>
+            </a:extLst>
+          </p:cNvPr>
+          <p:cNvSpPr>
+            <a:spLocks noGrp="1"/>
+          </p:cNvSpPr>
+          <p:nvPr>
+            <p:ph type="sldNum" sz="quarter" idx="12"/>
+          </p:nvPr>
+        </p:nvSpPr>
+        <p:spPr/>
+        <p:txBody>
+          <a:bodyPr/>
+          <a:lstStyle/>
+          <a:p>
+            <a:fld id="{D57F1E4F-1CFF-5643-939E-217C01CDF565}" type="slidenum">
+              <a:rPr lang="en-US" smtClean="0"/>
+              <a:pPr/>
+              <a:t>19</a:t>
+            </a:fld>
+            <a:endParaRPr lang="en-US" dirty="0"/>
+          </a:p>
+        </p:txBody>
+      </p:sp>
+      <p:pic>
+        <p:nvPicPr>
+          <p:cNvPr id="6" name="Picture 10" descr="Image result for model scikit learn icon">
+            <a:extLst>
+              <a:ext uri="{FF2B5EF4-FFF2-40B4-BE49-F238E27FC236}">
+                <a16:creationId xmlns:a16="http://schemas.microsoft.com/office/drawing/2014/main" id="{07C4DCFC-0297-4ECA-8584-DAB16A6A24F3}"/>
+              </a:ext>
+            </a:extLst>
+          </p:cNvPr>
+          <p:cNvPicPr>
+            <a:picLocks noChangeAspect="1" noChangeArrowheads="1"/>
+          </p:cNvPicPr>
+          <p:nvPr/>
+        </p:nvPicPr>
+        <p:blipFill>
+          <a:blip r:embed="rId3">
+            <a:extLst>
+              <a:ext uri="{28A0092B-C50C-407E-A947-70E740481C1C}">
+                <a14:useLocalDpi xmlns:a14="http://schemas.microsoft.com/office/drawing/2010/main" val="0"/>
+              </a:ext>
+            </a:extLst>
+          </a:blip>
+          <a:srcRect/>
+          <a:stretch>
+            <a:fillRect/>
+          </a:stretch>
+        </p:blipFill>
+        <p:spPr bwMode="auto">
+          <a:xfrm>
+            <a:off x="10605186" y="5274129"/>
+            <a:ext cx="1052510" cy="1071214"/>
+          </a:xfrm>
+          <a:prstGeom prst="rect">
+            <a:avLst/>
+          </a:prstGeom>
+          <a:noFill/>
+          <a:extLst>
+            <a:ext uri="{909E8E84-426E-40DD-AFC4-6F175D3DCCD1}">
+              <a14:hiddenFill xmlns:a14="http://schemas.microsoft.com/office/drawing/2010/main">
+                <a:solidFill>
+                  <a:srgbClr val="FFFFFF"/>
+                </a:solidFill>
+              </a14:hiddenFill>
+            </a:ext>
+          </a:extLst>
+        </p:spPr>
+      </p:pic>
+      <p:sp>
+        <p:nvSpPr>
+          <p:cNvPr id="9" name="Rectangle 8">
+            <a:extLst>
+              <a:ext uri="{FF2B5EF4-FFF2-40B4-BE49-F238E27FC236}">
+                <a16:creationId xmlns:a16="http://schemas.microsoft.com/office/drawing/2014/main" id="{6F3BAD20-82C7-424F-9696-162EF8580B1D}"/>
+              </a:ext>
+            </a:extLst>
+          </p:cNvPr>
+          <p:cNvSpPr/>
+          <p:nvPr/>
+        </p:nvSpPr>
+        <p:spPr>
+          <a:xfrm>
+            <a:off x="1186047" y="667808"/>
+            <a:ext cx="5909322" cy="615553"/>
+          </a:xfrm>
+          <a:prstGeom prst="rect">
+            <a:avLst/>
+          </a:prstGeom>
+        </p:spPr>
+        <p:txBody>
+          <a:bodyPr wrap="square">
+            <a:spAutoFit/>
+          </a:bodyPr>
+          <a:lstStyle/>
+          <a:p>
+            <a:pPr algn="ctr"/>
+            <a:r>
+              <a:rPr lang="en-US" dirty="0">
+                <a:solidFill>
+                  <a:srgbClr val="000000"/>
+                </a:solidFill>
+                <a:latin typeface="Helvetica Neue"/>
+              </a:rPr>
+              <a:t>K-Neighbors Regressor</a:t>
+            </a:r>
+          </a:p>
+          <a:p>
+            <a:pPr algn="ctr"/>
+            <a:r>
+              <a:rPr lang="en-US" sz="1600" i="1" dirty="0">
+                <a:solidFill>
+                  <a:srgbClr val="00B050"/>
+                </a:solidFill>
+                <a:latin typeface="Helvetica Neue"/>
+              </a:rPr>
+              <a:t>Case 1: </a:t>
+            </a:r>
+            <a:r>
+              <a:rPr lang="en-US" sz="1600" i="1" dirty="0" err="1">
+                <a:solidFill>
+                  <a:srgbClr val="00B050"/>
+                </a:solidFill>
+                <a:latin typeface="Helvetica Neue"/>
+              </a:rPr>
+              <a:t>month_to_seasons</a:t>
+            </a:r>
+            <a:r>
+              <a:rPr lang="en-US" sz="1600" i="1" dirty="0">
+                <a:solidFill>
+                  <a:srgbClr val="00B050"/>
+                </a:solidFill>
+                <a:latin typeface="Helvetica Neue"/>
+              </a:rPr>
+              <a:t> = True </a:t>
+            </a:r>
+            <a:r>
+              <a:rPr lang="en-US" sz="1600" i="1" dirty="0" err="1">
+                <a:solidFill>
+                  <a:srgbClr val="00B050"/>
+                </a:solidFill>
+                <a:latin typeface="Helvetica Neue"/>
+              </a:rPr>
+              <a:t>và</a:t>
+            </a:r>
+            <a:r>
+              <a:rPr lang="en-US" sz="1600" i="1" dirty="0">
+                <a:solidFill>
+                  <a:srgbClr val="00B050"/>
+                </a:solidFill>
+                <a:latin typeface="Helvetica Neue"/>
+              </a:rPr>
+              <a:t> </a:t>
+            </a:r>
+            <a:r>
+              <a:rPr lang="en-US" sz="1600" i="1" dirty="0" err="1">
+                <a:solidFill>
+                  <a:srgbClr val="00B050"/>
+                </a:solidFill>
+                <a:latin typeface="Helvetica Neue"/>
+              </a:rPr>
+              <a:t>year_to_period</a:t>
+            </a:r>
+            <a:r>
+              <a:rPr lang="en-US" sz="1600" i="1" dirty="0">
+                <a:solidFill>
+                  <a:srgbClr val="00B050"/>
+                </a:solidFill>
+                <a:latin typeface="Helvetica Neue"/>
+              </a:rPr>
+              <a:t> = True</a:t>
+            </a:r>
+          </a:p>
+        </p:txBody>
+      </p:sp>
+      <p:sp>
+        <p:nvSpPr>
+          <p:cNvPr id="10" name="Rectangle 9">
+            <a:extLst>
+              <a:ext uri="{FF2B5EF4-FFF2-40B4-BE49-F238E27FC236}">
+                <a16:creationId xmlns:a16="http://schemas.microsoft.com/office/drawing/2014/main" id="{5E272098-A656-4C79-AED2-23ED5454762B}"/>
+              </a:ext>
+            </a:extLst>
+          </p:cNvPr>
+          <p:cNvSpPr/>
+          <p:nvPr/>
+        </p:nvSpPr>
+        <p:spPr>
+          <a:xfrm>
+            <a:off x="7986447" y="712303"/>
+            <a:ext cx="3443554" cy="646331"/>
+          </a:xfrm>
+          <a:prstGeom prst="rect">
+            <a:avLst/>
+          </a:prstGeom>
+        </p:spPr>
+        <p:txBody>
+          <a:bodyPr wrap="square">
+            <a:spAutoFit/>
+          </a:bodyPr>
+          <a:lstStyle/>
+          <a:p>
+            <a:r>
+              <a:rPr lang="en-US" dirty="0" err="1">
+                <a:solidFill>
+                  <a:srgbClr val="000000"/>
+                </a:solidFill>
+                <a:latin typeface="Helvetica Neue"/>
+              </a:rPr>
+              <a:t>Nhìn</a:t>
+            </a:r>
+            <a:r>
+              <a:rPr lang="en-US" dirty="0">
+                <a:solidFill>
+                  <a:srgbClr val="000000"/>
+                </a:solidFill>
+                <a:latin typeface="Helvetica Neue"/>
+              </a:rPr>
+              <a:t> </a:t>
+            </a:r>
+            <a:r>
+              <a:rPr lang="en-US" dirty="0" err="1">
+                <a:solidFill>
+                  <a:srgbClr val="000000"/>
+                </a:solidFill>
+                <a:latin typeface="Helvetica Neue"/>
+              </a:rPr>
+              <a:t>chung</a:t>
+            </a:r>
+            <a:r>
+              <a:rPr lang="en-US" dirty="0">
+                <a:solidFill>
+                  <a:srgbClr val="000000"/>
+                </a:solidFill>
+                <a:latin typeface="Helvetica Neue"/>
+              </a:rPr>
+              <a:t>:</a:t>
+            </a:r>
+          </a:p>
+          <a:p>
+            <a:r>
+              <a:rPr lang="en-US" dirty="0" err="1">
+                <a:solidFill>
+                  <a:srgbClr val="000000"/>
+                </a:solidFill>
+                <a:latin typeface="Helvetica Neue"/>
+              </a:rPr>
+              <a:t>Num_to_types</a:t>
+            </a:r>
+            <a:r>
+              <a:rPr lang="en-US" dirty="0">
+                <a:solidFill>
+                  <a:srgbClr val="000000"/>
+                </a:solidFill>
+                <a:latin typeface="Helvetica Neue"/>
+              </a:rPr>
+              <a:t> </a:t>
+            </a:r>
+            <a:r>
+              <a:rPr lang="en-US" dirty="0" err="1">
+                <a:solidFill>
+                  <a:srgbClr val="000000"/>
+                </a:solidFill>
+                <a:latin typeface="Helvetica Neue"/>
+              </a:rPr>
+              <a:t>quá</a:t>
+            </a:r>
+            <a:r>
+              <a:rPr lang="en-US" dirty="0">
+                <a:solidFill>
+                  <a:srgbClr val="000000"/>
+                </a:solidFill>
+                <a:latin typeface="Helvetica Neue"/>
+              </a:rPr>
+              <a:t> </a:t>
+            </a:r>
+            <a:r>
+              <a:rPr lang="en-US" dirty="0" err="1">
+                <a:solidFill>
+                  <a:srgbClr val="000000"/>
+                </a:solidFill>
+                <a:latin typeface="Helvetica Neue"/>
+              </a:rPr>
+              <a:t>nhỏ</a:t>
+            </a:r>
+            <a:endParaRPr lang="en-US" dirty="0">
+              <a:solidFill>
+                <a:srgbClr val="000000"/>
+              </a:solidFill>
+              <a:latin typeface="Helvetica Neue"/>
+            </a:endParaRPr>
+          </a:p>
+        </p:txBody>
+      </p:sp>
+      <p:pic>
+        <p:nvPicPr>
+          <p:cNvPr id="3" name="Picture 2">
+            <a:extLst>
+              <a:ext uri="{FF2B5EF4-FFF2-40B4-BE49-F238E27FC236}">
+                <a16:creationId xmlns:a16="http://schemas.microsoft.com/office/drawing/2014/main" id="{53C8F099-5DBF-41E4-85BC-141735D849FC}"/>
+              </a:ext>
+            </a:extLst>
+          </p:cNvPr>
+          <p:cNvPicPr>
+            <a:picLocks noChangeAspect="1"/>
+          </p:cNvPicPr>
+          <p:nvPr/>
+        </p:nvPicPr>
+        <p:blipFill>
+          <a:blip r:embed="rId4"/>
+          <a:stretch>
+            <a:fillRect/>
+          </a:stretch>
+        </p:blipFill>
+        <p:spPr>
+          <a:xfrm>
+            <a:off x="294968" y="1209368"/>
+            <a:ext cx="7691479" cy="3728913"/>
+          </a:xfrm>
+          <a:prstGeom prst="rect">
+            <a:avLst/>
+          </a:prstGeom>
+        </p:spPr>
+      </p:pic>
+      <p:sp>
+        <p:nvSpPr>
+          <p:cNvPr id="17" name="Rectangle 16">
+            <a:extLst>
+              <a:ext uri="{FF2B5EF4-FFF2-40B4-BE49-F238E27FC236}">
+                <a16:creationId xmlns:a16="http://schemas.microsoft.com/office/drawing/2014/main" id="{7F95A680-C557-48F4-A0E1-F14A02A771D8}"/>
+              </a:ext>
+            </a:extLst>
+          </p:cNvPr>
+          <p:cNvSpPr/>
+          <p:nvPr/>
+        </p:nvSpPr>
+        <p:spPr>
+          <a:xfrm>
+            <a:off x="7986447" y="3644035"/>
+            <a:ext cx="3910585" cy="923330"/>
+          </a:xfrm>
+          <a:prstGeom prst="rect">
+            <a:avLst/>
+          </a:prstGeom>
+        </p:spPr>
+        <p:txBody>
+          <a:bodyPr wrap="square">
+            <a:spAutoFit/>
+          </a:bodyPr>
+          <a:lstStyle/>
+          <a:p>
+            <a:pPr>
+              <a:spcAft>
+                <a:spcPts val="600"/>
+              </a:spcAft>
+            </a:pPr>
+            <a:r>
+              <a:rPr lang="en-US" dirty="0">
+                <a:latin typeface="Helvetica Neue"/>
+              </a:rPr>
+              <a:t>Case 1: </a:t>
+            </a:r>
+            <a:r>
+              <a:rPr lang="en-US" dirty="0" err="1">
+                <a:latin typeface="Helvetica Neue"/>
+              </a:rPr>
+              <a:t>độ</a:t>
+            </a:r>
+            <a:r>
+              <a:rPr lang="en-US" dirty="0">
+                <a:latin typeface="Helvetica Neue"/>
+              </a:rPr>
+              <a:t> </a:t>
+            </a:r>
+            <a:r>
+              <a:rPr lang="en-US" dirty="0" err="1">
+                <a:latin typeface="Helvetica Neue"/>
+              </a:rPr>
+              <a:t>lỗi</a:t>
+            </a:r>
+            <a:r>
+              <a:rPr lang="en-US" dirty="0">
+                <a:latin typeface="Helvetica Neue"/>
+              </a:rPr>
+              <a:t> </a:t>
+            </a:r>
+            <a:r>
+              <a:rPr lang="en-US" dirty="0" err="1">
+                <a:latin typeface="Helvetica Neue"/>
+              </a:rPr>
+              <a:t>trên</a:t>
+            </a:r>
+            <a:r>
+              <a:rPr lang="en-US" dirty="0">
+                <a:latin typeface="Helvetica Neue"/>
+              </a:rPr>
+              <a:t> </a:t>
+            </a:r>
+            <a:r>
+              <a:rPr lang="en-US" dirty="0" err="1">
+                <a:latin typeface="Helvetica Neue"/>
+              </a:rPr>
+              <a:t>tập</a:t>
+            </a:r>
+            <a:r>
+              <a:rPr lang="en-US" dirty="0">
+                <a:latin typeface="Helvetica Neue"/>
+              </a:rPr>
+              <a:t> validation </a:t>
+            </a:r>
+            <a:r>
+              <a:rPr lang="en-US" dirty="0" err="1">
+                <a:latin typeface="Helvetica Neue"/>
+              </a:rPr>
+              <a:t>thấp</a:t>
+            </a:r>
+            <a:r>
+              <a:rPr lang="en-US" dirty="0">
+                <a:latin typeface="Helvetica Neue"/>
+              </a:rPr>
+              <a:t> </a:t>
+            </a:r>
+            <a:r>
+              <a:rPr lang="en-US" dirty="0" err="1">
+                <a:latin typeface="Helvetica Neue"/>
+              </a:rPr>
+              <a:t>nhất</a:t>
+            </a:r>
+            <a:r>
+              <a:rPr lang="en-US" dirty="0">
+                <a:latin typeface="Helvetica Neue"/>
+              </a:rPr>
+              <a:t> </a:t>
+            </a:r>
+            <a:r>
+              <a:rPr lang="en-US" dirty="0" err="1">
+                <a:latin typeface="Helvetica Neue"/>
+              </a:rPr>
+              <a:t>là</a:t>
+            </a:r>
+            <a:r>
+              <a:rPr lang="en-US" dirty="0">
+                <a:latin typeface="Helvetica Neue"/>
+              </a:rPr>
+              <a:t> </a:t>
+            </a:r>
+            <a:r>
+              <a:rPr lang="en-US" dirty="0">
+                <a:solidFill>
+                  <a:srgbClr val="FF0000"/>
+                </a:solidFill>
+                <a:latin typeface="Helvetica Neue"/>
+              </a:rPr>
+              <a:t>16.56%</a:t>
+            </a:r>
+            <a:r>
+              <a:rPr lang="en-US" dirty="0">
+                <a:latin typeface="Helvetica Neue"/>
+              </a:rPr>
+              <a:t>, </a:t>
+            </a:r>
+            <a:r>
+              <a:rPr lang="en-US" dirty="0" err="1">
+                <a:latin typeface="Helvetica Neue"/>
+              </a:rPr>
+              <a:t>với</a:t>
+            </a:r>
+            <a:r>
+              <a:rPr lang="en-US" dirty="0">
+                <a:latin typeface="Helvetica Neue"/>
+              </a:rPr>
+              <a:t> </a:t>
+            </a:r>
+            <a:r>
+              <a:rPr lang="en-US" dirty="0" err="1">
+                <a:solidFill>
+                  <a:srgbClr val="00B050"/>
+                </a:solidFill>
+                <a:latin typeface="Helvetica Neue"/>
+              </a:rPr>
+              <a:t>num_top_types</a:t>
+            </a:r>
+            <a:r>
+              <a:rPr lang="en-US" dirty="0">
+                <a:solidFill>
+                  <a:srgbClr val="00B050"/>
+                </a:solidFill>
+                <a:latin typeface="Helvetica Neue"/>
+              </a:rPr>
+              <a:t> = 1 </a:t>
+            </a:r>
+            <a:r>
+              <a:rPr lang="en-US" dirty="0" err="1">
+                <a:solidFill>
+                  <a:srgbClr val="00B050"/>
+                </a:solidFill>
+                <a:latin typeface="Helvetica Neue"/>
+              </a:rPr>
+              <a:t>và</a:t>
+            </a:r>
+            <a:r>
+              <a:rPr lang="en-US" dirty="0">
+                <a:solidFill>
+                  <a:srgbClr val="00B050"/>
+                </a:solidFill>
+                <a:latin typeface="Helvetica Neue"/>
+              </a:rPr>
+              <a:t> neighbors = 1</a:t>
+            </a:r>
+            <a:endParaRPr lang="en-US" dirty="0">
+              <a:latin typeface="Helvetica Neue"/>
+            </a:endParaRPr>
+          </a:p>
+        </p:txBody>
+      </p:sp>
+    </p:spTree>
+    <p:extLst>
+      <p:ext uri="{BB962C8B-B14F-4D97-AF65-F5344CB8AC3E}">
+        <p14:creationId xmlns:p14="http://schemas.microsoft.com/office/powerpoint/2010/main" val="2355727641"/>
+      </p:ext>
+    </p:extLst>
+  </p:cSld>
+  <p:clrMapOvr>
+    <a:masterClrMapping/>
+  </p:clrMapOvr>
+</p:sld>
+</file>
+
+<file path=ppt/slides/slide2.xml><?xml version="1.0" encoding="utf-8"?>
+<p:sld xmlns:a="http://schemas.openxmlformats.org/drawingml/2006/main" xmlns:r="http://schemas.openxmlformats.org/officeDocument/2006/relationships" xmlns:p="http://schemas.openxmlformats.org/presentationml/2006/main">
+  <p:cSld>
+    <p:bg>
+      <p:bgPr>
+        <a:solidFill>
+          <a:schemeClr val="bg1"/>
+        </a:solidFill>
+        <a:effectLst/>
+      </p:bgPr>
+    </p:bg>
+    <p:spTree>
+      <p:nvGrpSpPr>
+        <p:cNvPr id="1" name=""/>
+        <p:cNvGrpSpPr/>
+        <p:nvPr/>
+      </p:nvGrpSpPr>
+      <p:grpSpPr>
+        <a:xfrm>
+          <a:off x="0" y="0"/>
+          <a:ext cx="0" cy="0"/>
+          <a:chOff x="0" y="0"/>
+          <a:chExt cx="0" cy="0"/>
+        </a:xfrm>
+      </p:grpSpPr>
+      <p:sp>
+        <p:nvSpPr>
+          <p:cNvPr id="2" name="Title 1">
+            <a:extLst>
+              <a:ext uri="{FF2B5EF4-FFF2-40B4-BE49-F238E27FC236}">
+                <a16:creationId xmlns:a16="http://schemas.microsoft.com/office/drawing/2014/main" id="{BD1588DC-B69E-4785-A516-B2BB17BEE9F6}"/>
+              </a:ext>
+            </a:extLst>
+          </p:cNvPr>
+          <p:cNvSpPr>
+            <a:spLocks noGrp="1"/>
+          </p:cNvSpPr>
+          <p:nvPr>
+            <p:ph type="title"/>
+          </p:nvPr>
+        </p:nvSpPr>
+        <p:spPr>
+          <a:xfrm>
+            <a:off x="581192" y="702156"/>
+            <a:ext cx="11029616" cy="742331"/>
+          </a:xfrm>
+        </p:spPr>
+        <p:txBody>
+          <a:bodyPr/>
+          <a:lstStyle/>
+          <a:p>
+            <a:r>
+              <a:rPr lang="en-US" dirty="0"/>
+              <a:t>NỘI DUNG CHÍNH</a:t>
+            </a:r>
+          </a:p>
+        </p:txBody>
+      </p:sp>
+      <p:sp>
+        <p:nvSpPr>
+          <p:cNvPr id="12" name="Rectangle 11">
+            <a:extLst>
+              <a:ext uri="{FF2B5EF4-FFF2-40B4-BE49-F238E27FC236}">
+                <a16:creationId xmlns:a16="http://schemas.microsoft.com/office/drawing/2014/main" id="{000EA21E-C331-4511-BBF4-58646552B751}"/>
+              </a:ext>
+            </a:extLst>
+          </p:cNvPr>
+          <p:cNvSpPr/>
+          <p:nvPr/>
+        </p:nvSpPr>
+        <p:spPr>
+          <a:xfrm>
+            <a:off x="375404" y="4891845"/>
+            <a:ext cx="2067041" cy="461665"/>
+          </a:xfrm>
+          <a:prstGeom prst="rect">
+            <a:avLst/>
+          </a:prstGeom>
+        </p:spPr>
+        <p:txBody>
+          <a:bodyPr wrap="none">
+            <a:spAutoFit/>
+          </a:bodyPr>
+          <a:lstStyle/>
+          <a:p>
+            <a:r>
+              <a:rPr lang="en-US" sz="2400" dirty="0" err="1">
+                <a:latin typeface="Calibri (Body)"/>
+              </a:rPr>
+              <a:t>Câu</a:t>
+            </a:r>
+            <a:r>
+              <a:rPr lang="en-US" sz="2400" dirty="0">
+                <a:latin typeface="Calibri (Body)"/>
+              </a:rPr>
+              <a:t> </a:t>
+            </a:r>
+            <a:r>
+              <a:rPr lang="en-US" sz="2400" dirty="0" err="1">
+                <a:latin typeface="Calibri (Body)"/>
+              </a:rPr>
+              <a:t>hỏi</a:t>
+            </a:r>
+            <a:r>
+              <a:rPr lang="en-US" sz="2400" dirty="0">
+                <a:latin typeface="Calibri (Body)"/>
+              </a:rPr>
+              <a:t> </a:t>
+            </a:r>
+            <a:r>
+              <a:rPr lang="en-US" sz="2400" dirty="0" err="1">
+                <a:latin typeface="Calibri (Body)"/>
+              </a:rPr>
+              <a:t>đặt</a:t>
+            </a:r>
+            <a:r>
+              <a:rPr lang="en-US" sz="2400" dirty="0">
+                <a:latin typeface="Calibri (Body)"/>
+              </a:rPr>
+              <a:t> ra?</a:t>
+            </a:r>
+          </a:p>
+        </p:txBody>
+      </p:sp>
+      <p:sp>
+        <p:nvSpPr>
+          <p:cNvPr id="13" name="Rectangle 12">
+            <a:extLst>
+              <a:ext uri="{FF2B5EF4-FFF2-40B4-BE49-F238E27FC236}">
+                <a16:creationId xmlns:a16="http://schemas.microsoft.com/office/drawing/2014/main" id="{D851022F-29D1-4E33-8115-996C4E75B4D6}"/>
+              </a:ext>
+            </a:extLst>
+          </p:cNvPr>
+          <p:cNvSpPr/>
+          <p:nvPr/>
+        </p:nvSpPr>
+        <p:spPr>
+          <a:xfrm>
+            <a:off x="2558172" y="4891845"/>
+            <a:ext cx="2244525" cy="461665"/>
+          </a:xfrm>
+          <a:prstGeom prst="rect">
+            <a:avLst/>
+          </a:prstGeom>
+        </p:spPr>
+        <p:txBody>
+          <a:bodyPr wrap="none">
+            <a:spAutoFit/>
+          </a:bodyPr>
+          <a:lstStyle/>
+          <a:p>
+            <a:pPr algn="ctr"/>
+            <a:r>
+              <a:rPr lang="en-US" sz="2400" dirty="0">
+                <a:latin typeface="Calibri (Body)"/>
+              </a:rPr>
+              <a:t>Thu </a:t>
+            </a:r>
+            <a:r>
+              <a:rPr lang="en-US" sz="2400" dirty="0" err="1">
+                <a:latin typeface="Calibri (Body)"/>
+              </a:rPr>
+              <a:t>thập</a:t>
+            </a:r>
+            <a:r>
+              <a:rPr lang="en-US" sz="2400" dirty="0">
+                <a:latin typeface="Calibri (Body)"/>
+              </a:rPr>
+              <a:t> </a:t>
+            </a:r>
+            <a:r>
+              <a:rPr lang="en-US" sz="2400" dirty="0" err="1">
+                <a:latin typeface="Calibri (Body)"/>
+              </a:rPr>
+              <a:t>dữ</a:t>
+            </a:r>
+            <a:r>
+              <a:rPr lang="en-US" sz="2400" dirty="0">
+                <a:latin typeface="Calibri (Body)"/>
+              </a:rPr>
+              <a:t> </a:t>
+            </a:r>
+            <a:r>
+              <a:rPr lang="en-US" sz="2400" dirty="0" err="1">
+                <a:latin typeface="Calibri (Body)"/>
+              </a:rPr>
+              <a:t>liệu</a:t>
+            </a:r>
+            <a:endParaRPr lang="en-US" sz="2400" dirty="0">
+              <a:latin typeface="Calibri (Body)"/>
+            </a:endParaRPr>
+          </a:p>
+        </p:txBody>
+      </p:sp>
+      <p:pic>
+        <p:nvPicPr>
+          <p:cNvPr id="5" name="Picture 4" descr="A picture containing black, tower, white, building&#10;&#10;Description automatically generated">
+            <a:extLst>
+              <a:ext uri="{FF2B5EF4-FFF2-40B4-BE49-F238E27FC236}">
+                <a16:creationId xmlns:a16="http://schemas.microsoft.com/office/drawing/2014/main" id="{FE9ECA9A-32D7-4E76-8A6D-3B5C2A147A9F}"/>
+              </a:ext>
+            </a:extLst>
+          </p:cNvPr>
+          <p:cNvPicPr>
+            <a:picLocks noChangeAspect="1"/>
+          </p:cNvPicPr>
+          <p:nvPr/>
+        </p:nvPicPr>
+        <p:blipFill>
+          <a:blip r:embed="rId2"/>
+          <a:stretch>
+            <a:fillRect/>
+          </a:stretch>
+        </p:blipFill>
+        <p:spPr>
+          <a:xfrm>
+            <a:off x="536757" y="2762008"/>
+            <a:ext cx="1819767" cy="2014926"/>
+          </a:xfrm>
+          <a:prstGeom prst="rect">
+            <a:avLst/>
+          </a:prstGeom>
+        </p:spPr>
+      </p:pic>
+      <p:pic>
+        <p:nvPicPr>
+          <p:cNvPr id="7" name="Picture 6" descr="A close up of a sign&#10;&#10;Description automatically generated">
+            <a:extLst>
+              <a:ext uri="{FF2B5EF4-FFF2-40B4-BE49-F238E27FC236}">
+                <a16:creationId xmlns:a16="http://schemas.microsoft.com/office/drawing/2014/main" id="{E440FD5D-FD05-486A-A6F8-9617B9B65DA3}"/>
+              </a:ext>
+            </a:extLst>
+          </p:cNvPr>
+          <p:cNvPicPr>
+            <a:picLocks noChangeAspect="1"/>
+          </p:cNvPicPr>
+          <p:nvPr/>
+        </p:nvPicPr>
+        <p:blipFill>
+          <a:blip r:embed="rId3"/>
+          <a:stretch>
+            <a:fillRect/>
+          </a:stretch>
+        </p:blipFill>
+        <p:spPr>
+          <a:xfrm>
+            <a:off x="2873095" y="2974728"/>
+            <a:ext cx="1819767" cy="1802206"/>
+          </a:xfrm>
+          <a:prstGeom prst="rect">
+            <a:avLst/>
+          </a:prstGeom>
+        </p:spPr>
+      </p:pic>
+      <p:sp>
+        <p:nvSpPr>
+          <p:cNvPr id="4" name="Slide Number Placeholder 3">
+            <a:extLst>
+              <a:ext uri="{FF2B5EF4-FFF2-40B4-BE49-F238E27FC236}">
+                <a16:creationId xmlns:a16="http://schemas.microsoft.com/office/drawing/2014/main" id="{D5632410-5A2D-4996-AACB-672FF27F5CAC}"/>
+              </a:ext>
+            </a:extLst>
+          </p:cNvPr>
+          <p:cNvSpPr>
+            <a:spLocks noGrp="1"/>
+          </p:cNvSpPr>
+          <p:nvPr>
+            <p:ph type="sldNum" sz="quarter" idx="12"/>
+          </p:nvPr>
+        </p:nvSpPr>
+        <p:spPr/>
+        <p:txBody>
+          <a:bodyPr/>
+          <a:lstStyle/>
+          <a:p>
+            <a:fld id="{D57F1E4F-1CFF-5643-939E-217C01CDF565}" type="slidenum">
+              <a:rPr lang="en-US" smtClean="0"/>
+              <a:pPr/>
+              <a:t>2</a:t>
+            </a:fld>
+            <a:endParaRPr lang="en-US" dirty="0"/>
+          </a:p>
+        </p:txBody>
+      </p:sp>
+      <p:pic>
+        <p:nvPicPr>
+          <p:cNvPr id="1032" name="Picture 8" descr="Related image">
+            <a:extLst>
+              <a:ext uri="{FF2B5EF4-FFF2-40B4-BE49-F238E27FC236}">
+                <a16:creationId xmlns:a16="http://schemas.microsoft.com/office/drawing/2014/main" id="{EE61FDB1-7C35-42BC-A1A5-B856B7C9F889}"/>
+              </a:ext>
+            </a:extLst>
+          </p:cNvPr>
+          <p:cNvPicPr>
+            <a:picLocks noChangeAspect="1" noChangeArrowheads="1"/>
+          </p:cNvPicPr>
+          <p:nvPr/>
+        </p:nvPicPr>
+        <p:blipFill>
+          <a:blip r:embed="rId4">
+            <a:extLst>
+              <a:ext uri="{28A0092B-C50C-407E-A947-70E740481C1C}">
+                <a14:useLocalDpi xmlns:a14="http://schemas.microsoft.com/office/drawing/2010/main" val="0"/>
+              </a:ext>
+            </a:extLst>
+          </a:blip>
+          <a:srcRect/>
+          <a:stretch>
+            <a:fillRect/>
+          </a:stretch>
+        </p:blipFill>
+        <p:spPr bwMode="auto">
+          <a:xfrm>
+            <a:off x="5433398" y="2893626"/>
+            <a:ext cx="1628322" cy="1916134"/>
+          </a:xfrm>
+          <a:prstGeom prst="rect">
+            <a:avLst/>
+          </a:prstGeom>
+          <a:noFill/>
+          <a:extLst>
+            <a:ext uri="{909E8E84-426E-40DD-AFC4-6F175D3DCCD1}">
+              <a14:hiddenFill xmlns:a14="http://schemas.microsoft.com/office/drawing/2010/main">
+                <a:solidFill>
+                  <a:srgbClr val="FFFFFF"/>
+                </a:solidFill>
+              </a14:hiddenFill>
+            </a:ext>
+          </a:extLst>
+        </p:spPr>
+      </p:pic>
+      <p:sp>
+        <p:nvSpPr>
+          <p:cNvPr id="14" name="Rectangle 13">
+            <a:extLst>
+              <a:ext uri="{FF2B5EF4-FFF2-40B4-BE49-F238E27FC236}">
+                <a16:creationId xmlns:a16="http://schemas.microsoft.com/office/drawing/2014/main" id="{1D236870-8999-49E6-A979-77CE9FC5F57E}"/>
+              </a:ext>
+            </a:extLst>
+          </p:cNvPr>
+          <p:cNvSpPr/>
+          <p:nvPr/>
+        </p:nvSpPr>
+        <p:spPr>
+          <a:xfrm>
+            <a:off x="5520340" y="4860919"/>
+            <a:ext cx="1454437" cy="830997"/>
+          </a:xfrm>
+          <a:prstGeom prst="rect">
+            <a:avLst/>
+          </a:prstGeom>
+        </p:spPr>
+        <p:txBody>
+          <a:bodyPr wrap="none">
+            <a:spAutoFit/>
+          </a:bodyPr>
+          <a:lstStyle/>
+          <a:p>
+            <a:pPr algn="ctr"/>
+            <a:r>
+              <a:rPr lang="en-US" sz="2400" dirty="0" err="1">
+                <a:latin typeface="Calibri (Body)"/>
+              </a:rPr>
+              <a:t>Tiền</a:t>
+            </a:r>
+            <a:r>
+              <a:rPr lang="en-US" sz="2400" dirty="0">
+                <a:latin typeface="Calibri (Body)"/>
+              </a:rPr>
+              <a:t> </a:t>
+            </a:r>
+            <a:r>
+              <a:rPr lang="en-US" sz="2400" dirty="0" err="1">
+                <a:latin typeface="Calibri (Body)"/>
+              </a:rPr>
+              <a:t>xử</a:t>
+            </a:r>
+            <a:r>
+              <a:rPr lang="en-US" sz="2400" dirty="0">
+                <a:latin typeface="Calibri (Body)"/>
+              </a:rPr>
+              <a:t> </a:t>
+            </a:r>
+            <a:r>
+              <a:rPr lang="en-US" sz="2400" dirty="0" err="1">
+                <a:latin typeface="Calibri (Body)"/>
+              </a:rPr>
+              <a:t>lý</a:t>
+            </a:r>
+            <a:r>
+              <a:rPr lang="en-US" sz="2400" dirty="0">
+                <a:latin typeface="Calibri (Body)"/>
+              </a:rPr>
+              <a:t> </a:t>
+            </a:r>
+          </a:p>
+          <a:p>
+            <a:pPr algn="ctr"/>
+            <a:r>
+              <a:rPr lang="en-US" sz="2400" dirty="0" err="1">
+                <a:latin typeface="Calibri (Body)"/>
+              </a:rPr>
+              <a:t>dữ</a:t>
+            </a:r>
+            <a:r>
+              <a:rPr lang="en-US" sz="2400" dirty="0">
+                <a:latin typeface="Calibri (Body)"/>
+              </a:rPr>
+              <a:t> </a:t>
+            </a:r>
+            <a:r>
+              <a:rPr lang="en-US" sz="2400" dirty="0" err="1">
+                <a:latin typeface="Calibri (Body)"/>
+              </a:rPr>
+              <a:t>liệu</a:t>
+            </a:r>
+            <a:endParaRPr lang="en-US" sz="2400" dirty="0">
+              <a:latin typeface="Calibri (Body)"/>
+            </a:endParaRPr>
+          </a:p>
+        </p:txBody>
+      </p:sp>
+      <p:pic>
+        <p:nvPicPr>
+          <p:cNvPr id="1034" name="Picture 10" descr="Image result for model scikit learn icon">
+            <a:extLst>
+              <a:ext uri="{FF2B5EF4-FFF2-40B4-BE49-F238E27FC236}">
+                <a16:creationId xmlns:a16="http://schemas.microsoft.com/office/drawing/2014/main" id="{7D44AA3B-42A1-4DE0-9D7E-567F6B71FB60}"/>
+              </a:ext>
+            </a:extLst>
+          </p:cNvPr>
+          <p:cNvPicPr>
+            <a:picLocks noChangeAspect="1" noChangeArrowheads="1"/>
+          </p:cNvPicPr>
+          <p:nvPr/>
+        </p:nvPicPr>
+        <p:blipFill>
+          <a:blip r:embed="rId5">
+            <a:extLst>
+              <a:ext uri="{28A0092B-C50C-407E-A947-70E740481C1C}">
+                <a14:useLocalDpi xmlns:a14="http://schemas.microsoft.com/office/drawing/2010/main" val="0"/>
+              </a:ext>
+            </a:extLst>
+          </a:blip>
+          <a:srcRect/>
+          <a:stretch>
+            <a:fillRect/>
+          </a:stretch>
+        </p:blipFill>
+        <p:spPr bwMode="auto">
+          <a:xfrm>
+            <a:off x="7849773" y="2951894"/>
+            <a:ext cx="1825042" cy="1825042"/>
+          </a:xfrm>
+          <a:prstGeom prst="rect">
+            <a:avLst/>
+          </a:prstGeom>
+          <a:noFill/>
+          <a:extLst>
+            <a:ext uri="{909E8E84-426E-40DD-AFC4-6F175D3DCCD1}">
+              <a14:hiddenFill xmlns:a14="http://schemas.microsoft.com/office/drawing/2010/main">
+                <a:solidFill>
+                  <a:srgbClr val="FFFFFF"/>
+                </a:solidFill>
+              </a14:hiddenFill>
+            </a:ext>
+          </a:extLst>
+        </p:spPr>
+      </p:pic>
+      <p:sp>
+        <p:nvSpPr>
+          <p:cNvPr id="16" name="Rectangle 15">
+            <a:extLst>
+              <a:ext uri="{FF2B5EF4-FFF2-40B4-BE49-F238E27FC236}">
+                <a16:creationId xmlns:a16="http://schemas.microsoft.com/office/drawing/2014/main" id="{766614DE-CC17-43A8-B0D2-483AAEF43838}"/>
+              </a:ext>
+            </a:extLst>
+          </p:cNvPr>
+          <p:cNvSpPr/>
+          <p:nvPr/>
+        </p:nvSpPr>
+        <p:spPr>
+          <a:xfrm>
+            <a:off x="7878287" y="4806488"/>
+            <a:ext cx="1774845" cy="830997"/>
+          </a:xfrm>
+          <a:prstGeom prst="rect">
+            <a:avLst/>
+          </a:prstGeom>
+        </p:spPr>
+        <p:txBody>
+          <a:bodyPr wrap="none">
+            <a:spAutoFit/>
+          </a:bodyPr>
+          <a:lstStyle/>
+          <a:p>
+            <a:pPr algn="ctr"/>
+            <a:r>
+              <a:rPr lang="en-US" sz="2400" dirty="0" err="1">
+                <a:latin typeface="Calibri (Body)"/>
+              </a:rPr>
+              <a:t>Mô</a:t>
+            </a:r>
+            <a:r>
+              <a:rPr lang="en-US" sz="2400" dirty="0">
+                <a:latin typeface="Calibri (Body)"/>
+              </a:rPr>
+              <a:t> </a:t>
+            </a:r>
+            <a:r>
+              <a:rPr lang="en-US" sz="2400" dirty="0" err="1">
+                <a:latin typeface="Calibri (Body)"/>
+              </a:rPr>
+              <a:t>hình</a:t>
+            </a:r>
+            <a:r>
+              <a:rPr lang="en-US" sz="2400" dirty="0">
+                <a:latin typeface="Calibri (Body)"/>
+              </a:rPr>
+              <a:t> </a:t>
+            </a:r>
+            <a:r>
+              <a:rPr lang="en-US" sz="2400" dirty="0" err="1">
+                <a:latin typeface="Calibri (Body)"/>
+              </a:rPr>
+              <a:t>hóa</a:t>
+            </a:r>
+            <a:endParaRPr lang="en-US" sz="2400" dirty="0">
+              <a:latin typeface="Calibri (Body)"/>
+            </a:endParaRPr>
+          </a:p>
+          <a:p>
+            <a:pPr algn="ctr"/>
+            <a:r>
+              <a:rPr lang="en-US" sz="2400" dirty="0">
+                <a:latin typeface="Calibri (Body)"/>
+              </a:rPr>
+              <a:t> </a:t>
+            </a:r>
+            <a:r>
+              <a:rPr lang="en-US" sz="2400" dirty="0" err="1">
+                <a:latin typeface="Calibri (Body)"/>
+              </a:rPr>
+              <a:t>dữ</a:t>
+            </a:r>
+            <a:r>
+              <a:rPr lang="en-US" sz="2400" dirty="0">
+                <a:latin typeface="Calibri (Body)"/>
+              </a:rPr>
+              <a:t> </a:t>
+            </a:r>
+            <a:r>
+              <a:rPr lang="en-US" sz="2400" dirty="0" err="1">
+                <a:latin typeface="Calibri (Body)"/>
+              </a:rPr>
+              <a:t>liệu</a:t>
+            </a:r>
+            <a:endParaRPr lang="en-US" sz="2400" dirty="0">
+              <a:latin typeface="Calibri (Body)"/>
+            </a:endParaRPr>
+          </a:p>
+        </p:txBody>
+      </p:sp>
+      <p:pic>
+        <p:nvPicPr>
+          <p:cNvPr id="1036" name="Picture 12" descr="Related image">
+            <a:extLst>
+              <a:ext uri="{FF2B5EF4-FFF2-40B4-BE49-F238E27FC236}">
+                <a16:creationId xmlns:a16="http://schemas.microsoft.com/office/drawing/2014/main" id="{221F60B8-A781-41E3-9B3D-3BF0FFB8D2BF}"/>
+              </a:ext>
+            </a:extLst>
+          </p:cNvPr>
+          <p:cNvPicPr>
+            <a:picLocks noChangeAspect="1" noChangeArrowheads="1"/>
+          </p:cNvPicPr>
+          <p:nvPr/>
+        </p:nvPicPr>
+        <p:blipFill>
+          <a:blip r:embed="rId6">
+            <a:extLst>
+              <a:ext uri="{28A0092B-C50C-407E-A947-70E740481C1C}">
+                <a14:useLocalDpi xmlns:a14="http://schemas.microsoft.com/office/drawing/2010/main" val="0"/>
+              </a:ext>
+            </a:extLst>
+          </a:blip>
+          <a:srcRect/>
+          <a:stretch>
+            <a:fillRect/>
+          </a:stretch>
+        </p:blipFill>
+        <p:spPr bwMode="auto">
+          <a:xfrm>
+            <a:off x="9937064" y="2762008"/>
+            <a:ext cx="2061382" cy="2274226"/>
+          </a:xfrm>
+          <a:prstGeom prst="rect">
+            <a:avLst/>
+          </a:prstGeom>
+          <a:noFill/>
+          <a:extLst>
+            <a:ext uri="{909E8E84-426E-40DD-AFC4-6F175D3DCCD1}">
+              <a14:hiddenFill xmlns:a14="http://schemas.microsoft.com/office/drawing/2010/main">
+                <a:solidFill>
+                  <a:srgbClr val="FFFFFF"/>
+                </a:solidFill>
+              </a14:hiddenFill>
+            </a:ext>
+          </a:extLst>
+        </p:spPr>
+      </p:pic>
+      <p:sp>
+        <p:nvSpPr>
+          <p:cNvPr id="18" name="Rectangle 17">
+            <a:extLst>
+              <a:ext uri="{FF2B5EF4-FFF2-40B4-BE49-F238E27FC236}">
+                <a16:creationId xmlns:a16="http://schemas.microsoft.com/office/drawing/2014/main" id="{8B54873E-5107-4C5F-BA9D-6D5ED2D4D3E8}"/>
+              </a:ext>
+            </a:extLst>
+          </p:cNvPr>
+          <p:cNvSpPr/>
+          <p:nvPr/>
+        </p:nvSpPr>
+        <p:spPr>
+          <a:xfrm>
+            <a:off x="10524836" y="4842410"/>
+            <a:ext cx="1229311" cy="461665"/>
+          </a:xfrm>
+          <a:prstGeom prst="rect">
+            <a:avLst/>
+          </a:prstGeom>
+        </p:spPr>
+        <p:txBody>
+          <a:bodyPr wrap="none">
+            <a:spAutoFit/>
+          </a:bodyPr>
+          <a:lstStyle/>
+          <a:p>
+            <a:r>
+              <a:rPr lang="en-US" sz="2400" dirty="0" err="1">
+                <a:latin typeface="Calibri (Body)"/>
+              </a:rPr>
+              <a:t>Tổng</a:t>
+            </a:r>
+            <a:r>
+              <a:rPr lang="en-US" sz="2400" dirty="0">
+                <a:latin typeface="Calibri (Body)"/>
+              </a:rPr>
+              <a:t> </a:t>
+            </a:r>
+            <a:r>
+              <a:rPr lang="en-US" sz="2400" dirty="0" err="1">
+                <a:latin typeface="Calibri (Body)"/>
+              </a:rPr>
+              <a:t>kết</a:t>
+            </a:r>
+            <a:endParaRPr lang="en-US" sz="2400" dirty="0">
+              <a:latin typeface="Calibri (Body)"/>
+            </a:endParaRPr>
+          </a:p>
+        </p:txBody>
+      </p:sp>
+    </p:spTree>
+    <p:extLst>
+      <p:ext uri="{BB962C8B-B14F-4D97-AF65-F5344CB8AC3E}">
+        <p14:creationId xmlns:p14="http://schemas.microsoft.com/office/powerpoint/2010/main" val="3210411874"/>
+      </p:ext>
+    </p:extLst>
+  </p:cSld>
+  <p:clrMapOvr>
+    <a:masterClrMapping/>
+  </p:clrMapOvr>
+</p:sld>
+</file>
+
+<file path=ppt/slides/slide20.xml><?xml version="1.0" encoding="utf-8"?>
 <p:sld xmlns:a="http://schemas.openxmlformats.org/drawingml/2006/main" xmlns:r="http://schemas.openxmlformats.org/officeDocument/2006/relationships" xmlns:p="http://schemas.openxmlformats.org/presentationml/2006/main">
   <p:cSld>
     <p:bg>
@@ -26615,9 +28140,1967 @@
             <a:fld id="{D57F1E4F-1CFF-5643-939E-217C01CDF565}" type="slidenum">
               <a:rPr lang="en-US" smtClean="0"/>
               <a:pPr/>
-              <a:t>19</a:t>
+              <a:t>20</a:t>
             </a:fld>
             <a:endParaRPr lang="en-US" dirty="0"/>
+          </a:p>
+        </p:txBody>
+      </p:sp>
+      <p:sp>
+        <p:nvSpPr>
+          <p:cNvPr id="8" name="Rectangle 7">
+            <a:extLst>
+              <a:ext uri="{FF2B5EF4-FFF2-40B4-BE49-F238E27FC236}">
+                <a16:creationId xmlns:a16="http://schemas.microsoft.com/office/drawing/2014/main" id="{8A85A4F8-5D9B-455E-9A56-3C5704A695BE}"/>
+              </a:ext>
+            </a:extLst>
+          </p:cNvPr>
+          <p:cNvSpPr/>
+          <p:nvPr/>
+        </p:nvSpPr>
+        <p:spPr>
+          <a:xfrm>
+            <a:off x="332034" y="730809"/>
+            <a:ext cx="11527932" cy="2385268"/>
+          </a:xfrm>
+          <a:prstGeom prst="rect">
+            <a:avLst/>
+          </a:prstGeom>
+        </p:spPr>
+        <p:txBody>
+          <a:bodyPr wrap="square">
+            <a:spAutoFit/>
+          </a:bodyPr>
+          <a:lstStyle/>
+          <a:p>
+            <a:r>
+              <a:rPr lang="en-US" dirty="0" err="1">
+                <a:solidFill>
+                  <a:srgbClr val="000000"/>
+                </a:solidFill>
+                <a:latin typeface="Helvetica Neue"/>
+              </a:rPr>
+              <a:t>Nhóm</a:t>
+            </a:r>
+            <a:r>
+              <a:rPr lang="en-US" dirty="0">
+                <a:solidFill>
+                  <a:srgbClr val="000000"/>
+                </a:solidFill>
+                <a:latin typeface="Helvetica Neue"/>
+              </a:rPr>
+              <a:t> </a:t>
+            </a:r>
+            <a:r>
+              <a:rPr lang="en-US" dirty="0" err="1">
+                <a:solidFill>
+                  <a:srgbClr val="000000"/>
+                </a:solidFill>
+                <a:latin typeface="Helvetica Neue"/>
+              </a:rPr>
+              <a:t>cũng</a:t>
+            </a:r>
+            <a:r>
+              <a:rPr lang="en-US" dirty="0">
+                <a:solidFill>
+                  <a:srgbClr val="000000"/>
+                </a:solidFill>
+                <a:latin typeface="Helvetica Neue"/>
+              </a:rPr>
+              <a:t> </a:t>
+            </a:r>
+            <a:r>
+              <a:rPr lang="en-US" dirty="0" err="1">
+                <a:solidFill>
+                  <a:srgbClr val="000000"/>
+                </a:solidFill>
+                <a:latin typeface="Helvetica Neue"/>
+              </a:rPr>
+              <a:t>tiến</a:t>
+            </a:r>
+            <a:r>
+              <a:rPr lang="en-US" dirty="0">
+                <a:solidFill>
+                  <a:srgbClr val="000000"/>
+                </a:solidFill>
+                <a:latin typeface="Helvetica Neue"/>
+              </a:rPr>
+              <a:t> </a:t>
+            </a:r>
+            <a:r>
+              <a:rPr lang="en-US" dirty="0" err="1">
+                <a:solidFill>
+                  <a:srgbClr val="000000"/>
+                </a:solidFill>
+                <a:latin typeface="Helvetica Neue"/>
+              </a:rPr>
+              <a:t>hành</a:t>
+            </a:r>
+            <a:r>
+              <a:rPr lang="en-US" dirty="0">
+                <a:solidFill>
+                  <a:srgbClr val="000000"/>
+                </a:solidFill>
+                <a:latin typeface="Helvetica Neue"/>
+              </a:rPr>
+              <a:t> </a:t>
+            </a:r>
+            <a:r>
+              <a:rPr lang="en-US" dirty="0" err="1">
+                <a:solidFill>
+                  <a:srgbClr val="000000"/>
+                </a:solidFill>
+                <a:latin typeface="Helvetica Neue"/>
+              </a:rPr>
+              <a:t>thử</a:t>
+            </a:r>
+            <a:r>
+              <a:rPr lang="en-US" dirty="0">
+                <a:solidFill>
+                  <a:srgbClr val="000000"/>
+                </a:solidFill>
+                <a:latin typeface="Helvetica Neue"/>
+              </a:rPr>
+              <a:t> </a:t>
+            </a:r>
+            <a:r>
+              <a:rPr lang="en-US" dirty="0" err="1">
+                <a:solidFill>
+                  <a:srgbClr val="000000"/>
+                </a:solidFill>
+                <a:latin typeface="Helvetica Neue"/>
+              </a:rPr>
+              <a:t>nghiệm</a:t>
+            </a:r>
+            <a:r>
+              <a:rPr lang="en-US" dirty="0">
+                <a:solidFill>
+                  <a:srgbClr val="000000"/>
+                </a:solidFill>
+                <a:latin typeface="Helvetica Neue"/>
+              </a:rPr>
+              <a:t> </a:t>
+            </a:r>
+            <a:r>
+              <a:rPr lang="en-US" dirty="0" err="1">
+                <a:solidFill>
+                  <a:srgbClr val="000000"/>
+                </a:solidFill>
+                <a:latin typeface="Helvetica Neue"/>
+              </a:rPr>
+              <a:t>cho</a:t>
+            </a:r>
+            <a:r>
+              <a:rPr lang="en-US" dirty="0">
+                <a:solidFill>
+                  <a:srgbClr val="000000"/>
+                </a:solidFill>
+                <a:latin typeface="Helvetica Neue"/>
+              </a:rPr>
+              <a:t> 3 tr</a:t>
+            </a:r>
+            <a:r>
+              <a:rPr lang="vi-VN" dirty="0">
+                <a:solidFill>
+                  <a:srgbClr val="000000"/>
+                </a:solidFill>
+                <a:latin typeface="Helvetica Neue"/>
+              </a:rPr>
+              <a:t>ư</a:t>
+            </a:r>
+            <a:r>
+              <a:rPr lang="en-US" dirty="0" err="1">
+                <a:solidFill>
+                  <a:srgbClr val="000000"/>
+                </a:solidFill>
+                <a:latin typeface="Helvetica Neue"/>
+              </a:rPr>
+              <a:t>ờng</a:t>
+            </a:r>
+            <a:r>
+              <a:rPr lang="en-US" dirty="0">
+                <a:solidFill>
+                  <a:srgbClr val="000000"/>
+                </a:solidFill>
+                <a:latin typeface="Helvetica Neue"/>
+              </a:rPr>
+              <a:t> </a:t>
+            </a:r>
+            <a:r>
+              <a:rPr lang="en-US" dirty="0" err="1">
+                <a:solidFill>
+                  <a:srgbClr val="000000"/>
+                </a:solidFill>
+                <a:latin typeface="Helvetica Neue"/>
+              </a:rPr>
+              <a:t>hợp</a:t>
+            </a:r>
+            <a:r>
+              <a:rPr lang="en-US" dirty="0">
+                <a:solidFill>
+                  <a:srgbClr val="000000"/>
+                </a:solidFill>
+                <a:latin typeface="Helvetica Neue"/>
+              </a:rPr>
+              <a:t> </a:t>
+            </a:r>
+            <a:r>
+              <a:rPr lang="en-US" dirty="0" err="1">
+                <a:solidFill>
+                  <a:srgbClr val="000000"/>
+                </a:solidFill>
+                <a:latin typeface="Helvetica Neue"/>
+              </a:rPr>
+              <a:t>còn</a:t>
+            </a:r>
+            <a:r>
+              <a:rPr lang="en-US" dirty="0">
+                <a:solidFill>
+                  <a:srgbClr val="000000"/>
+                </a:solidFill>
+                <a:latin typeface="Helvetica Neue"/>
+              </a:rPr>
+              <a:t> </a:t>
+            </a:r>
+            <a:r>
+              <a:rPr lang="en-US" dirty="0" err="1">
+                <a:solidFill>
+                  <a:srgbClr val="000000"/>
+                </a:solidFill>
+                <a:latin typeface="Helvetica Neue"/>
+              </a:rPr>
+              <a:t>lại</a:t>
+            </a:r>
+            <a:r>
+              <a:rPr lang="en-US" dirty="0">
+                <a:solidFill>
+                  <a:srgbClr val="000000"/>
+                </a:solidFill>
+                <a:latin typeface="Helvetica Neue"/>
+              </a:rPr>
+              <a:t> </a:t>
+            </a:r>
+            <a:r>
+              <a:rPr lang="en-US" dirty="0" err="1">
+                <a:solidFill>
+                  <a:srgbClr val="000000"/>
+                </a:solidFill>
+                <a:latin typeface="Helvetica Neue"/>
+              </a:rPr>
+              <a:t>với</a:t>
+            </a:r>
+            <a:r>
+              <a:rPr lang="en-US" dirty="0">
+                <a:solidFill>
+                  <a:srgbClr val="000000"/>
+                </a:solidFill>
+                <a:latin typeface="Helvetica Neue"/>
+              </a:rPr>
+              <a:t> </a:t>
+            </a:r>
+            <a:r>
+              <a:rPr lang="en-US" dirty="0" err="1">
+                <a:solidFill>
+                  <a:srgbClr val="000000"/>
+                </a:solidFill>
+                <a:latin typeface="Helvetica Neue"/>
+              </a:rPr>
+              <a:t>tập</a:t>
+            </a:r>
+            <a:r>
+              <a:rPr lang="en-US" dirty="0">
+                <a:solidFill>
+                  <a:srgbClr val="000000"/>
+                </a:solidFill>
+                <a:latin typeface="Helvetica Neue"/>
+              </a:rPr>
+              <a:t> </a:t>
+            </a:r>
+            <a:r>
+              <a:rPr lang="en-US" dirty="0" err="1">
+                <a:solidFill>
+                  <a:srgbClr val="000000"/>
+                </a:solidFill>
+                <a:latin typeface="Helvetica Neue"/>
+              </a:rPr>
+              <a:t>giá</a:t>
+            </a:r>
+            <a:r>
+              <a:rPr lang="en-US" dirty="0">
+                <a:solidFill>
+                  <a:srgbClr val="000000"/>
+                </a:solidFill>
+                <a:latin typeface="Helvetica Neue"/>
+              </a:rPr>
+              <a:t> </a:t>
+            </a:r>
+            <a:r>
+              <a:rPr lang="en-US" dirty="0" err="1">
+                <a:solidFill>
+                  <a:srgbClr val="000000"/>
+                </a:solidFill>
+                <a:latin typeface="Helvetica Neue"/>
+              </a:rPr>
+              <a:t>trị</a:t>
+            </a:r>
+            <a:r>
+              <a:rPr lang="en-US" dirty="0">
+                <a:solidFill>
+                  <a:srgbClr val="000000"/>
+                </a:solidFill>
+                <a:latin typeface="Helvetica Neue"/>
+              </a:rPr>
+              <a:t> </a:t>
+            </a:r>
+            <a:r>
+              <a:rPr lang="en-US" dirty="0" err="1">
+                <a:solidFill>
+                  <a:srgbClr val="000000"/>
+                </a:solidFill>
+                <a:latin typeface="Helvetica Neue"/>
+              </a:rPr>
+              <a:t>num_top_types</a:t>
+            </a:r>
+            <a:r>
+              <a:rPr lang="en-US" dirty="0">
+                <a:solidFill>
+                  <a:srgbClr val="000000"/>
+                </a:solidFill>
+                <a:latin typeface="Helvetica Neue"/>
+              </a:rPr>
+              <a:t> = [1, 3, 5, 7, 9, 11, 13] </a:t>
+            </a:r>
+            <a:r>
+              <a:rPr lang="en-US" dirty="0" err="1">
+                <a:solidFill>
+                  <a:srgbClr val="000000"/>
+                </a:solidFill>
+                <a:latin typeface="Helvetica Neue"/>
+              </a:rPr>
+              <a:t>và</a:t>
+            </a:r>
+            <a:r>
+              <a:rPr lang="en-US" dirty="0">
+                <a:solidFill>
+                  <a:srgbClr val="000000"/>
+                </a:solidFill>
+                <a:latin typeface="Helvetica Neue"/>
+              </a:rPr>
+              <a:t> neighbors = [1, 3, 5, 7, 9 ,11]:</a:t>
+            </a:r>
+          </a:p>
+          <a:p>
+            <a:pPr marL="285750" indent="-285750">
+              <a:spcAft>
+                <a:spcPts val="300"/>
+              </a:spcAft>
+              <a:buFont typeface="Arial" panose="020B0604020202020204" pitchFamily="34" charset="0"/>
+              <a:buChar char="•"/>
+            </a:pPr>
+            <a:r>
+              <a:rPr lang="en-US" dirty="0">
+                <a:solidFill>
+                  <a:srgbClr val="0070C0"/>
+                </a:solidFill>
+                <a:latin typeface="Helvetica Neue"/>
+              </a:rPr>
+              <a:t>Case 2: </a:t>
+            </a:r>
+            <a:r>
+              <a:rPr lang="en-US" dirty="0" err="1">
+                <a:solidFill>
+                  <a:srgbClr val="0070C0"/>
+                </a:solidFill>
+                <a:latin typeface="Helvetica Neue"/>
+              </a:rPr>
+              <a:t>month_to_season</a:t>
+            </a:r>
+            <a:r>
+              <a:rPr lang="en-US" dirty="0">
+                <a:solidFill>
+                  <a:srgbClr val="0070C0"/>
+                </a:solidFill>
+                <a:latin typeface="Helvetica Neue"/>
+              </a:rPr>
+              <a:t> = True </a:t>
+            </a:r>
+            <a:r>
+              <a:rPr lang="en-US" dirty="0" err="1">
+                <a:solidFill>
+                  <a:srgbClr val="0070C0"/>
+                </a:solidFill>
+                <a:latin typeface="Helvetica Neue"/>
+              </a:rPr>
+              <a:t>và</a:t>
+            </a:r>
+            <a:r>
+              <a:rPr lang="en-US" dirty="0">
+                <a:solidFill>
+                  <a:srgbClr val="0070C0"/>
+                </a:solidFill>
+                <a:latin typeface="Helvetica Neue"/>
+              </a:rPr>
+              <a:t> </a:t>
+            </a:r>
+            <a:r>
+              <a:rPr lang="en-US" dirty="0" err="1">
+                <a:solidFill>
+                  <a:srgbClr val="0070C0"/>
+                </a:solidFill>
+                <a:latin typeface="Helvetica Neue"/>
+              </a:rPr>
+              <a:t>year_to_period</a:t>
+            </a:r>
+            <a:r>
+              <a:rPr lang="en-US" dirty="0">
+                <a:solidFill>
+                  <a:srgbClr val="0070C0"/>
+                </a:solidFill>
+                <a:latin typeface="Helvetica Neue"/>
+              </a:rPr>
+              <a:t> = False</a:t>
+            </a:r>
+            <a:r>
+              <a:rPr lang="en-US" dirty="0">
+                <a:solidFill>
+                  <a:srgbClr val="000000"/>
+                </a:solidFill>
+                <a:latin typeface="Helvetica Neue"/>
+              </a:rPr>
+              <a:t>, </a:t>
+            </a:r>
+            <a:r>
+              <a:rPr lang="en-US" dirty="0" err="1">
+                <a:solidFill>
+                  <a:srgbClr val="000000"/>
+                </a:solidFill>
+                <a:latin typeface="Helvetica Neue"/>
+              </a:rPr>
+              <a:t>độ</a:t>
+            </a:r>
+            <a:r>
+              <a:rPr lang="en-US" dirty="0">
+                <a:solidFill>
+                  <a:srgbClr val="000000"/>
+                </a:solidFill>
+                <a:latin typeface="Helvetica Neue"/>
+              </a:rPr>
+              <a:t> </a:t>
+            </a:r>
+            <a:r>
+              <a:rPr lang="en-US" dirty="0" err="1">
+                <a:solidFill>
+                  <a:srgbClr val="000000"/>
+                </a:solidFill>
+                <a:latin typeface="Helvetica Neue"/>
+              </a:rPr>
+              <a:t>lỗi</a:t>
+            </a:r>
+            <a:r>
+              <a:rPr lang="en-US" dirty="0">
+                <a:solidFill>
+                  <a:srgbClr val="000000"/>
+                </a:solidFill>
+                <a:latin typeface="Helvetica Neue"/>
+              </a:rPr>
+              <a:t> </a:t>
+            </a:r>
+            <a:r>
+              <a:rPr lang="en-US" dirty="0" err="1">
+                <a:solidFill>
+                  <a:srgbClr val="000000"/>
+                </a:solidFill>
+                <a:latin typeface="Helvetica Neue"/>
+              </a:rPr>
+              <a:t>thấp</a:t>
+            </a:r>
+            <a:r>
+              <a:rPr lang="en-US" dirty="0">
+                <a:solidFill>
+                  <a:srgbClr val="000000"/>
+                </a:solidFill>
+                <a:latin typeface="Helvetica Neue"/>
+              </a:rPr>
+              <a:t> </a:t>
+            </a:r>
+            <a:r>
+              <a:rPr lang="en-US" dirty="0" err="1">
+                <a:solidFill>
+                  <a:srgbClr val="000000"/>
+                </a:solidFill>
+                <a:latin typeface="Helvetica Neue"/>
+              </a:rPr>
+              <a:t>nhất</a:t>
+            </a:r>
+            <a:r>
+              <a:rPr lang="en-US" dirty="0">
+                <a:solidFill>
+                  <a:srgbClr val="000000"/>
+                </a:solidFill>
+                <a:latin typeface="Helvetica Neue"/>
+              </a:rPr>
+              <a:t> </a:t>
+            </a:r>
+            <a:r>
+              <a:rPr lang="en-US" dirty="0" err="1">
+                <a:solidFill>
+                  <a:srgbClr val="000000"/>
+                </a:solidFill>
+                <a:latin typeface="Helvetica Neue"/>
+              </a:rPr>
+              <a:t>thu</a:t>
+            </a:r>
+            <a:r>
+              <a:rPr lang="en-US" dirty="0">
+                <a:solidFill>
+                  <a:srgbClr val="000000"/>
+                </a:solidFill>
+                <a:latin typeface="Helvetica Neue"/>
+              </a:rPr>
+              <a:t> đ</a:t>
+            </a:r>
+            <a:r>
+              <a:rPr lang="vi-VN" dirty="0">
+                <a:solidFill>
+                  <a:srgbClr val="000000"/>
+                </a:solidFill>
+                <a:latin typeface="Helvetica Neue"/>
+              </a:rPr>
+              <a:t>ư</a:t>
+            </a:r>
+            <a:r>
+              <a:rPr lang="en-US" dirty="0" err="1">
+                <a:solidFill>
+                  <a:srgbClr val="000000"/>
+                </a:solidFill>
+                <a:latin typeface="Helvetica Neue"/>
+              </a:rPr>
+              <a:t>ợc</a:t>
+            </a:r>
+            <a:r>
+              <a:rPr lang="en-US" dirty="0">
+                <a:solidFill>
+                  <a:srgbClr val="000000"/>
+                </a:solidFill>
+                <a:latin typeface="Helvetica Neue"/>
+              </a:rPr>
+              <a:t> ở </a:t>
+            </a:r>
+            <a:r>
+              <a:rPr lang="en-US" dirty="0" err="1">
+                <a:solidFill>
+                  <a:srgbClr val="000000"/>
+                </a:solidFill>
+                <a:latin typeface="Helvetica Neue"/>
+              </a:rPr>
+              <a:t>tập</a:t>
+            </a:r>
+            <a:r>
+              <a:rPr lang="en-US" dirty="0">
+                <a:solidFill>
+                  <a:srgbClr val="000000"/>
+                </a:solidFill>
+                <a:latin typeface="Helvetica Neue"/>
+              </a:rPr>
+              <a:t> validation </a:t>
+            </a:r>
+            <a:r>
+              <a:rPr lang="en-US" dirty="0" err="1">
+                <a:solidFill>
+                  <a:srgbClr val="000000"/>
+                </a:solidFill>
+                <a:latin typeface="Helvetica Neue"/>
+              </a:rPr>
+              <a:t>là</a:t>
+            </a:r>
+            <a:r>
+              <a:rPr lang="en-US" dirty="0">
+                <a:solidFill>
+                  <a:srgbClr val="000000"/>
+                </a:solidFill>
+                <a:latin typeface="Helvetica Neue"/>
+              </a:rPr>
+              <a:t> </a:t>
+            </a:r>
+            <a:r>
+              <a:rPr lang="en-US" dirty="0">
+                <a:solidFill>
+                  <a:srgbClr val="0070C0"/>
+                </a:solidFill>
+                <a:latin typeface="Helvetica Neue"/>
+              </a:rPr>
+              <a:t>16.47%</a:t>
+            </a:r>
+            <a:r>
+              <a:rPr lang="en-US" dirty="0">
+                <a:solidFill>
+                  <a:srgbClr val="000000"/>
+                </a:solidFill>
+                <a:latin typeface="Helvetica Neue"/>
+              </a:rPr>
+              <a:t> </a:t>
+            </a:r>
+            <a:r>
+              <a:rPr lang="en-US" dirty="0" err="1">
+                <a:solidFill>
+                  <a:srgbClr val="000000"/>
+                </a:solidFill>
+                <a:latin typeface="Helvetica Neue"/>
+              </a:rPr>
+              <a:t>ứng</a:t>
+            </a:r>
+            <a:r>
+              <a:rPr lang="en-US" dirty="0">
+                <a:solidFill>
+                  <a:srgbClr val="000000"/>
+                </a:solidFill>
+                <a:latin typeface="Helvetica Neue"/>
+              </a:rPr>
+              <a:t> </a:t>
+            </a:r>
+            <a:r>
+              <a:rPr lang="en-US" dirty="0" err="1">
+                <a:solidFill>
+                  <a:srgbClr val="000000"/>
+                </a:solidFill>
+                <a:latin typeface="Helvetica Neue"/>
+              </a:rPr>
+              <a:t>với</a:t>
+            </a:r>
+            <a:r>
+              <a:rPr lang="en-US" dirty="0">
+                <a:solidFill>
+                  <a:srgbClr val="000000"/>
+                </a:solidFill>
+                <a:latin typeface="Helvetica Neue"/>
+              </a:rPr>
+              <a:t> </a:t>
+            </a:r>
+            <a:r>
+              <a:rPr lang="en-US" dirty="0" err="1">
+                <a:solidFill>
+                  <a:srgbClr val="0070C0"/>
+                </a:solidFill>
+                <a:latin typeface="Helvetica Neue"/>
+              </a:rPr>
+              <a:t>num_top_types</a:t>
+            </a:r>
+            <a:r>
+              <a:rPr lang="en-US" dirty="0">
+                <a:solidFill>
+                  <a:srgbClr val="0070C0"/>
+                </a:solidFill>
+                <a:latin typeface="Helvetica Neue"/>
+              </a:rPr>
+              <a:t> =  3 </a:t>
+            </a:r>
+            <a:r>
+              <a:rPr lang="en-US" dirty="0" err="1">
+                <a:solidFill>
+                  <a:srgbClr val="000000"/>
+                </a:solidFill>
+                <a:latin typeface="Helvetica Neue"/>
+              </a:rPr>
+              <a:t>và</a:t>
+            </a:r>
+            <a:r>
+              <a:rPr lang="en-US" dirty="0">
+                <a:solidFill>
+                  <a:srgbClr val="000000"/>
+                </a:solidFill>
+                <a:latin typeface="Helvetica Neue"/>
+              </a:rPr>
+              <a:t> </a:t>
+            </a:r>
+            <a:r>
+              <a:rPr lang="en-US" dirty="0">
+                <a:solidFill>
+                  <a:srgbClr val="0070C0"/>
+                </a:solidFill>
+                <a:latin typeface="Helvetica Neue"/>
+              </a:rPr>
+              <a:t>neighbors = 1</a:t>
+            </a:r>
+            <a:r>
+              <a:rPr lang="en-US" dirty="0">
+                <a:solidFill>
+                  <a:srgbClr val="000000"/>
+                </a:solidFill>
+                <a:latin typeface="Helvetica Neue"/>
+              </a:rPr>
+              <a:t>.</a:t>
+            </a:r>
+          </a:p>
+          <a:p>
+            <a:pPr marL="285750" indent="-285750">
+              <a:spcAft>
+                <a:spcPts val="300"/>
+              </a:spcAft>
+              <a:buFont typeface="Arial" panose="020B0604020202020204" pitchFamily="34" charset="0"/>
+              <a:buChar char="•"/>
+            </a:pPr>
+            <a:r>
+              <a:rPr lang="en-US" dirty="0">
+                <a:solidFill>
+                  <a:srgbClr val="A11378"/>
+                </a:solidFill>
+                <a:latin typeface="Helvetica Neue"/>
+              </a:rPr>
+              <a:t>Case 3: </a:t>
+            </a:r>
+            <a:r>
+              <a:rPr lang="en-US" dirty="0" err="1">
+                <a:solidFill>
+                  <a:srgbClr val="A11378"/>
+                </a:solidFill>
+                <a:latin typeface="Helvetica Neue"/>
+              </a:rPr>
+              <a:t>month_to_season</a:t>
+            </a:r>
+            <a:r>
+              <a:rPr lang="en-US" dirty="0">
+                <a:solidFill>
+                  <a:srgbClr val="A11378"/>
+                </a:solidFill>
+                <a:latin typeface="Helvetica Neue"/>
+              </a:rPr>
+              <a:t> = False </a:t>
+            </a:r>
+            <a:r>
+              <a:rPr lang="en-US" dirty="0" err="1">
+                <a:solidFill>
+                  <a:srgbClr val="A11378"/>
+                </a:solidFill>
+                <a:latin typeface="Helvetica Neue"/>
+              </a:rPr>
+              <a:t>và</a:t>
+            </a:r>
+            <a:r>
+              <a:rPr lang="en-US" dirty="0">
+                <a:solidFill>
+                  <a:srgbClr val="A11378"/>
+                </a:solidFill>
+                <a:latin typeface="Helvetica Neue"/>
+              </a:rPr>
+              <a:t> </a:t>
+            </a:r>
+            <a:r>
+              <a:rPr lang="en-US" dirty="0" err="1">
+                <a:solidFill>
+                  <a:srgbClr val="A11378"/>
+                </a:solidFill>
+                <a:latin typeface="Helvetica Neue"/>
+              </a:rPr>
+              <a:t>year_to_period</a:t>
+            </a:r>
+            <a:r>
+              <a:rPr lang="en-US" dirty="0">
+                <a:solidFill>
+                  <a:srgbClr val="A11378"/>
+                </a:solidFill>
+                <a:latin typeface="Helvetica Neue"/>
+              </a:rPr>
+              <a:t> = True</a:t>
+            </a:r>
+            <a:r>
+              <a:rPr lang="en-US" dirty="0">
+                <a:solidFill>
+                  <a:srgbClr val="000000"/>
+                </a:solidFill>
+                <a:latin typeface="Helvetica Neue"/>
+              </a:rPr>
+              <a:t>, </a:t>
+            </a:r>
+            <a:r>
+              <a:rPr lang="en-US" dirty="0" err="1">
+                <a:solidFill>
+                  <a:srgbClr val="000000"/>
+                </a:solidFill>
+                <a:latin typeface="Helvetica Neue"/>
+              </a:rPr>
+              <a:t>độ</a:t>
+            </a:r>
+            <a:r>
+              <a:rPr lang="en-US" dirty="0">
+                <a:solidFill>
+                  <a:srgbClr val="000000"/>
+                </a:solidFill>
+                <a:latin typeface="Helvetica Neue"/>
+              </a:rPr>
+              <a:t> </a:t>
+            </a:r>
+            <a:r>
+              <a:rPr lang="en-US" dirty="0" err="1">
+                <a:solidFill>
+                  <a:srgbClr val="000000"/>
+                </a:solidFill>
+                <a:latin typeface="Helvetica Neue"/>
+              </a:rPr>
+              <a:t>lỗi</a:t>
+            </a:r>
+            <a:r>
+              <a:rPr lang="en-US" dirty="0">
+                <a:solidFill>
+                  <a:srgbClr val="000000"/>
+                </a:solidFill>
+                <a:latin typeface="Helvetica Neue"/>
+              </a:rPr>
+              <a:t> </a:t>
+            </a:r>
+            <a:r>
+              <a:rPr lang="en-US" dirty="0" err="1">
+                <a:solidFill>
+                  <a:srgbClr val="000000"/>
+                </a:solidFill>
+                <a:latin typeface="Helvetica Neue"/>
+              </a:rPr>
+              <a:t>thấp</a:t>
+            </a:r>
+            <a:r>
+              <a:rPr lang="en-US" dirty="0">
+                <a:solidFill>
+                  <a:srgbClr val="000000"/>
+                </a:solidFill>
+                <a:latin typeface="Helvetica Neue"/>
+              </a:rPr>
+              <a:t> </a:t>
+            </a:r>
+            <a:r>
+              <a:rPr lang="en-US" dirty="0" err="1">
+                <a:solidFill>
+                  <a:srgbClr val="000000"/>
+                </a:solidFill>
+                <a:latin typeface="Helvetica Neue"/>
+              </a:rPr>
+              <a:t>nhất</a:t>
+            </a:r>
+            <a:r>
+              <a:rPr lang="en-US" dirty="0">
+                <a:solidFill>
+                  <a:srgbClr val="000000"/>
+                </a:solidFill>
+                <a:latin typeface="Helvetica Neue"/>
+              </a:rPr>
+              <a:t> </a:t>
+            </a:r>
+            <a:r>
+              <a:rPr lang="en-US" dirty="0" err="1">
+                <a:solidFill>
+                  <a:srgbClr val="000000"/>
+                </a:solidFill>
+                <a:latin typeface="Helvetica Neue"/>
+              </a:rPr>
+              <a:t>thu</a:t>
+            </a:r>
+            <a:r>
+              <a:rPr lang="en-US" dirty="0">
+                <a:solidFill>
+                  <a:srgbClr val="000000"/>
+                </a:solidFill>
+                <a:latin typeface="Helvetica Neue"/>
+              </a:rPr>
+              <a:t> đ</a:t>
+            </a:r>
+            <a:r>
+              <a:rPr lang="vi-VN" dirty="0">
+                <a:solidFill>
+                  <a:srgbClr val="000000"/>
+                </a:solidFill>
+                <a:latin typeface="Helvetica Neue"/>
+              </a:rPr>
+              <a:t>ư</a:t>
+            </a:r>
+            <a:r>
+              <a:rPr lang="en-US" dirty="0" err="1">
+                <a:solidFill>
+                  <a:srgbClr val="000000"/>
+                </a:solidFill>
+                <a:latin typeface="Helvetica Neue"/>
+              </a:rPr>
+              <a:t>ợc</a:t>
+            </a:r>
+            <a:r>
+              <a:rPr lang="en-US" dirty="0">
+                <a:solidFill>
+                  <a:srgbClr val="000000"/>
+                </a:solidFill>
+                <a:latin typeface="Helvetica Neue"/>
+              </a:rPr>
+              <a:t> ở </a:t>
+            </a:r>
+            <a:r>
+              <a:rPr lang="en-US" dirty="0" err="1">
+                <a:solidFill>
+                  <a:srgbClr val="000000"/>
+                </a:solidFill>
+                <a:latin typeface="Helvetica Neue"/>
+              </a:rPr>
+              <a:t>tập</a:t>
+            </a:r>
+            <a:r>
+              <a:rPr lang="en-US" dirty="0">
+                <a:solidFill>
+                  <a:srgbClr val="000000"/>
+                </a:solidFill>
+                <a:latin typeface="Helvetica Neue"/>
+              </a:rPr>
+              <a:t> validation </a:t>
+            </a:r>
+            <a:r>
+              <a:rPr lang="en-US" dirty="0" err="1">
+                <a:solidFill>
+                  <a:srgbClr val="000000"/>
+                </a:solidFill>
+                <a:latin typeface="Helvetica Neue"/>
+              </a:rPr>
+              <a:t>là</a:t>
+            </a:r>
+            <a:r>
+              <a:rPr lang="en-US" dirty="0">
+                <a:solidFill>
+                  <a:srgbClr val="000000"/>
+                </a:solidFill>
+                <a:latin typeface="Helvetica Neue"/>
+              </a:rPr>
+              <a:t> </a:t>
+            </a:r>
+            <a:r>
+              <a:rPr lang="en-US" dirty="0">
+                <a:solidFill>
+                  <a:srgbClr val="A11378"/>
+                </a:solidFill>
+                <a:latin typeface="Helvetica Neue"/>
+              </a:rPr>
+              <a:t>15.71%</a:t>
+            </a:r>
+            <a:r>
+              <a:rPr lang="en-US" dirty="0">
+                <a:solidFill>
+                  <a:srgbClr val="000000"/>
+                </a:solidFill>
+                <a:latin typeface="Helvetica Neue"/>
+              </a:rPr>
+              <a:t>  </a:t>
+            </a:r>
+            <a:r>
+              <a:rPr lang="en-US" dirty="0" err="1">
+                <a:solidFill>
+                  <a:srgbClr val="000000"/>
+                </a:solidFill>
+                <a:latin typeface="Helvetica Neue"/>
+              </a:rPr>
+              <a:t>ứng</a:t>
+            </a:r>
+            <a:r>
+              <a:rPr lang="en-US" dirty="0">
+                <a:solidFill>
+                  <a:srgbClr val="000000"/>
+                </a:solidFill>
+                <a:latin typeface="Helvetica Neue"/>
+              </a:rPr>
+              <a:t> </a:t>
+            </a:r>
+            <a:r>
+              <a:rPr lang="en-US" dirty="0" err="1">
+                <a:solidFill>
+                  <a:srgbClr val="000000"/>
+                </a:solidFill>
+                <a:latin typeface="Helvetica Neue"/>
+              </a:rPr>
+              <a:t>với</a:t>
+            </a:r>
+            <a:r>
+              <a:rPr lang="en-US" dirty="0">
+                <a:solidFill>
+                  <a:srgbClr val="000000"/>
+                </a:solidFill>
+                <a:latin typeface="Helvetica Neue"/>
+              </a:rPr>
+              <a:t> </a:t>
+            </a:r>
+            <a:r>
+              <a:rPr lang="en-US" dirty="0" err="1">
+                <a:solidFill>
+                  <a:srgbClr val="A11378"/>
+                </a:solidFill>
+                <a:latin typeface="Helvetica Neue"/>
+              </a:rPr>
+              <a:t>num_top_types</a:t>
+            </a:r>
+            <a:r>
+              <a:rPr lang="en-US" dirty="0">
+                <a:solidFill>
+                  <a:srgbClr val="A11378"/>
+                </a:solidFill>
+                <a:latin typeface="Helvetica Neue"/>
+              </a:rPr>
+              <a:t> = 1 </a:t>
+            </a:r>
+            <a:r>
+              <a:rPr lang="en-US" dirty="0" err="1">
+                <a:solidFill>
+                  <a:srgbClr val="000000"/>
+                </a:solidFill>
+                <a:latin typeface="Helvetica Neue"/>
+              </a:rPr>
+              <a:t>và</a:t>
+            </a:r>
+            <a:r>
+              <a:rPr lang="en-US" dirty="0">
+                <a:solidFill>
+                  <a:srgbClr val="000000"/>
+                </a:solidFill>
+                <a:latin typeface="Helvetica Neue"/>
+              </a:rPr>
+              <a:t> </a:t>
+            </a:r>
+            <a:r>
+              <a:rPr lang="en-US" dirty="0">
+                <a:solidFill>
+                  <a:srgbClr val="A11378"/>
+                </a:solidFill>
+                <a:latin typeface="Helvetica Neue"/>
+              </a:rPr>
+              <a:t>neighbors = 1</a:t>
+            </a:r>
+            <a:r>
+              <a:rPr lang="en-US" dirty="0">
+                <a:solidFill>
+                  <a:srgbClr val="000000"/>
+                </a:solidFill>
+                <a:latin typeface="Helvetica Neue"/>
+              </a:rPr>
+              <a:t>.</a:t>
+            </a:r>
+          </a:p>
+          <a:p>
+            <a:pPr marL="285750" indent="-285750">
+              <a:spcAft>
+                <a:spcPts val="300"/>
+              </a:spcAft>
+              <a:buFont typeface="Arial" panose="020B0604020202020204" pitchFamily="34" charset="0"/>
+              <a:buChar char="•"/>
+            </a:pPr>
+            <a:r>
+              <a:rPr lang="en-US" dirty="0">
+                <a:solidFill>
+                  <a:srgbClr val="FF6600"/>
+                </a:solidFill>
+                <a:latin typeface="Helvetica Neue"/>
+              </a:rPr>
+              <a:t>Case 4: </a:t>
+            </a:r>
+            <a:r>
+              <a:rPr lang="en-US" dirty="0" err="1">
+                <a:solidFill>
+                  <a:srgbClr val="FF6600"/>
+                </a:solidFill>
+                <a:latin typeface="Helvetica Neue"/>
+              </a:rPr>
+              <a:t>month_to_season</a:t>
+            </a:r>
+            <a:r>
+              <a:rPr lang="en-US" dirty="0">
+                <a:solidFill>
+                  <a:srgbClr val="FF6600"/>
+                </a:solidFill>
+                <a:latin typeface="Helvetica Neue"/>
+              </a:rPr>
+              <a:t> = False </a:t>
+            </a:r>
+            <a:r>
+              <a:rPr lang="en-US" dirty="0" err="1">
+                <a:solidFill>
+                  <a:srgbClr val="FF6600"/>
+                </a:solidFill>
+                <a:latin typeface="Helvetica Neue"/>
+              </a:rPr>
+              <a:t>và</a:t>
+            </a:r>
+            <a:r>
+              <a:rPr lang="en-US" dirty="0">
+                <a:solidFill>
+                  <a:srgbClr val="FF6600"/>
+                </a:solidFill>
+                <a:latin typeface="Helvetica Neue"/>
+              </a:rPr>
+              <a:t> </a:t>
+            </a:r>
+            <a:r>
+              <a:rPr lang="en-US" dirty="0" err="1">
+                <a:solidFill>
+                  <a:srgbClr val="FF6600"/>
+                </a:solidFill>
+                <a:latin typeface="Helvetica Neue"/>
+              </a:rPr>
+              <a:t>year_to_period</a:t>
+            </a:r>
+            <a:r>
+              <a:rPr lang="en-US" dirty="0">
+                <a:solidFill>
+                  <a:srgbClr val="FF6600"/>
+                </a:solidFill>
+                <a:latin typeface="Helvetica Neue"/>
+              </a:rPr>
+              <a:t> = False</a:t>
+            </a:r>
+            <a:r>
+              <a:rPr lang="en-US" dirty="0">
+                <a:solidFill>
+                  <a:srgbClr val="000000"/>
+                </a:solidFill>
+                <a:latin typeface="Helvetica Neue"/>
+              </a:rPr>
+              <a:t>, </a:t>
+            </a:r>
+            <a:r>
+              <a:rPr lang="en-US" dirty="0" err="1">
+                <a:solidFill>
+                  <a:srgbClr val="000000"/>
+                </a:solidFill>
+                <a:latin typeface="Helvetica Neue"/>
+              </a:rPr>
+              <a:t>độ</a:t>
+            </a:r>
+            <a:r>
+              <a:rPr lang="en-US" dirty="0">
+                <a:solidFill>
+                  <a:srgbClr val="000000"/>
+                </a:solidFill>
+                <a:latin typeface="Helvetica Neue"/>
+              </a:rPr>
+              <a:t> </a:t>
+            </a:r>
+            <a:r>
+              <a:rPr lang="en-US" dirty="0" err="1">
+                <a:solidFill>
+                  <a:srgbClr val="000000"/>
+                </a:solidFill>
+                <a:latin typeface="Helvetica Neue"/>
+              </a:rPr>
+              <a:t>lỗi</a:t>
+            </a:r>
+            <a:r>
+              <a:rPr lang="en-US" dirty="0">
+                <a:solidFill>
+                  <a:srgbClr val="000000"/>
+                </a:solidFill>
+                <a:latin typeface="Helvetica Neue"/>
+              </a:rPr>
+              <a:t> </a:t>
+            </a:r>
+            <a:r>
+              <a:rPr lang="en-US" dirty="0" err="1">
+                <a:solidFill>
+                  <a:srgbClr val="000000"/>
+                </a:solidFill>
+                <a:latin typeface="Helvetica Neue"/>
+              </a:rPr>
+              <a:t>thấp</a:t>
+            </a:r>
+            <a:r>
+              <a:rPr lang="en-US" dirty="0">
+                <a:solidFill>
+                  <a:srgbClr val="000000"/>
+                </a:solidFill>
+                <a:latin typeface="Helvetica Neue"/>
+              </a:rPr>
+              <a:t> </a:t>
+            </a:r>
+            <a:r>
+              <a:rPr lang="en-US" dirty="0" err="1">
+                <a:solidFill>
+                  <a:srgbClr val="000000"/>
+                </a:solidFill>
+                <a:latin typeface="Helvetica Neue"/>
+              </a:rPr>
+              <a:t>nhất</a:t>
+            </a:r>
+            <a:r>
+              <a:rPr lang="en-US" dirty="0">
+                <a:solidFill>
+                  <a:srgbClr val="000000"/>
+                </a:solidFill>
+                <a:latin typeface="Helvetica Neue"/>
+              </a:rPr>
+              <a:t> </a:t>
+            </a:r>
+            <a:r>
+              <a:rPr lang="en-US" dirty="0" err="1">
+                <a:solidFill>
+                  <a:srgbClr val="000000"/>
+                </a:solidFill>
+                <a:latin typeface="Helvetica Neue"/>
+              </a:rPr>
+              <a:t>thu</a:t>
+            </a:r>
+            <a:r>
+              <a:rPr lang="en-US" dirty="0">
+                <a:solidFill>
+                  <a:srgbClr val="000000"/>
+                </a:solidFill>
+                <a:latin typeface="Helvetica Neue"/>
+              </a:rPr>
+              <a:t> đ</a:t>
+            </a:r>
+            <a:r>
+              <a:rPr lang="vi-VN" dirty="0">
+                <a:solidFill>
+                  <a:srgbClr val="000000"/>
+                </a:solidFill>
+                <a:latin typeface="Helvetica Neue"/>
+              </a:rPr>
+              <a:t>ư</a:t>
+            </a:r>
+            <a:r>
+              <a:rPr lang="en-US" dirty="0" err="1">
+                <a:solidFill>
+                  <a:srgbClr val="000000"/>
+                </a:solidFill>
+                <a:latin typeface="Helvetica Neue"/>
+              </a:rPr>
+              <a:t>ợc</a:t>
+            </a:r>
+            <a:r>
+              <a:rPr lang="en-US" dirty="0">
+                <a:solidFill>
+                  <a:srgbClr val="000000"/>
+                </a:solidFill>
+                <a:latin typeface="Helvetica Neue"/>
+              </a:rPr>
+              <a:t> ở </a:t>
+            </a:r>
+            <a:r>
+              <a:rPr lang="en-US" dirty="0" err="1">
+                <a:solidFill>
+                  <a:srgbClr val="000000"/>
+                </a:solidFill>
+                <a:latin typeface="Helvetica Neue"/>
+              </a:rPr>
+              <a:t>tập</a:t>
+            </a:r>
+            <a:r>
+              <a:rPr lang="en-US" dirty="0">
+                <a:solidFill>
+                  <a:srgbClr val="000000"/>
+                </a:solidFill>
+                <a:latin typeface="Helvetica Neue"/>
+              </a:rPr>
+              <a:t> validation </a:t>
+            </a:r>
+            <a:r>
+              <a:rPr lang="en-US" dirty="0" err="1">
+                <a:solidFill>
+                  <a:srgbClr val="000000"/>
+                </a:solidFill>
+                <a:latin typeface="Helvetica Neue"/>
+              </a:rPr>
+              <a:t>là</a:t>
+            </a:r>
+            <a:r>
+              <a:rPr lang="en-US" dirty="0">
+                <a:solidFill>
+                  <a:srgbClr val="000000"/>
+                </a:solidFill>
+                <a:latin typeface="Helvetica Neue"/>
+              </a:rPr>
+              <a:t> </a:t>
+            </a:r>
+            <a:r>
+              <a:rPr lang="en-US" dirty="0">
+                <a:solidFill>
+                  <a:srgbClr val="FF3300"/>
+                </a:solidFill>
+                <a:latin typeface="Helvetica Neue"/>
+              </a:rPr>
+              <a:t>16.47 %  </a:t>
+            </a:r>
+            <a:r>
+              <a:rPr lang="en-US" dirty="0" err="1">
+                <a:solidFill>
+                  <a:srgbClr val="000000"/>
+                </a:solidFill>
+                <a:latin typeface="Helvetica Neue"/>
+              </a:rPr>
+              <a:t>ứng</a:t>
+            </a:r>
+            <a:r>
+              <a:rPr lang="en-US" dirty="0">
+                <a:solidFill>
+                  <a:srgbClr val="000000"/>
+                </a:solidFill>
+                <a:latin typeface="Helvetica Neue"/>
+              </a:rPr>
+              <a:t> </a:t>
+            </a:r>
+            <a:r>
+              <a:rPr lang="en-US" dirty="0" err="1">
+                <a:solidFill>
+                  <a:srgbClr val="000000"/>
+                </a:solidFill>
+                <a:latin typeface="Helvetica Neue"/>
+              </a:rPr>
+              <a:t>với</a:t>
+            </a:r>
+            <a:r>
+              <a:rPr lang="en-US" dirty="0">
+                <a:solidFill>
+                  <a:srgbClr val="000000"/>
+                </a:solidFill>
+                <a:latin typeface="Helvetica Neue"/>
+              </a:rPr>
+              <a:t> </a:t>
+            </a:r>
+            <a:r>
+              <a:rPr lang="en-US" dirty="0" err="1">
+                <a:solidFill>
+                  <a:srgbClr val="FF3300"/>
+                </a:solidFill>
+                <a:latin typeface="Helvetica Neue"/>
+              </a:rPr>
+              <a:t>num_top_types</a:t>
+            </a:r>
+            <a:r>
+              <a:rPr lang="en-US" dirty="0">
+                <a:solidFill>
+                  <a:srgbClr val="FF3300"/>
+                </a:solidFill>
+                <a:latin typeface="Helvetica Neue"/>
+              </a:rPr>
+              <a:t> = 3 </a:t>
+            </a:r>
+            <a:r>
+              <a:rPr lang="en-US" dirty="0" err="1">
+                <a:solidFill>
+                  <a:srgbClr val="000000"/>
+                </a:solidFill>
+                <a:latin typeface="Helvetica Neue"/>
+              </a:rPr>
+              <a:t>và</a:t>
+            </a:r>
+            <a:r>
+              <a:rPr lang="en-US" dirty="0">
+                <a:solidFill>
+                  <a:srgbClr val="000000"/>
+                </a:solidFill>
+                <a:latin typeface="Helvetica Neue"/>
+              </a:rPr>
+              <a:t> </a:t>
+            </a:r>
+            <a:r>
+              <a:rPr lang="en-US" dirty="0">
+                <a:solidFill>
+                  <a:srgbClr val="FF3300"/>
+                </a:solidFill>
+                <a:latin typeface="Helvetica Neue"/>
+              </a:rPr>
+              <a:t>neighbors =  1</a:t>
+            </a:r>
+            <a:r>
+              <a:rPr lang="en-US" dirty="0">
+                <a:solidFill>
+                  <a:srgbClr val="000000"/>
+                </a:solidFill>
+                <a:latin typeface="Helvetica Neue"/>
+              </a:rPr>
+              <a:t>.</a:t>
+            </a:r>
+          </a:p>
+        </p:txBody>
+      </p:sp>
+      <p:sp>
+        <p:nvSpPr>
+          <p:cNvPr id="9" name="Rectangle 8">
+            <a:extLst>
+              <a:ext uri="{FF2B5EF4-FFF2-40B4-BE49-F238E27FC236}">
+                <a16:creationId xmlns:a16="http://schemas.microsoft.com/office/drawing/2014/main" id="{C880B703-85EE-42A9-9865-E5B456A074FD}"/>
+              </a:ext>
+            </a:extLst>
+          </p:cNvPr>
+          <p:cNvSpPr/>
+          <p:nvPr/>
+        </p:nvSpPr>
+        <p:spPr>
+          <a:xfrm>
+            <a:off x="288379" y="3391633"/>
+            <a:ext cx="11377366" cy="369332"/>
+          </a:xfrm>
+          <a:prstGeom prst="rect">
+            <a:avLst/>
+          </a:prstGeom>
+        </p:spPr>
+        <p:txBody>
+          <a:bodyPr wrap="square">
+            <a:spAutoFit/>
+          </a:bodyPr>
+          <a:lstStyle/>
+          <a:p>
+            <a:r>
+              <a:rPr lang="en-US" dirty="0" err="1">
+                <a:solidFill>
+                  <a:srgbClr val="000000"/>
+                </a:solidFill>
+                <a:latin typeface="Helvetica Neue"/>
+              </a:rPr>
+              <a:t>Trong</a:t>
+            </a:r>
+            <a:r>
+              <a:rPr lang="en-US" dirty="0">
+                <a:solidFill>
+                  <a:srgbClr val="000000"/>
+                </a:solidFill>
+                <a:latin typeface="Helvetica Neue"/>
+              </a:rPr>
+              <a:t> tr</a:t>
+            </a:r>
+            <a:r>
+              <a:rPr lang="vi-VN" dirty="0">
+                <a:solidFill>
+                  <a:srgbClr val="000000"/>
+                </a:solidFill>
+                <a:latin typeface="Helvetica Neue"/>
+              </a:rPr>
+              <a:t>ư</a:t>
+            </a:r>
+            <a:r>
+              <a:rPr lang="en-US" dirty="0" err="1">
+                <a:solidFill>
+                  <a:srgbClr val="000000"/>
+                </a:solidFill>
+                <a:latin typeface="Helvetica Neue"/>
+              </a:rPr>
+              <a:t>ờng</a:t>
+            </a:r>
+            <a:r>
+              <a:rPr lang="en-US" dirty="0">
+                <a:solidFill>
+                  <a:srgbClr val="000000"/>
+                </a:solidFill>
+                <a:latin typeface="Helvetica Neue"/>
+              </a:rPr>
+              <a:t> </a:t>
+            </a:r>
+            <a:r>
+              <a:rPr lang="en-US" dirty="0" err="1">
+                <a:solidFill>
+                  <a:srgbClr val="000000"/>
+                </a:solidFill>
+                <a:latin typeface="Helvetica Neue"/>
+              </a:rPr>
+              <a:t>hợp</a:t>
+            </a:r>
+            <a:r>
+              <a:rPr lang="en-US" dirty="0">
+                <a:solidFill>
+                  <a:srgbClr val="000000"/>
+                </a:solidFill>
+                <a:latin typeface="Helvetica Neue"/>
+              </a:rPr>
+              <a:t> </a:t>
+            </a:r>
+            <a:r>
+              <a:rPr lang="en-US" dirty="0" err="1">
+                <a:solidFill>
+                  <a:srgbClr val="000000"/>
+                </a:solidFill>
+                <a:latin typeface="Helvetica Neue"/>
+              </a:rPr>
+              <a:t>dùng</a:t>
+            </a:r>
+            <a:r>
+              <a:rPr lang="en-US" dirty="0">
+                <a:solidFill>
+                  <a:srgbClr val="000000"/>
+                </a:solidFill>
+                <a:latin typeface="Helvetica Neue"/>
+              </a:rPr>
+              <a:t> K-</a:t>
+            </a:r>
+            <a:r>
+              <a:rPr lang="en-US" dirty="0" err="1">
+                <a:solidFill>
+                  <a:srgbClr val="000000"/>
+                </a:solidFill>
+                <a:latin typeface="Helvetica Neue"/>
+              </a:rPr>
+              <a:t>Neightbors</a:t>
+            </a:r>
+            <a:r>
+              <a:rPr lang="en-US" dirty="0">
+                <a:solidFill>
+                  <a:srgbClr val="000000"/>
+                </a:solidFill>
+                <a:latin typeface="Helvetica Neue"/>
+              </a:rPr>
+              <a:t> Regressor </a:t>
+            </a:r>
+            <a:r>
+              <a:rPr lang="en-US" dirty="0" err="1">
+                <a:solidFill>
+                  <a:srgbClr val="000000"/>
+                </a:solidFill>
+                <a:latin typeface="Helvetica Neue"/>
+              </a:rPr>
+              <a:t>để</a:t>
+            </a:r>
+            <a:r>
+              <a:rPr lang="en-US" dirty="0">
+                <a:solidFill>
+                  <a:srgbClr val="000000"/>
+                </a:solidFill>
+                <a:latin typeface="Helvetica Neue"/>
+              </a:rPr>
+              <a:t> </a:t>
+            </a:r>
+            <a:r>
+              <a:rPr lang="en-US" dirty="0" err="1">
+                <a:solidFill>
+                  <a:srgbClr val="000000"/>
+                </a:solidFill>
+                <a:latin typeface="Helvetica Neue"/>
+              </a:rPr>
+              <a:t>dự</a:t>
+            </a:r>
+            <a:r>
+              <a:rPr lang="en-US" dirty="0">
+                <a:solidFill>
+                  <a:srgbClr val="000000"/>
+                </a:solidFill>
+                <a:latin typeface="Helvetica Neue"/>
+              </a:rPr>
+              <a:t> </a:t>
+            </a:r>
+            <a:r>
+              <a:rPr lang="en-US" dirty="0" err="1">
+                <a:solidFill>
+                  <a:srgbClr val="000000"/>
+                </a:solidFill>
+                <a:latin typeface="Helvetica Neue"/>
+              </a:rPr>
+              <a:t>đoán</a:t>
+            </a:r>
+            <a:r>
+              <a:rPr lang="en-US" dirty="0">
+                <a:solidFill>
+                  <a:srgbClr val="000000"/>
+                </a:solidFill>
+                <a:latin typeface="Helvetica Neue"/>
+              </a:rPr>
+              <a:t> </a:t>
+            </a:r>
+            <a:r>
+              <a:rPr lang="en-US" dirty="0" err="1">
+                <a:solidFill>
+                  <a:srgbClr val="000000"/>
+                </a:solidFill>
+                <a:latin typeface="Helvetica Neue"/>
+              </a:rPr>
+              <a:t>thì</a:t>
+            </a:r>
+            <a:r>
+              <a:rPr lang="en-US" dirty="0">
+                <a:solidFill>
+                  <a:srgbClr val="000000"/>
+                </a:solidFill>
+                <a:latin typeface="Helvetica Neue"/>
+              </a:rPr>
+              <a:t> </a:t>
+            </a:r>
+            <a:r>
+              <a:rPr lang="en-US" dirty="0" err="1">
+                <a:solidFill>
+                  <a:srgbClr val="000000"/>
+                </a:solidFill>
+                <a:latin typeface="Helvetica Neue"/>
+              </a:rPr>
+              <a:t>thấy</a:t>
+            </a:r>
+            <a:r>
+              <a:rPr lang="en-US" dirty="0">
+                <a:solidFill>
+                  <a:srgbClr val="000000"/>
+                </a:solidFill>
+                <a:latin typeface="Helvetica Neue"/>
+              </a:rPr>
+              <a:t> </a:t>
+            </a:r>
+            <a:r>
+              <a:rPr lang="en-US" dirty="0" err="1">
+                <a:solidFill>
+                  <a:srgbClr val="000000"/>
+                </a:solidFill>
+                <a:latin typeface="Helvetica Neue"/>
+              </a:rPr>
+              <a:t>rằng</a:t>
+            </a:r>
+            <a:r>
+              <a:rPr lang="en-US" dirty="0">
+                <a:solidFill>
+                  <a:srgbClr val="000000"/>
+                </a:solidFill>
+                <a:latin typeface="Helvetica Neue"/>
+              </a:rPr>
+              <a:t>…. </a:t>
+            </a:r>
+          </a:p>
+        </p:txBody>
+      </p:sp>
+      <p:sp>
+        <p:nvSpPr>
+          <p:cNvPr id="11" name="Rectangle 10">
+            <a:extLst>
+              <a:ext uri="{FF2B5EF4-FFF2-40B4-BE49-F238E27FC236}">
+                <a16:creationId xmlns:a16="http://schemas.microsoft.com/office/drawing/2014/main" id="{957791FA-BAEE-4F78-8D23-1B475939DAD8}"/>
+              </a:ext>
+            </a:extLst>
+          </p:cNvPr>
+          <p:cNvSpPr/>
+          <p:nvPr/>
+        </p:nvSpPr>
+        <p:spPr>
+          <a:xfrm>
+            <a:off x="332034" y="5291224"/>
+            <a:ext cx="11377366" cy="646331"/>
+          </a:xfrm>
+          <a:prstGeom prst="rect">
+            <a:avLst/>
+          </a:prstGeom>
+        </p:spPr>
+        <p:txBody>
+          <a:bodyPr wrap="square">
+            <a:spAutoFit/>
+          </a:bodyPr>
+          <a:lstStyle/>
+          <a:p>
+            <a:pPr algn="just">
+              <a:spcAft>
+                <a:spcPts val="600"/>
+              </a:spcAft>
+            </a:pPr>
+            <a:r>
+              <a:rPr lang="en-US" dirty="0" err="1">
+                <a:latin typeface="Helvetica Neue"/>
+              </a:rPr>
+              <a:t>Ghi</a:t>
+            </a:r>
+            <a:r>
+              <a:rPr lang="en-US" dirty="0">
+                <a:latin typeface="Helvetica Neue"/>
+              </a:rPr>
+              <a:t> </a:t>
+            </a:r>
+            <a:r>
+              <a:rPr lang="en-US" dirty="0" err="1">
+                <a:latin typeface="Helvetica Neue"/>
+              </a:rPr>
+              <a:t>nhận</a:t>
+            </a:r>
+            <a:r>
+              <a:rPr lang="en-US" dirty="0">
+                <a:latin typeface="Helvetica Neue"/>
+              </a:rPr>
+              <a:t> </a:t>
+            </a:r>
+            <a:r>
+              <a:rPr lang="en-US" dirty="0" err="1">
+                <a:latin typeface="Helvetica Neue"/>
+              </a:rPr>
+              <a:t>độ</a:t>
+            </a:r>
+            <a:r>
+              <a:rPr lang="en-US" dirty="0">
+                <a:latin typeface="Helvetica Neue"/>
+              </a:rPr>
+              <a:t> </a:t>
+            </a:r>
+            <a:r>
+              <a:rPr lang="en-US" dirty="0" err="1">
+                <a:latin typeface="Helvetica Neue"/>
+              </a:rPr>
+              <a:t>lỗi</a:t>
+            </a:r>
+            <a:r>
+              <a:rPr lang="en-US" dirty="0">
+                <a:latin typeface="Helvetica Neue"/>
+              </a:rPr>
+              <a:t> </a:t>
+            </a:r>
+            <a:r>
+              <a:rPr lang="en-US" dirty="0" err="1">
+                <a:latin typeface="Helvetica Neue"/>
+              </a:rPr>
+              <a:t>thấp</a:t>
+            </a:r>
+            <a:r>
+              <a:rPr lang="en-US" dirty="0">
+                <a:latin typeface="Helvetica Neue"/>
+              </a:rPr>
+              <a:t> </a:t>
+            </a:r>
+            <a:r>
+              <a:rPr lang="en-US" dirty="0" err="1">
+                <a:latin typeface="Helvetica Neue"/>
+              </a:rPr>
+              <a:t>nhất</a:t>
+            </a:r>
+            <a:r>
+              <a:rPr lang="en-US" dirty="0">
+                <a:latin typeface="Helvetica Neue"/>
+              </a:rPr>
+              <a:t> </a:t>
+            </a:r>
+            <a:r>
+              <a:rPr lang="en-US" dirty="0" err="1">
+                <a:latin typeface="Helvetica Neue"/>
+              </a:rPr>
+              <a:t>trên</a:t>
+            </a:r>
+            <a:r>
+              <a:rPr lang="en-US" dirty="0">
+                <a:latin typeface="Helvetica Neue"/>
+              </a:rPr>
+              <a:t> </a:t>
+            </a:r>
+            <a:r>
+              <a:rPr lang="en-US" dirty="0" err="1">
+                <a:latin typeface="Helvetica Neue"/>
+              </a:rPr>
+              <a:t>tập</a:t>
+            </a:r>
+            <a:r>
+              <a:rPr lang="en-US" dirty="0">
+                <a:latin typeface="Helvetica Neue"/>
+              </a:rPr>
+              <a:t> validation </a:t>
+            </a:r>
+            <a:r>
+              <a:rPr lang="en-US" dirty="0" err="1">
+                <a:latin typeface="Helvetica Neue"/>
+              </a:rPr>
+              <a:t>khi</a:t>
+            </a:r>
+            <a:r>
+              <a:rPr lang="en-US" dirty="0">
+                <a:latin typeface="Helvetica Neue"/>
+              </a:rPr>
+              <a:t> </a:t>
+            </a:r>
+            <a:r>
+              <a:rPr lang="en-US" dirty="0" err="1">
+                <a:latin typeface="Helvetica Neue"/>
+              </a:rPr>
+              <a:t>dùng</a:t>
+            </a:r>
+            <a:r>
+              <a:rPr lang="en-US" dirty="0">
+                <a:latin typeface="Helvetica Neue"/>
+              </a:rPr>
+              <a:t> </a:t>
+            </a:r>
+            <a:r>
+              <a:rPr lang="en-US" dirty="0" err="1">
+                <a:latin typeface="Helvetica Neue"/>
+              </a:rPr>
+              <a:t>mô</a:t>
+            </a:r>
+            <a:r>
+              <a:rPr lang="en-US" dirty="0">
+                <a:latin typeface="Helvetica Neue"/>
+              </a:rPr>
+              <a:t> </a:t>
+            </a:r>
+            <a:r>
+              <a:rPr lang="en-US" dirty="0" err="1">
+                <a:latin typeface="Helvetica Neue"/>
+              </a:rPr>
+              <a:t>hình</a:t>
+            </a:r>
+            <a:r>
+              <a:rPr lang="en-US" dirty="0">
+                <a:latin typeface="Helvetica Neue"/>
+              </a:rPr>
+              <a:t> K-Neighbors Regressor </a:t>
+            </a:r>
+            <a:r>
+              <a:rPr lang="en-US" dirty="0" err="1">
+                <a:latin typeface="Helvetica Neue"/>
+              </a:rPr>
+              <a:t>là</a:t>
+            </a:r>
+            <a:r>
+              <a:rPr lang="en-US" dirty="0">
+                <a:latin typeface="Helvetica Neue"/>
+              </a:rPr>
+              <a:t> </a:t>
+            </a:r>
+            <a:r>
+              <a:rPr lang="en-US" dirty="0">
+                <a:solidFill>
+                  <a:srgbClr val="FF0000"/>
+                </a:solidFill>
+                <a:latin typeface="Helvetica Neue"/>
+              </a:rPr>
+              <a:t>15.71%</a:t>
+            </a:r>
+            <a:r>
+              <a:rPr lang="en-US" dirty="0">
+                <a:latin typeface="Helvetica Neue"/>
+              </a:rPr>
+              <a:t> </a:t>
+            </a:r>
+            <a:r>
+              <a:rPr lang="en-US" dirty="0" err="1">
+                <a:latin typeface="Helvetica Neue"/>
+              </a:rPr>
+              <a:t>ứng</a:t>
+            </a:r>
+            <a:r>
+              <a:rPr lang="en-US" dirty="0">
+                <a:latin typeface="Helvetica Neue"/>
+              </a:rPr>
+              <a:t> </a:t>
+            </a:r>
+            <a:r>
+              <a:rPr lang="en-US" dirty="0" err="1">
+                <a:latin typeface="Helvetica Neue"/>
+              </a:rPr>
+              <a:t>với</a:t>
+            </a:r>
+            <a:r>
+              <a:rPr lang="en-US" dirty="0">
+                <a:latin typeface="Helvetica Neue"/>
+              </a:rPr>
+              <a:t> </a:t>
+            </a:r>
+            <a:r>
+              <a:rPr lang="en-US" dirty="0" err="1">
+                <a:latin typeface="Helvetica Neue"/>
+              </a:rPr>
+              <a:t>các</a:t>
+            </a:r>
+            <a:r>
+              <a:rPr lang="en-US" dirty="0">
+                <a:latin typeface="Helvetica Neue"/>
+              </a:rPr>
+              <a:t> </a:t>
+            </a:r>
+            <a:r>
+              <a:rPr lang="en-US" dirty="0" err="1">
+                <a:latin typeface="Helvetica Neue"/>
+              </a:rPr>
+              <a:t>siêu</a:t>
+            </a:r>
+            <a:r>
+              <a:rPr lang="en-US" dirty="0">
+                <a:latin typeface="Helvetica Neue"/>
+              </a:rPr>
+              <a:t> </a:t>
+            </a:r>
+            <a:r>
+              <a:rPr lang="en-US" dirty="0" err="1">
+                <a:latin typeface="Helvetica Neue"/>
+              </a:rPr>
+              <a:t>tham</a:t>
+            </a:r>
+            <a:r>
+              <a:rPr lang="en-US" dirty="0">
+                <a:latin typeface="Helvetica Neue"/>
+              </a:rPr>
+              <a:t> </a:t>
+            </a:r>
+            <a:r>
+              <a:rPr lang="en-US" dirty="0" err="1">
+                <a:latin typeface="Helvetica Neue"/>
+              </a:rPr>
+              <a:t>số</a:t>
+            </a:r>
+            <a:r>
+              <a:rPr lang="en-US" dirty="0">
+                <a:latin typeface="Helvetica Neue"/>
+              </a:rPr>
+              <a:t> </a:t>
+            </a:r>
+            <a:r>
+              <a:rPr lang="en-US" dirty="0" err="1">
+                <a:solidFill>
+                  <a:srgbClr val="00B050"/>
+                </a:solidFill>
+                <a:latin typeface="Helvetica Neue"/>
+              </a:rPr>
+              <a:t>month_to_season</a:t>
+            </a:r>
+            <a:r>
+              <a:rPr lang="en-US" dirty="0">
+                <a:solidFill>
+                  <a:srgbClr val="00B050"/>
+                </a:solidFill>
+                <a:latin typeface="Helvetica Neue"/>
+              </a:rPr>
+              <a:t> = False, </a:t>
+            </a:r>
+            <a:r>
+              <a:rPr lang="en-US" dirty="0" err="1">
+                <a:solidFill>
+                  <a:srgbClr val="00B050"/>
+                </a:solidFill>
+                <a:latin typeface="Helvetica Neue"/>
+              </a:rPr>
+              <a:t>year_to_period</a:t>
+            </a:r>
+            <a:r>
+              <a:rPr lang="en-US" dirty="0">
+                <a:solidFill>
+                  <a:srgbClr val="00B050"/>
+                </a:solidFill>
+                <a:latin typeface="Helvetica Neue"/>
+              </a:rPr>
+              <a:t> = True, </a:t>
+            </a:r>
+            <a:r>
+              <a:rPr lang="en-US" dirty="0" err="1">
+                <a:solidFill>
+                  <a:srgbClr val="00B050"/>
+                </a:solidFill>
+                <a:latin typeface="Helvetica Neue"/>
+              </a:rPr>
+              <a:t>num_top_types</a:t>
+            </a:r>
+            <a:r>
+              <a:rPr lang="en-US" dirty="0">
+                <a:solidFill>
+                  <a:srgbClr val="00B050"/>
+                </a:solidFill>
+                <a:latin typeface="Helvetica Neue"/>
+              </a:rPr>
+              <a:t> = 1 </a:t>
+            </a:r>
+            <a:r>
+              <a:rPr lang="en-US" dirty="0" err="1">
+                <a:latin typeface="Helvetica Neue"/>
+              </a:rPr>
+              <a:t>và</a:t>
+            </a:r>
+            <a:r>
+              <a:rPr lang="en-US" dirty="0">
+                <a:latin typeface="Helvetica Neue"/>
+              </a:rPr>
+              <a:t> </a:t>
+            </a:r>
+            <a:r>
+              <a:rPr lang="en-US" dirty="0">
+                <a:solidFill>
+                  <a:srgbClr val="00B050"/>
+                </a:solidFill>
+                <a:latin typeface="Helvetica Neue"/>
+              </a:rPr>
+              <a:t>neighbors = 1</a:t>
+            </a:r>
+            <a:r>
+              <a:rPr lang="en-US" dirty="0">
+                <a:latin typeface="Helvetica Neue"/>
+              </a:rPr>
+              <a:t>. </a:t>
+            </a:r>
           </a:p>
         </p:txBody>
       </p:sp>
@@ -26634,681 +30117,7 @@
 </p:sld>
 </file>
 
-<file path=ppt/slides/slide2.xml><?xml version="1.0" encoding="utf-8"?>
-<p:sld xmlns:a="http://schemas.openxmlformats.org/drawingml/2006/main" xmlns:r="http://schemas.openxmlformats.org/officeDocument/2006/relationships" xmlns:p="http://schemas.openxmlformats.org/presentationml/2006/main">
-  <p:cSld>
-    <p:bg>
-      <p:bgPr>
-        <a:solidFill>
-          <a:schemeClr val="bg1"/>
-        </a:solidFill>
-        <a:effectLst/>
-      </p:bgPr>
-    </p:bg>
-    <p:spTree>
-      <p:nvGrpSpPr>
-        <p:cNvPr id="1" name=""/>
-        <p:cNvGrpSpPr/>
-        <p:nvPr/>
-      </p:nvGrpSpPr>
-      <p:grpSpPr>
-        <a:xfrm>
-          <a:off x="0" y="0"/>
-          <a:ext cx="0" cy="0"/>
-          <a:chOff x="0" y="0"/>
-          <a:chExt cx="0" cy="0"/>
-        </a:xfrm>
-      </p:grpSpPr>
-      <p:sp>
-        <p:nvSpPr>
-          <p:cNvPr id="2" name="Title 1">
-            <a:extLst>
-              <a:ext uri="{FF2B5EF4-FFF2-40B4-BE49-F238E27FC236}">
-                <a16:creationId xmlns:a16="http://schemas.microsoft.com/office/drawing/2014/main" id="{BD1588DC-B69E-4785-A516-B2BB17BEE9F6}"/>
-              </a:ext>
-            </a:extLst>
-          </p:cNvPr>
-          <p:cNvSpPr>
-            <a:spLocks noGrp="1"/>
-          </p:cNvSpPr>
-          <p:nvPr>
-            <p:ph type="title"/>
-          </p:nvPr>
-        </p:nvSpPr>
-        <p:spPr>
-          <a:xfrm>
-            <a:off x="581192" y="702156"/>
-            <a:ext cx="11029616" cy="742331"/>
-          </a:xfrm>
-        </p:spPr>
-        <p:txBody>
-          <a:bodyPr/>
-          <a:lstStyle/>
-          <a:p>
-            <a:r>
-              <a:rPr lang="en-US" dirty="0"/>
-              <a:t>NỘI DUNG CHÍNH</a:t>
-            </a:r>
-          </a:p>
-        </p:txBody>
-      </p:sp>
-      <p:sp>
-        <p:nvSpPr>
-          <p:cNvPr id="12" name="Rectangle 11">
-            <a:extLst>
-              <a:ext uri="{FF2B5EF4-FFF2-40B4-BE49-F238E27FC236}">
-                <a16:creationId xmlns:a16="http://schemas.microsoft.com/office/drawing/2014/main" id="{000EA21E-C331-4511-BBF4-58646552B751}"/>
-              </a:ext>
-            </a:extLst>
-          </p:cNvPr>
-          <p:cNvSpPr/>
-          <p:nvPr/>
-        </p:nvSpPr>
-        <p:spPr>
-          <a:xfrm>
-            <a:off x="375404" y="4891845"/>
-            <a:ext cx="2067041" cy="461665"/>
-          </a:xfrm>
-          <a:prstGeom prst="rect">
-            <a:avLst/>
-          </a:prstGeom>
-        </p:spPr>
-        <p:txBody>
-          <a:bodyPr wrap="none">
-            <a:spAutoFit/>
-          </a:bodyPr>
-          <a:lstStyle/>
-          <a:p>
-            <a:r>
-              <a:rPr lang="en-US" sz="2400" dirty="0" err="1">
-                <a:latin typeface="Calibri (Body)"/>
-              </a:rPr>
-              <a:t>Câu</a:t>
-            </a:r>
-            <a:r>
-              <a:rPr lang="en-US" sz="2400" dirty="0">
-                <a:latin typeface="Calibri (Body)"/>
-              </a:rPr>
-              <a:t> </a:t>
-            </a:r>
-            <a:r>
-              <a:rPr lang="en-US" sz="2400" dirty="0" err="1">
-                <a:latin typeface="Calibri (Body)"/>
-              </a:rPr>
-              <a:t>hỏi</a:t>
-            </a:r>
-            <a:r>
-              <a:rPr lang="en-US" sz="2400" dirty="0">
-                <a:latin typeface="Calibri (Body)"/>
-              </a:rPr>
-              <a:t> </a:t>
-            </a:r>
-            <a:r>
-              <a:rPr lang="en-US" sz="2400" dirty="0" err="1">
-                <a:latin typeface="Calibri (Body)"/>
-              </a:rPr>
-              <a:t>đặt</a:t>
-            </a:r>
-            <a:r>
-              <a:rPr lang="en-US" sz="2400" dirty="0">
-                <a:latin typeface="Calibri (Body)"/>
-              </a:rPr>
-              <a:t> ra?</a:t>
-            </a:r>
-          </a:p>
-        </p:txBody>
-      </p:sp>
-      <p:sp>
-        <p:nvSpPr>
-          <p:cNvPr id="13" name="Rectangle 12">
-            <a:extLst>
-              <a:ext uri="{FF2B5EF4-FFF2-40B4-BE49-F238E27FC236}">
-                <a16:creationId xmlns:a16="http://schemas.microsoft.com/office/drawing/2014/main" id="{D851022F-29D1-4E33-8115-996C4E75B4D6}"/>
-              </a:ext>
-            </a:extLst>
-          </p:cNvPr>
-          <p:cNvSpPr/>
-          <p:nvPr/>
-        </p:nvSpPr>
-        <p:spPr>
-          <a:xfrm>
-            <a:off x="2558172" y="4891845"/>
-            <a:ext cx="2244525" cy="461665"/>
-          </a:xfrm>
-          <a:prstGeom prst="rect">
-            <a:avLst/>
-          </a:prstGeom>
-        </p:spPr>
-        <p:txBody>
-          <a:bodyPr wrap="none">
-            <a:spAutoFit/>
-          </a:bodyPr>
-          <a:lstStyle/>
-          <a:p>
-            <a:pPr algn="ctr"/>
-            <a:r>
-              <a:rPr lang="en-US" sz="2400" dirty="0">
-                <a:latin typeface="Calibri (Body)"/>
-              </a:rPr>
-              <a:t>Thu </a:t>
-            </a:r>
-            <a:r>
-              <a:rPr lang="en-US" sz="2400" dirty="0" err="1">
-                <a:latin typeface="Calibri (Body)"/>
-              </a:rPr>
-              <a:t>thập</a:t>
-            </a:r>
-            <a:r>
-              <a:rPr lang="en-US" sz="2400" dirty="0">
-                <a:latin typeface="Calibri (Body)"/>
-              </a:rPr>
-              <a:t> </a:t>
-            </a:r>
-            <a:r>
-              <a:rPr lang="en-US" sz="2400" dirty="0" err="1">
-                <a:latin typeface="Calibri (Body)"/>
-              </a:rPr>
-              <a:t>dữ</a:t>
-            </a:r>
-            <a:r>
-              <a:rPr lang="en-US" sz="2400" dirty="0">
-                <a:latin typeface="Calibri (Body)"/>
-              </a:rPr>
-              <a:t> </a:t>
-            </a:r>
-            <a:r>
-              <a:rPr lang="en-US" sz="2400" dirty="0" err="1">
-                <a:latin typeface="Calibri (Body)"/>
-              </a:rPr>
-              <a:t>liệu</a:t>
-            </a:r>
-            <a:endParaRPr lang="en-US" sz="2400" dirty="0">
-              <a:latin typeface="Calibri (Body)"/>
-            </a:endParaRPr>
-          </a:p>
-        </p:txBody>
-      </p:sp>
-      <p:pic>
-        <p:nvPicPr>
-          <p:cNvPr id="5" name="Picture 4" descr="A picture containing black, tower, white, building&#10;&#10;Description automatically generated">
-            <a:extLst>
-              <a:ext uri="{FF2B5EF4-FFF2-40B4-BE49-F238E27FC236}">
-                <a16:creationId xmlns:a16="http://schemas.microsoft.com/office/drawing/2014/main" id="{FE9ECA9A-32D7-4E76-8A6D-3B5C2A147A9F}"/>
-              </a:ext>
-            </a:extLst>
-          </p:cNvPr>
-          <p:cNvPicPr>
-            <a:picLocks noChangeAspect="1"/>
-          </p:cNvPicPr>
-          <p:nvPr/>
-        </p:nvPicPr>
-        <p:blipFill>
-          <a:blip r:embed="rId2"/>
-          <a:stretch>
-            <a:fillRect/>
-          </a:stretch>
-        </p:blipFill>
-        <p:spPr>
-          <a:xfrm>
-            <a:off x="536757" y="2762008"/>
-            <a:ext cx="1819767" cy="2014926"/>
-          </a:xfrm>
-          <a:prstGeom prst="rect">
-            <a:avLst/>
-          </a:prstGeom>
-        </p:spPr>
-      </p:pic>
-      <p:pic>
-        <p:nvPicPr>
-          <p:cNvPr id="7" name="Picture 6" descr="A close up of a sign&#10;&#10;Description automatically generated">
-            <a:extLst>
-              <a:ext uri="{FF2B5EF4-FFF2-40B4-BE49-F238E27FC236}">
-                <a16:creationId xmlns:a16="http://schemas.microsoft.com/office/drawing/2014/main" id="{E440FD5D-FD05-486A-A6F8-9617B9B65DA3}"/>
-              </a:ext>
-            </a:extLst>
-          </p:cNvPr>
-          <p:cNvPicPr>
-            <a:picLocks noChangeAspect="1"/>
-          </p:cNvPicPr>
-          <p:nvPr/>
-        </p:nvPicPr>
-        <p:blipFill>
-          <a:blip r:embed="rId3"/>
-          <a:stretch>
-            <a:fillRect/>
-          </a:stretch>
-        </p:blipFill>
-        <p:spPr>
-          <a:xfrm>
-            <a:off x="2873095" y="2974728"/>
-            <a:ext cx="1819767" cy="1802206"/>
-          </a:xfrm>
-          <a:prstGeom prst="rect">
-            <a:avLst/>
-          </a:prstGeom>
-        </p:spPr>
-      </p:pic>
-      <p:sp>
-        <p:nvSpPr>
-          <p:cNvPr id="4" name="Slide Number Placeholder 3">
-            <a:extLst>
-              <a:ext uri="{FF2B5EF4-FFF2-40B4-BE49-F238E27FC236}">
-                <a16:creationId xmlns:a16="http://schemas.microsoft.com/office/drawing/2014/main" id="{D5632410-5A2D-4996-AACB-672FF27F5CAC}"/>
-              </a:ext>
-            </a:extLst>
-          </p:cNvPr>
-          <p:cNvSpPr>
-            <a:spLocks noGrp="1"/>
-          </p:cNvSpPr>
-          <p:nvPr>
-            <p:ph type="sldNum" sz="quarter" idx="12"/>
-          </p:nvPr>
-        </p:nvSpPr>
-        <p:spPr/>
-        <p:txBody>
-          <a:bodyPr/>
-          <a:lstStyle/>
-          <a:p>
-            <a:fld id="{D57F1E4F-1CFF-5643-939E-217C01CDF565}" type="slidenum">
-              <a:rPr lang="en-US" smtClean="0"/>
-              <a:pPr/>
-              <a:t>2</a:t>
-            </a:fld>
-            <a:endParaRPr lang="en-US" dirty="0"/>
-          </a:p>
-        </p:txBody>
-      </p:sp>
-      <p:pic>
-        <p:nvPicPr>
-          <p:cNvPr id="1032" name="Picture 8" descr="Related image">
-            <a:extLst>
-              <a:ext uri="{FF2B5EF4-FFF2-40B4-BE49-F238E27FC236}">
-                <a16:creationId xmlns:a16="http://schemas.microsoft.com/office/drawing/2014/main" id="{EE61FDB1-7C35-42BC-A1A5-B856B7C9F889}"/>
-              </a:ext>
-            </a:extLst>
-          </p:cNvPr>
-          <p:cNvPicPr>
-            <a:picLocks noChangeAspect="1" noChangeArrowheads="1"/>
-          </p:cNvPicPr>
-          <p:nvPr/>
-        </p:nvPicPr>
-        <p:blipFill>
-          <a:blip r:embed="rId4">
-            <a:extLst>
-              <a:ext uri="{28A0092B-C50C-407E-A947-70E740481C1C}">
-                <a14:useLocalDpi xmlns:a14="http://schemas.microsoft.com/office/drawing/2010/main" val="0"/>
-              </a:ext>
-            </a:extLst>
-          </a:blip>
-          <a:srcRect/>
-          <a:stretch>
-            <a:fillRect/>
-          </a:stretch>
-        </p:blipFill>
-        <p:spPr bwMode="auto">
-          <a:xfrm>
-            <a:off x="5433398" y="2893626"/>
-            <a:ext cx="1628322" cy="1916134"/>
-          </a:xfrm>
-          <a:prstGeom prst="rect">
-            <a:avLst/>
-          </a:prstGeom>
-          <a:noFill/>
-          <a:extLst>
-            <a:ext uri="{909E8E84-426E-40DD-AFC4-6F175D3DCCD1}">
-              <a14:hiddenFill xmlns:a14="http://schemas.microsoft.com/office/drawing/2010/main">
-                <a:solidFill>
-                  <a:srgbClr val="FFFFFF"/>
-                </a:solidFill>
-              </a14:hiddenFill>
-            </a:ext>
-          </a:extLst>
-        </p:spPr>
-      </p:pic>
-      <p:sp>
-        <p:nvSpPr>
-          <p:cNvPr id="14" name="Rectangle 13">
-            <a:extLst>
-              <a:ext uri="{FF2B5EF4-FFF2-40B4-BE49-F238E27FC236}">
-                <a16:creationId xmlns:a16="http://schemas.microsoft.com/office/drawing/2014/main" id="{1D236870-8999-49E6-A979-77CE9FC5F57E}"/>
-              </a:ext>
-            </a:extLst>
-          </p:cNvPr>
-          <p:cNvSpPr/>
-          <p:nvPr/>
-        </p:nvSpPr>
-        <p:spPr>
-          <a:xfrm>
-            <a:off x="5520340" y="4860919"/>
-            <a:ext cx="1454437" cy="830997"/>
-          </a:xfrm>
-          <a:prstGeom prst="rect">
-            <a:avLst/>
-          </a:prstGeom>
-        </p:spPr>
-        <p:txBody>
-          <a:bodyPr wrap="none">
-            <a:spAutoFit/>
-          </a:bodyPr>
-          <a:lstStyle/>
-          <a:p>
-            <a:pPr algn="ctr"/>
-            <a:r>
-              <a:rPr lang="en-US" sz="2400" dirty="0" err="1">
-                <a:latin typeface="Calibri (Body)"/>
-              </a:rPr>
-              <a:t>Tiền</a:t>
-            </a:r>
-            <a:r>
-              <a:rPr lang="en-US" sz="2400" dirty="0">
-                <a:latin typeface="Calibri (Body)"/>
-              </a:rPr>
-              <a:t> </a:t>
-            </a:r>
-            <a:r>
-              <a:rPr lang="en-US" sz="2400" dirty="0" err="1">
-                <a:latin typeface="Calibri (Body)"/>
-              </a:rPr>
-              <a:t>xử</a:t>
-            </a:r>
-            <a:r>
-              <a:rPr lang="en-US" sz="2400" dirty="0">
-                <a:latin typeface="Calibri (Body)"/>
-              </a:rPr>
-              <a:t> </a:t>
-            </a:r>
-            <a:r>
-              <a:rPr lang="en-US" sz="2400" dirty="0" err="1">
-                <a:latin typeface="Calibri (Body)"/>
-              </a:rPr>
-              <a:t>lý</a:t>
-            </a:r>
-            <a:r>
-              <a:rPr lang="en-US" sz="2400" dirty="0">
-                <a:latin typeface="Calibri (Body)"/>
-              </a:rPr>
-              <a:t> </a:t>
-            </a:r>
-          </a:p>
-          <a:p>
-            <a:pPr algn="ctr"/>
-            <a:r>
-              <a:rPr lang="en-US" sz="2400" dirty="0" err="1">
-                <a:latin typeface="Calibri (Body)"/>
-              </a:rPr>
-              <a:t>dữ</a:t>
-            </a:r>
-            <a:r>
-              <a:rPr lang="en-US" sz="2400" dirty="0">
-                <a:latin typeface="Calibri (Body)"/>
-              </a:rPr>
-              <a:t> </a:t>
-            </a:r>
-            <a:r>
-              <a:rPr lang="en-US" sz="2400" dirty="0" err="1">
-                <a:latin typeface="Calibri (Body)"/>
-              </a:rPr>
-              <a:t>liệu</a:t>
-            </a:r>
-            <a:endParaRPr lang="en-US" sz="2400" dirty="0">
-              <a:latin typeface="Calibri (Body)"/>
-            </a:endParaRPr>
-          </a:p>
-        </p:txBody>
-      </p:sp>
-      <p:pic>
-        <p:nvPicPr>
-          <p:cNvPr id="1034" name="Picture 10" descr="Image result for model scikit learn icon">
-            <a:extLst>
-              <a:ext uri="{FF2B5EF4-FFF2-40B4-BE49-F238E27FC236}">
-                <a16:creationId xmlns:a16="http://schemas.microsoft.com/office/drawing/2014/main" id="{7D44AA3B-42A1-4DE0-9D7E-567F6B71FB60}"/>
-              </a:ext>
-            </a:extLst>
-          </p:cNvPr>
-          <p:cNvPicPr>
-            <a:picLocks noChangeAspect="1" noChangeArrowheads="1"/>
-          </p:cNvPicPr>
-          <p:nvPr/>
-        </p:nvPicPr>
-        <p:blipFill>
-          <a:blip r:embed="rId5">
-            <a:extLst>
-              <a:ext uri="{28A0092B-C50C-407E-A947-70E740481C1C}">
-                <a14:useLocalDpi xmlns:a14="http://schemas.microsoft.com/office/drawing/2010/main" val="0"/>
-              </a:ext>
-            </a:extLst>
-          </a:blip>
-          <a:srcRect/>
-          <a:stretch>
-            <a:fillRect/>
-          </a:stretch>
-        </p:blipFill>
-        <p:spPr bwMode="auto">
-          <a:xfrm>
-            <a:off x="7849773" y="2951894"/>
-            <a:ext cx="1825042" cy="1825042"/>
-          </a:xfrm>
-          <a:prstGeom prst="rect">
-            <a:avLst/>
-          </a:prstGeom>
-          <a:noFill/>
-          <a:extLst>
-            <a:ext uri="{909E8E84-426E-40DD-AFC4-6F175D3DCCD1}">
-              <a14:hiddenFill xmlns:a14="http://schemas.microsoft.com/office/drawing/2010/main">
-                <a:solidFill>
-                  <a:srgbClr val="FFFFFF"/>
-                </a:solidFill>
-              </a14:hiddenFill>
-            </a:ext>
-          </a:extLst>
-        </p:spPr>
-      </p:pic>
-      <p:sp>
-        <p:nvSpPr>
-          <p:cNvPr id="16" name="Rectangle 15">
-            <a:extLst>
-              <a:ext uri="{FF2B5EF4-FFF2-40B4-BE49-F238E27FC236}">
-                <a16:creationId xmlns:a16="http://schemas.microsoft.com/office/drawing/2014/main" id="{766614DE-CC17-43A8-B0D2-483AAEF43838}"/>
-              </a:ext>
-            </a:extLst>
-          </p:cNvPr>
-          <p:cNvSpPr/>
-          <p:nvPr/>
-        </p:nvSpPr>
-        <p:spPr>
-          <a:xfrm>
-            <a:off x="7878287" y="4806488"/>
-            <a:ext cx="1774845" cy="830997"/>
-          </a:xfrm>
-          <a:prstGeom prst="rect">
-            <a:avLst/>
-          </a:prstGeom>
-        </p:spPr>
-        <p:txBody>
-          <a:bodyPr wrap="none">
-            <a:spAutoFit/>
-          </a:bodyPr>
-          <a:lstStyle/>
-          <a:p>
-            <a:pPr algn="ctr"/>
-            <a:r>
-              <a:rPr lang="en-US" sz="2400" dirty="0" err="1">
-                <a:latin typeface="Calibri (Body)"/>
-              </a:rPr>
-              <a:t>Mô</a:t>
-            </a:r>
-            <a:r>
-              <a:rPr lang="en-US" sz="2400" dirty="0">
-                <a:latin typeface="Calibri (Body)"/>
-              </a:rPr>
-              <a:t> </a:t>
-            </a:r>
-            <a:r>
-              <a:rPr lang="en-US" sz="2400" dirty="0" err="1">
-                <a:latin typeface="Calibri (Body)"/>
-              </a:rPr>
-              <a:t>hình</a:t>
-            </a:r>
-            <a:r>
-              <a:rPr lang="en-US" sz="2400" dirty="0">
-                <a:latin typeface="Calibri (Body)"/>
-              </a:rPr>
-              <a:t> </a:t>
-            </a:r>
-            <a:r>
-              <a:rPr lang="en-US" sz="2400" dirty="0" err="1">
-                <a:latin typeface="Calibri (Body)"/>
-              </a:rPr>
-              <a:t>hóa</a:t>
-            </a:r>
-            <a:endParaRPr lang="en-US" sz="2400" dirty="0">
-              <a:latin typeface="Calibri (Body)"/>
-            </a:endParaRPr>
-          </a:p>
-          <a:p>
-            <a:pPr algn="ctr"/>
-            <a:r>
-              <a:rPr lang="en-US" sz="2400" dirty="0">
-                <a:latin typeface="Calibri (Body)"/>
-              </a:rPr>
-              <a:t> </a:t>
-            </a:r>
-            <a:r>
-              <a:rPr lang="en-US" sz="2400" dirty="0" err="1">
-                <a:latin typeface="Calibri (Body)"/>
-              </a:rPr>
-              <a:t>dữ</a:t>
-            </a:r>
-            <a:r>
-              <a:rPr lang="en-US" sz="2400" dirty="0">
-                <a:latin typeface="Calibri (Body)"/>
-              </a:rPr>
-              <a:t> </a:t>
-            </a:r>
-            <a:r>
-              <a:rPr lang="en-US" sz="2400" dirty="0" err="1">
-                <a:latin typeface="Calibri (Body)"/>
-              </a:rPr>
-              <a:t>liệu</a:t>
-            </a:r>
-            <a:endParaRPr lang="en-US" sz="2400" dirty="0">
-              <a:latin typeface="Calibri (Body)"/>
-            </a:endParaRPr>
-          </a:p>
-        </p:txBody>
-      </p:sp>
-      <p:pic>
-        <p:nvPicPr>
-          <p:cNvPr id="1036" name="Picture 12" descr="Related image">
-            <a:extLst>
-              <a:ext uri="{FF2B5EF4-FFF2-40B4-BE49-F238E27FC236}">
-                <a16:creationId xmlns:a16="http://schemas.microsoft.com/office/drawing/2014/main" id="{221F60B8-A781-41E3-9B3D-3BF0FFB8D2BF}"/>
-              </a:ext>
-            </a:extLst>
-          </p:cNvPr>
-          <p:cNvPicPr>
-            <a:picLocks noChangeAspect="1" noChangeArrowheads="1"/>
-          </p:cNvPicPr>
-          <p:nvPr/>
-        </p:nvPicPr>
-        <p:blipFill>
-          <a:blip r:embed="rId6">
-            <a:extLst>
-              <a:ext uri="{28A0092B-C50C-407E-A947-70E740481C1C}">
-                <a14:useLocalDpi xmlns:a14="http://schemas.microsoft.com/office/drawing/2010/main" val="0"/>
-              </a:ext>
-            </a:extLst>
-          </a:blip>
-          <a:srcRect/>
-          <a:stretch>
-            <a:fillRect/>
-          </a:stretch>
-        </p:blipFill>
-        <p:spPr bwMode="auto">
-          <a:xfrm>
-            <a:off x="9937064" y="2762008"/>
-            <a:ext cx="2061382" cy="2274226"/>
-          </a:xfrm>
-          <a:prstGeom prst="rect">
-            <a:avLst/>
-          </a:prstGeom>
-          <a:noFill/>
-          <a:extLst>
-            <a:ext uri="{909E8E84-426E-40DD-AFC4-6F175D3DCCD1}">
-              <a14:hiddenFill xmlns:a14="http://schemas.microsoft.com/office/drawing/2010/main">
-                <a:solidFill>
-                  <a:srgbClr val="FFFFFF"/>
-                </a:solidFill>
-              </a14:hiddenFill>
-            </a:ext>
-          </a:extLst>
-        </p:spPr>
-      </p:pic>
-      <p:sp>
-        <p:nvSpPr>
-          <p:cNvPr id="18" name="Rectangle 17">
-            <a:extLst>
-              <a:ext uri="{FF2B5EF4-FFF2-40B4-BE49-F238E27FC236}">
-                <a16:creationId xmlns:a16="http://schemas.microsoft.com/office/drawing/2014/main" id="{8B54873E-5107-4C5F-BA9D-6D5ED2D4D3E8}"/>
-              </a:ext>
-            </a:extLst>
-          </p:cNvPr>
-          <p:cNvSpPr/>
-          <p:nvPr/>
-        </p:nvSpPr>
-        <p:spPr>
-          <a:xfrm>
-            <a:off x="10524836" y="4842410"/>
-            <a:ext cx="1229311" cy="461665"/>
-          </a:xfrm>
-          <a:prstGeom prst="rect">
-            <a:avLst/>
-          </a:prstGeom>
-        </p:spPr>
-        <p:txBody>
-          <a:bodyPr wrap="none">
-            <a:spAutoFit/>
-          </a:bodyPr>
-          <a:lstStyle/>
-          <a:p>
-            <a:r>
-              <a:rPr lang="en-US" sz="2400" dirty="0" err="1">
-                <a:latin typeface="Calibri (Body)"/>
-              </a:rPr>
-              <a:t>Tổng</a:t>
-            </a:r>
-            <a:r>
-              <a:rPr lang="en-US" sz="2400" dirty="0">
-                <a:latin typeface="Calibri (Body)"/>
-              </a:rPr>
-              <a:t> </a:t>
-            </a:r>
-            <a:r>
-              <a:rPr lang="en-US" sz="2400" dirty="0" err="1">
-                <a:latin typeface="Calibri (Body)"/>
-              </a:rPr>
-              <a:t>kết</a:t>
-            </a:r>
-            <a:endParaRPr lang="en-US" sz="2400" dirty="0">
-              <a:latin typeface="Calibri (Body)"/>
-            </a:endParaRPr>
-          </a:p>
-        </p:txBody>
-      </p:sp>
-    </p:spTree>
-    <p:extLst>
-      <p:ext uri="{BB962C8B-B14F-4D97-AF65-F5344CB8AC3E}">
-        <p14:creationId xmlns:p14="http://schemas.microsoft.com/office/powerpoint/2010/main" val="3210411874"/>
-      </p:ext>
-    </p:extLst>
-  </p:cSld>
-  <p:clrMapOvr>
-    <a:masterClrMapping/>
-  </p:clrMapOvr>
-</p:sld>
-</file>
-
-<file path=ppt/slides/slide20.xml><?xml version="1.0" encoding="utf-8"?>
+<file path=ppt/slides/slide21.xml><?xml version="1.0" encoding="utf-8"?>
 <p:sld xmlns:a="http://schemas.openxmlformats.org/drawingml/2006/main" xmlns:r="http://schemas.openxmlformats.org/officeDocument/2006/relationships" xmlns:p="http://schemas.openxmlformats.org/presentationml/2006/main">
   <p:cSld>
     <p:spTree>
@@ -27468,7 +30277,7 @@
             <a:fld id="{D57F1E4F-1CFF-5643-939E-217C01CDF565}" type="slidenum">
               <a:rPr lang="en-US" smtClean="0"/>
               <a:pPr/>
-              <a:t>20</a:t>
+              <a:t>21</a:t>
             </a:fld>
             <a:endParaRPr lang="en-US" dirty="0"/>
           </a:p>
@@ -27534,7 +30343,7 @@
 </p:sld>
 </file>
 
-<file path=ppt/slides/slide21.xml><?xml version="1.0" encoding="utf-8"?>
+<file path=ppt/slides/slide22.xml><?xml version="1.0" encoding="utf-8"?>
 <p:sld xmlns:a="http://schemas.openxmlformats.org/drawingml/2006/main" xmlns:r="http://schemas.openxmlformats.org/officeDocument/2006/relationships" xmlns:p="http://schemas.openxmlformats.org/presentationml/2006/main">
   <p:cSld>
     <p:bg>
@@ -27859,7 +30668,7 @@
             <a:fld id="{D57F1E4F-1CFF-5643-939E-217C01CDF565}" type="slidenum">
               <a:rPr lang="en-US" smtClean="0"/>
               <a:pPr/>
-              <a:t>21</a:t>
+              <a:t>22</a:t>
             </a:fld>
             <a:endParaRPr lang="en-US" dirty="0"/>
           </a:p>
@@ -27878,7 +30687,7 @@
 </p:sld>
 </file>
 
-<file path=ppt/slides/slide22.xml><?xml version="1.0" encoding="utf-8"?>
+<file path=ppt/slides/slide23.xml><?xml version="1.0" encoding="utf-8"?>
 <p:sld xmlns:a="http://schemas.openxmlformats.org/drawingml/2006/main" xmlns:r="http://schemas.openxmlformats.org/officeDocument/2006/relationships" xmlns:p="http://schemas.openxmlformats.org/presentationml/2006/main">
   <p:cSld>
     <p:bg>
@@ -28193,7 +31002,7 @@
             <a:fld id="{D57F1E4F-1CFF-5643-939E-217C01CDF565}" type="slidenum">
               <a:rPr lang="en-US" smtClean="0"/>
               <a:pPr/>
-              <a:t>22</a:t>
+              <a:t>23</a:t>
             </a:fld>
             <a:endParaRPr lang="en-US" dirty="0"/>
           </a:p>

</xml_diff>